<commit_message>
updated next move slides
</commit_message>
<xml_diff>
--- a/files/next_move.pptx
+++ b/files/next_move.pptx
@@ -34,6 +34,8 @@
     <p:sldId id="279" r:id="rId31"/>
     <p:sldId id="280" r:id="rId32"/>
     <p:sldId id="281" r:id="rId33"/>
+    <p:sldId id="282" r:id="rId34"/>
+    <p:sldId id="283" r:id="rId35"/>
   </p:sldIdLst>
   <p:sldSz cx="13004800" cy="9753600"/>
   <p:notesSz cx="6858000" cy="9144000"/>
@@ -3539,9 +3541,49 @@
           <a:chExt cx="0" cy="0"/>
         </a:xfrm>
       </p:grpSpPr>
+      <p:sp>
+        <p:nvSpPr>
+          <p:cNvPr id="169" name="Focus on experiences which will help you move the direction you want (70-20-10 rule)…"/>
+          <p:cNvSpPr txBox="1"/>
+          <p:nvPr>
+            <p:ph type="body" sz="half" idx="1"/>
+          </p:nvPr>
+        </p:nvSpPr>
+        <p:spPr>
+          <a:xfrm>
+            <a:off x="6718300" y="2590800"/>
+            <a:ext cx="5334000" cy="6286500"/>
+          </a:xfrm>
+          <a:prstGeom prst="rect">
+            <a:avLst/>
+          </a:prstGeom>
+        </p:spPr>
+        <p:txBody>
+          <a:bodyPr/>
+          <a:lstStyle/>
+          <a:p>
+            <a:pPr/>
+            <a:r>
+              <a:t>Focus on experiences which will help you move the direction you want (70-20-10 rule)</a:t>
+            </a:r>
+          </a:p>
+          <a:p>
+            <a:pPr/>
+            <a:r>
+              <a:t>Focus on what can help in the next 2-5 years</a:t>
+            </a:r>
+          </a:p>
+          <a:p>
+            <a:pPr/>
+            <a:r>
+              <a:t>Review it every 6 months and every time you change companies or jobs/positions. Update if necessary.</a:t>
+            </a:r>
+          </a:p>
+        </p:txBody>
+      </p:sp>
       <p:pic>
         <p:nvPicPr>
-          <p:cNvPr id="166" name="Map-Your-Career-mind-map.jpg" descr="Map-Your-Career-mind-map.jpg"/>
+          <p:cNvPr id="170" name="antique-compass-3d-model-obj-fbx-c4d-stl.jpg" descr="antique-compass-3d-model-obj-fbx-c4d-stl.jpg"/>
           <p:cNvPicPr>
             <a:picLocks noChangeAspect="0"/>
           </p:cNvPicPr>
@@ -3553,15 +3595,15 @@
           <a:blip r:embed="rId2">
             <a:extLst/>
           </a:blip>
-          <a:srcRect l="27063" t="0" r="27063" b="0"/>
+          <a:srcRect l="4904" t="0" r="10246" b="0"/>
           <a:stretch>
             <a:fillRect/>
           </a:stretch>
         </p:blipFill>
         <p:spPr>
           <a:xfrm>
-            <a:off x="6718300" y="638919"/>
-            <a:ext cx="5334000" cy="8216901"/>
+            <a:off x="952500" y="2770692"/>
+            <a:ext cx="5334001" cy="6286501"/>
           </a:xfrm>
           <a:prstGeom prst="rect">
             <a:avLst/>
@@ -3570,7 +3612,7 @@
       </p:pic>
       <p:sp>
         <p:nvSpPr>
-          <p:cNvPr id="167" name="Personal Experience Map"/>
+          <p:cNvPr id="171" name="Review and Plan"/>
           <p:cNvSpPr txBox="1"/>
           <p:nvPr>
             <p:ph type="title"/>
@@ -3587,29 +3629,8 @@
           <a:p>
             <a:pPr/>
             <a:r>
-              <a:t>Personal Experience Map</a:t>
-            </a:r>
-          </a:p>
-        </p:txBody>
-      </p:sp>
-      <p:sp>
-        <p:nvSpPr>
-          <p:cNvPr id="168" name="Body"/>
-          <p:cNvSpPr txBox="1"/>
-          <p:nvPr>
-            <p:ph type="body" sz="quarter" idx="1"/>
-          </p:nvPr>
-        </p:nvSpPr>
-        <p:spPr>
-          <a:prstGeom prst="rect">
-            <a:avLst/>
-          </a:prstGeom>
-        </p:spPr>
-        <p:txBody>
-          <a:bodyPr/>
-          <a:lstStyle/>
-          <a:p>
-            <a:pPr/>
+              <a:t>Review and Plan</a:t>
+            </a:r>
           </a:p>
         </p:txBody>
       </p:sp>
@@ -3639,154 +3660,80 @@
           <a:chExt cx="0" cy="0"/>
         </a:xfrm>
       </p:grpSpPr>
-      <p:sp>
-        <p:nvSpPr>
-          <p:cNvPr id="170" name="Experiences"/>
-          <p:cNvSpPr txBox="1"/>
-          <p:nvPr>
-            <p:ph type="title"/>
-          </p:nvPr>
-        </p:nvSpPr>
-        <p:spPr>
-          <a:prstGeom prst="rect">
-            <a:avLst/>
-          </a:prstGeom>
-        </p:spPr>
-        <p:txBody>
-          <a:bodyPr/>
-          <a:lstStyle/>
-          <a:p>
-            <a:pPr/>
-            <a:r>
-              <a:t>Experiences</a:t>
-            </a:r>
-          </a:p>
-        </p:txBody>
-      </p:sp>
-      <p:sp>
-        <p:nvSpPr>
-          <p:cNvPr id="171" name="Two types of experience…"/>
-          <p:cNvSpPr txBox="1"/>
-          <p:nvPr>
-            <p:ph type="body" sz="half" idx="1"/>
-          </p:nvPr>
-        </p:nvSpPr>
-        <p:spPr>
-          <a:xfrm>
-            <a:off x="952500" y="2590800"/>
-            <a:ext cx="11099800" cy="2779478"/>
-          </a:xfrm>
-          <a:prstGeom prst="rect">
-            <a:avLst/>
-          </a:prstGeom>
-        </p:spPr>
-        <p:txBody>
-          <a:bodyPr/>
-          <a:lstStyle/>
-          <a:p>
-            <a:pPr marL="312039" indent="-312039" defTabSz="531622">
-              <a:spcBef>
-                <a:spcPts val="2900"/>
-              </a:spcBef>
-              <a:defRPr sz="2548"/>
-            </a:pPr>
-            <a:r>
-              <a:t>Two types of experience</a:t>
-            </a:r>
-          </a:p>
-          <a:p>
-            <a:pPr lvl="1" marL="624078" indent="-312039" defTabSz="531622">
-              <a:spcBef>
-                <a:spcPts val="2900"/>
-              </a:spcBef>
-              <a:defRPr sz="2548"/>
-            </a:pPr>
-            <a:r>
-              <a:t>Functional: Show competency in skills</a:t>
-            </a:r>
-          </a:p>
-          <a:p>
-            <a:pPr lvl="1" marL="624078" indent="-312039" defTabSz="531622">
-              <a:spcBef>
-                <a:spcPts val="2900"/>
-              </a:spcBef>
-              <a:defRPr sz="2548"/>
-            </a:pPr>
-            <a:r>
-              <a:t>Management: Show how you perform in situations</a:t>
-            </a:r>
-          </a:p>
-          <a:p>
-            <a:pPr marL="312039" indent="-312039" defTabSz="531622">
-              <a:spcBef>
-                <a:spcPts val="2900"/>
-              </a:spcBef>
-              <a:defRPr sz="2548"/>
-            </a:pPr>
-            <a:r>
-              <a:t>How do you find out what experiences to go after? You ask someone</a:t>
-            </a:r>
-          </a:p>
-        </p:txBody>
-      </p:sp>
       <p:pic>
         <p:nvPicPr>
-          <p:cNvPr id="172" name="images.jpeg" descr="images.jpeg"/>
+          <p:cNvPr id="173" name="Screen Shot 2019-03-15 at 8.54.27 AM.png" descr="Screen Shot 2019-03-15 at 8.54.27 AM.png"/>
           <p:cNvPicPr>
-            <a:picLocks noChangeAspect="1"/>
+            <a:picLocks noChangeAspect="0"/>
           </p:cNvPicPr>
-          <p:nvPr/>
+          <p:nvPr>
+            <p:ph type="pic" idx="13"/>
+          </p:nvPr>
         </p:nvPicPr>
         <p:blipFill>
           <a:blip r:embed="rId2">
             <a:extLst/>
           </a:blip>
+          <a:srcRect l="5880" t="0" r="5880" b="0"/>
           <a:stretch>
             <a:fillRect/>
           </a:stretch>
         </p:blipFill>
         <p:spPr>
           <a:xfrm>
-            <a:off x="7217484" y="5548077"/>
-            <a:ext cx="4584440" cy="3377088"/>
+            <a:off x="6718300" y="638919"/>
+            <a:ext cx="5334001" cy="8216901"/>
           </a:xfrm>
           <a:prstGeom prst="rect">
             <a:avLst/>
           </a:prstGeom>
-          <a:ln w="12700">
-            <a:miter lim="400000"/>
-          </a:ln>
         </p:spPr>
       </p:pic>
-      <p:pic>
-        <p:nvPicPr>
-          <p:cNvPr id="173" name="1_w_gG-CXQX4TV3B5bN24nqg.png" descr="1_w_gG-CXQX4TV3B5bN24nqg.png"/>
-          <p:cNvPicPr>
-            <a:picLocks noChangeAspect="1"/>
-          </p:cNvPicPr>
-          <p:nvPr/>
-        </p:nvPicPr>
-        <p:blipFill>
-          <a:blip r:embed="rId3">
-            <a:extLst/>
-          </a:blip>
-          <a:stretch>
-            <a:fillRect/>
-          </a:stretch>
-        </p:blipFill>
-        <p:spPr>
-          <a:xfrm>
-            <a:off x="1059139" y="5548077"/>
-            <a:ext cx="5055519" cy="3377087"/>
-          </a:xfrm>
-          <a:prstGeom prst="rect">
-            <a:avLst/>
-          </a:prstGeom>
-          <a:ln w="12700">
-            <a:miter lim="400000"/>
-          </a:ln>
-        </p:spPr>
-      </p:pic>
+      <p:sp>
+        <p:nvSpPr>
+          <p:cNvPr id="174" name="From/To &amp; Interviewing"/>
+          <p:cNvSpPr txBox="1"/>
+          <p:nvPr>
+            <p:ph type="title"/>
+          </p:nvPr>
+        </p:nvSpPr>
+        <p:spPr>
+          <a:prstGeom prst="rect">
+            <a:avLst/>
+          </a:prstGeom>
+        </p:spPr>
+        <p:txBody>
+          <a:bodyPr/>
+          <a:lstStyle/>
+          <a:p>
+            <a:pPr/>
+            <a:r>
+              <a:t>From/To &amp; Interviewing</a:t>
+            </a:r>
+          </a:p>
+        </p:txBody>
+      </p:sp>
+      <p:sp>
+        <p:nvSpPr>
+          <p:cNvPr id="175" name="Body"/>
+          <p:cNvSpPr txBox="1"/>
+          <p:nvPr>
+            <p:ph type="body" sz="quarter" idx="1"/>
+          </p:nvPr>
+        </p:nvSpPr>
+        <p:spPr>
+          <a:prstGeom prst="rect">
+            <a:avLst/>
+          </a:prstGeom>
+        </p:spPr>
+        <p:txBody>
+          <a:bodyPr/>
+          <a:lstStyle/>
+          <a:p>
+            <a:pPr/>
+          </a:p>
+        </p:txBody>
+      </p:sp>
     </p:spTree>
   </p:cSld>
   <p:clrMapOvr>
@@ -3815,7 +3762,7 @@
       </p:grpSpPr>
       <p:sp>
         <p:nvSpPr>
-          <p:cNvPr id="175" name="Interview Experts"/>
+          <p:cNvPr id="177" name="From/To"/>
           <p:cNvSpPr txBox="1"/>
           <p:nvPr>
             <p:ph type="title"/>
@@ -3832,20 +3779,24 @@
           <a:p>
             <a:pPr/>
             <a:r>
-              <a:t>Interview Experts</a:t>
-            </a:r>
-          </a:p>
-        </p:txBody>
-      </p:sp>
-      <p:sp>
-        <p:nvSpPr>
-          <p:cNvPr id="176" name="Interview best and brightest in the field, ask them what helped them get to where they are…"/>
+              <a:t>From/To</a:t>
+            </a:r>
+          </a:p>
+        </p:txBody>
+      </p:sp>
+      <p:sp>
+        <p:nvSpPr>
+          <p:cNvPr id="178" name="Start with:…"/>
           <p:cNvSpPr txBox="1"/>
           <p:nvPr>
             <p:ph type="body" idx="1"/>
           </p:nvPr>
         </p:nvSpPr>
         <p:spPr>
+          <a:xfrm>
+            <a:off x="952500" y="2590800"/>
+            <a:ext cx="11099800" cy="5223258"/>
+          </a:xfrm>
           <a:prstGeom prst="rect">
             <a:avLst/>
           </a:prstGeom>
@@ -3854,58 +3805,84 @@
           <a:bodyPr/>
           <a:lstStyle/>
           <a:p>
-            <a:pPr marL="391159" indent="-391159" defTabSz="514095">
-              <a:spcBef>
-                <a:spcPts val="3600"/>
-              </a:spcBef>
-              <a:defRPr sz="2816"/>
+            <a:pPr marL="0" indent="0">
+              <a:buSzTx/>
+              <a:buNone/>
             </a:pPr>
             <a:r>
-              <a:t>Interview best and brightest in the field, ask them what helped them get to where they are</a:t>
-            </a:r>
-          </a:p>
-          <a:p>
-            <a:pPr marL="391159" indent="-391159" defTabSz="514095">
-              <a:spcBef>
-                <a:spcPts val="3600"/>
-              </a:spcBef>
-              <a:defRPr sz="2816"/>
-            </a:pPr>
-            <a:r>
-              <a:t>Find leaders on the “best” lists  (articles in trade mags, books you like, speakers at conferences, referrals from people you work with)</a:t>
-            </a:r>
-          </a:p>
-          <a:p>
-            <a:pPr marL="391159" indent="-391159" defTabSz="514095">
-              <a:spcBef>
-                <a:spcPts val="3600"/>
-              </a:spcBef>
-              <a:defRPr sz="2816"/>
-            </a:pPr>
-            <a:r>
-              <a:t>Request an interview asking them to help someone (you) in their field</a:t>
-            </a:r>
-          </a:p>
-          <a:p>
-            <a:pPr marL="391159" indent="-391159" defTabSz="514095">
-              <a:spcBef>
-                <a:spcPts val="3600"/>
-              </a:spcBef>
-              <a:defRPr sz="2816"/>
-            </a:pPr>
-            <a:r>
-              <a:t>Ask for insights on what experiences helped them grow the most</a:t>
-            </a:r>
-          </a:p>
-          <a:p>
-            <a:pPr marL="391159" indent="-391159" defTabSz="514095">
-              <a:spcBef>
-                <a:spcPts val="3600"/>
-              </a:spcBef>
-              <a:defRPr sz="2816"/>
-            </a:pPr>
-            <a:r>
-              <a:t>Resume and LinkedIn stalk: Look at what they say helped them or what value they provided</a:t>
+              <a:t>Start with:</a:t>
+            </a:r>
+          </a:p>
+          <a:p>
+            <a:pPr lvl="1"/>
+            <a:r>
+              <a:t>What is your </a:t>
+            </a:r>
+            <a:r>
+              <a:rPr b="1">
+                <a:solidFill>
+                  <a:srgbClr val="FFFB00"/>
+                </a:solidFill>
+              </a:rPr>
+              <a:t>next</a:t>
+            </a:r>
+            <a:r>
+              <a:t> move?</a:t>
+            </a:r>
+          </a:p>
+          <a:p>
+            <a:pPr lvl="1"/>
+            <a:r>
+              <a:t>What </a:t>
+            </a:r>
+            <a:r>
+              <a:rPr b="1">
+                <a:solidFill>
+                  <a:srgbClr val="FFFB00"/>
+                </a:solidFill>
+              </a:rPr>
+              <a:t>experience</a:t>
+            </a:r>
+            <a:r>
+              <a:t> do you want next?</a:t>
+            </a:r>
+          </a:p>
+          <a:p>
+            <a:pPr lvl="1"/>
+            <a:r>
+              <a:t>What </a:t>
+            </a:r>
+            <a:r>
+              <a:rPr b="1">
+                <a:solidFill>
+                  <a:srgbClr val="FFFB00"/>
+                </a:solidFill>
+              </a:rPr>
+              <a:t>technology</a:t>
+            </a:r>
+            <a:r>
+              <a:t> do you want to learn?</a:t>
+            </a:r>
+          </a:p>
+          <a:p>
+            <a:pPr lvl="1"/>
+            <a:r>
+              <a:t>What </a:t>
+            </a:r>
+            <a:r>
+              <a:rPr b="1">
+                <a:solidFill>
+                  <a:schemeClr val="accent4">
+                    <a:hueOff val="468000"/>
+                    <a:satOff val="-4761"/>
+                    <a:lumOff val="10196"/>
+                  </a:schemeClr>
+                </a:solidFill>
+              </a:rPr>
+              <a:t>industry</a:t>
+            </a:r>
+            <a:r>
+              <a:t> looks interesting or could help you grow?</a:t>
             </a:r>
           </a:p>
         </p:txBody>
@@ -3936,38 +3913,9 @@
           <a:chExt cx="0" cy="0"/>
         </a:xfrm>
       </p:grpSpPr>
-      <p:pic>
-        <p:nvPicPr>
-          <p:cNvPr id="178" name="map-of-london.jpg" descr="map-of-london.jpg"/>
-          <p:cNvPicPr>
-            <a:picLocks noChangeAspect="1"/>
-          </p:cNvPicPr>
-          <p:nvPr>
-            <p:ph type="pic" idx="13"/>
-          </p:nvPr>
-        </p:nvPicPr>
-        <p:blipFill>
-          <a:blip r:embed="rId2">
-            <a:extLst/>
-          </a:blip>
-          <a:srcRect l="31501" t="0" r="11905" b="0"/>
-          <a:stretch>
-            <a:fillRect/>
-          </a:stretch>
-        </p:blipFill>
-        <p:spPr>
-          <a:xfrm>
-            <a:off x="6718300" y="2590800"/>
-            <a:ext cx="5334000" cy="6286500"/>
-          </a:xfrm>
-          <a:prstGeom prst="rect">
-            <a:avLst/>
-          </a:prstGeom>
-        </p:spPr>
-      </p:pic>
-      <p:sp>
-        <p:nvSpPr>
-          <p:cNvPr id="179" name="Build the Map"/>
+      <p:sp>
+        <p:nvSpPr>
+          <p:cNvPr id="180" name="The Statement"/>
           <p:cNvSpPr txBox="1"/>
           <p:nvPr>
             <p:ph type="title"/>
@@ -3984,17 +3932,17 @@
           <a:p>
             <a:pPr/>
             <a:r>
-              <a:t>Build the Map</a:t>
-            </a:r>
-          </a:p>
-        </p:txBody>
-      </p:sp>
-      <p:sp>
-        <p:nvSpPr>
-          <p:cNvPr id="180" name="4-7 Functional Experiences…"/>
+              <a:t>The Statement</a:t>
+            </a:r>
+          </a:p>
+        </p:txBody>
+      </p:sp>
+      <p:sp>
+        <p:nvSpPr>
+          <p:cNvPr id="181" name="“From a _____ to a _______”…"/>
           <p:cNvSpPr txBox="1"/>
           <p:nvPr>
-            <p:ph type="body" sz="half" idx="1"/>
+            <p:ph type="body" idx="1"/>
           </p:nvPr>
         </p:nvSpPr>
         <p:spPr>
@@ -4008,25 +3956,19 @@
           <a:p>
             <a:pPr/>
             <a:r>
-              <a:t>4-7 Functional Experiences</a:t>
-            </a:r>
-          </a:p>
-          <a:p>
-            <a:pPr/>
-            <a:r>
-              <a:t>3-4 Management Experiences</a:t>
-            </a:r>
-          </a:p>
-          <a:p>
-            <a:pPr/>
-            <a:r>
-              <a:t>Focus on experiences that will accelerate career</a:t>
-            </a:r>
-          </a:p>
-          <a:p>
-            <a:pPr/>
-            <a:r>
-              <a:t>Experiences should show meaningful business outcome</a:t>
+              <a:t>“From a _____ to a _______”</a:t>
+            </a:r>
+          </a:p>
+          <a:p>
+            <a:pPr/>
+            <a:r>
+              <a:t>From a pure backend developer to a full stack expert with a focus on rails and react.</a:t>
+            </a:r>
+          </a:p>
+          <a:p>
+            <a:pPr/>
+            <a:r>
+              <a:t>From an individual contributor who adds value through technical expertise to a leader who provides vision and direction through clear collaboration on technical architecture decisions.</a:t>
             </a:r>
           </a:p>
         </p:txBody>
@@ -4059,76 +4001,7 @@
       </p:grpSpPr>
       <p:sp>
         <p:nvSpPr>
-          <p:cNvPr id="182" name="Focus on experiences which will help you move the direction you want (70-20-10 rule)…"/>
-          <p:cNvSpPr txBox="1"/>
-          <p:nvPr>
-            <p:ph type="body" sz="half" idx="1"/>
-          </p:nvPr>
-        </p:nvSpPr>
-        <p:spPr>
-          <a:xfrm>
-            <a:off x="6718300" y="2590800"/>
-            <a:ext cx="5334000" cy="6286500"/>
-          </a:xfrm>
-          <a:prstGeom prst="rect">
-            <a:avLst/>
-          </a:prstGeom>
-        </p:spPr>
-        <p:txBody>
-          <a:bodyPr/>
-          <a:lstStyle/>
-          <a:p>
-            <a:pPr/>
-            <a:r>
-              <a:t>Focus on experiences which will help you move the direction you want (70-20-10 rule)</a:t>
-            </a:r>
-          </a:p>
-          <a:p>
-            <a:pPr/>
-            <a:r>
-              <a:t>Focus on what can help in the next 2-5 years</a:t>
-            </a:r>
-          </a:p>
-          <a:p>
-            <a:pPr/>
-            <a:r>
-              <a:t>Review it every 6 months and every time you change companies or jobs/positions. Update if necessary.</a:t>
-            </a:r>
-          </a:p>
-        </p:txBody>
-      </p:sp>
-      <p:pic>
-        <p:nvPicPr>
-          <p:cNvPr id="183" name="antique-compass-3d-model-obj-fbx-c4d-stl.jpg" descr="antique-compass-3d-model-obj-fbx-c4d-stl.jpg"/>
-          <p:cNvPicPr>
-            <a:picLocks noChangeAspect="0"/>
-          </p:cNvPicPr>
-          <p:nvPr>
-            <p:ph type="pic" idx="13"/>
-          </p:nvPr>
-        </p:nvPicPr>
-        <p:blipFill>
-          <a:blip r:embed="rId2">
-            <a:extLst/>
-          </a:blip>
-          <a:srcRect l="4904" t="0" r="10246" b="0"/>
-          <a:stretch>
-            <a:fillRect/>
-          </a:stretch>
-        </p:blipFill>
-        <p:spPr>
-          <a:xfrm>
-            <a:off x="952500" y="2770692"/>
-            <a:ext cx="5334001" cy="6286501"/>
-          </a:xfrm>
-          <a:prstGeom prst="rect">
-            <a:avLst/>
-          </a:prstGeom>
-        </p:spPr>
-      </p:pic>
-      <p:sp>
-        <p:nvSpPr>
-          <p:cNvPr id="184" name="Review and Plan"/>
+          <p:cNvPr id="183" name="Interviewing"/>
           <p:cNvSpPr txBox="1"/>
           <p:nvPr>
             <p:ph type="title"/>
@@ -4145,7 +4018,43 @@
           <a:p>
             <a:pPr/>
             <a:r>
-              <a:t>Review and Plan</a:t>
+              <a:t>Interviewing</a:t>
+            </a:r>
+          </a:p>
+        </p:txBody>
+      </p:sp>
+      <p:sp>
+        <p:nvSpPr>
+          <p:cNvPr id="184" name="Check your ego at the door…"/>
+          <p:cNvSpPr txBox="1"/>
+          <p:nvPr>
+            <p:ph type="body" idx="1"/>
+          </p:nvPr>
+        </p:nvSpPr>
+        <p:spPr>
+          <a:prstGeom prst="rect">
+            <a:avLst/>
+          </a:prstGeom>
+        </p:spPr>
+        <p:txBody>
+          <a:bodyPr/>
+          <a:lstStyle/>
+          <a:p>
+            <a:pPr/>
+            <a:r>
+              <a:t>Check your ego at the door</a:t>
+            </a:r>
+          </a:p>
+          <a:p>
+            <a:pPr/>
+            <a:r>
+              <a:t>Ask trusted superiors and colleagues for feedback on From/To</a:t>
+            </a:r>
+          </a:p>
+          <a:p>
+            <a:pPr/>
+            <a:r>
+              <a:t>Ask for brutal honesty because transparency will help you grow</a:t>
             </a:r>
           </a:p>
         </p:txBody>
@@ -5078,9 +4987,9 @@
       </p:par>
     </p:tnLst>
     <p:bldLst>
-      <p:bldP build="whole" bldLvl="1" animBg="1" rev="0" advAuto="0" spid="137" grpId="3"/>
       <p:bldP build="whole" bldLvl="1" animBg="1" rev="0" advAuto="0" spid="138" grpId="1"/>
       <p:bldP build="whole" bldLvl="1" animBg="1" rev="0" advAuto="0" spid="138" grpId="2"/>
+      <p:bldP build="whole" bldLvl="1" animBg="1" rev="0" advAuto="0" spid="137" grpId="3"/>
     </p:bldLst>
   </p:timing>
 </p:sld>
@@ -5105,7 +5014,7 @@
       </p:grpSpPr>
       <p:pic>
         <p:nvPicPr>
-          <p:cNvPr id="208" name="Screen Shot 2019-03-13 at 8.05.18 AM.png" descr="Screen Shot 2019-03-13 at 8.05.18 AM.png"/>
+          <p:cNvPr id="208" name="Screen Shot 2019-03-13 at 8.05.50 AM.png" descr="Screen Shot 2019-03-13 at 8.05.50 AM.png"/>
           <p:cNvPicPr>
             <a:picLocks noChangeAspect="0"/>
           </p:cNvPicPr>
@@ -5117,15 +5026,15 @@
           <a:blip r:embed="rId2">
             <a:extLst/>
           </a:blip>
-          <a:srcRect l="486" t="2154" r="33286" b="0"/>
+          <a:srcRect l="460" t="1467" r="56838" b="3911"/>
           <a:stretch>
             <a:fillRect/>
           </a:stretch>
         </p:blipFill>
         <p:spPr>
           <a:xfrm>
-            <a:off x="952499" y="2590799"/>
-            <a:ext cx="11099802" cy="2528732"/>
+            <a:off x="952500" y="2070843"/>
+            <a:ext cx="11099801" cy="3591700"/>
           </a:xfrm>
           <a:prstGeom prst="rect">
             <a:avLst/>
@@ -5213,7 +5122,7 @@
       </p:grpSpPr>
       <p:sp>
         <p:nvSpPr>
-          <p:cNvPr id="212" name="Why Move At All?"/>
+          <p:cNvPr id="212" name="Summary of Tools"/>
           <p:cNvSpPr txBox="1"/>
           <p:nvPr>
             <p:ph type="title"/>
@@ -5230,7 +5139,43 @@
           <a:p>
             <a:pPr/>
             <a:r>
-              <a:t>Why Move At All?</a:t>
+              <a:t>Summary of Tools</a:t>
+            </a:r>
+          </a:p>
+        </p:txBody>
+      </p:sp>
+      <p:sp>
+        <p:nvSpPr>
+          <p:cNvPr id="213" name="Experience Map…"/>
+          <p:cNvSpPr txBox="1"/>
+          <p:nvPr>
+            <p:ph type="body" idx="1"/>
+          </p:nvPr>
+        </p:nvSpPr>
+        <p:spPr>
+          <a:prstGeom prst="rect">
+            <a:avLst/>
+          </a:prstGeom>
+        </p:spPr>
+        <p:txBody>
+          <a:bodyPr/>
+          <a:lstStyle/>
+          <a:p>
+            <a:pPr/>
+            <a:r>
+              <a:t>Experience Map</a:t>
+            </a:r>
+          </a:p>
+          <a:p>
+            <a:pPr/>
+            <a:r>
+              <a:t>From/To &amp; Interviewing</a:t>
+            </a:r>
+          </a:p>
+          <a:p>
+            <a:pPr/>
+            <a:r>
+              <a:t>Matrix Ranking</a:t>
             </a:r>
           </a:p>
         </p:txBody>
@@ -5261,38 +5206,9 @@
           <a:chExt cx="0" cy="0"/>
         </a:xfrm>
       </p:grpSpPr>
-      <p:pic>
-        <p:nvPicPr>
-          <p:cNvPr id="214" name="Screen_Shot_2019-03-11_at_8_09_40_AM.png" descr="Screen_Shot_2019-03-11_at_8_09_40_AM.png"/>
-          <p:cNvPicPr>
-            <a:picLocks noChangeAspect="1"/>
-          </p:cNvPicPr>
-          <p:nvPr/>
-        </p:nvPicPr>
-        <p:blipFill>
-          <a:blip r:embed="rId2">
-            <a:extLst/>
-          </a:blip>
-          <a:stretch>
-            <a:fillRect/>
-          </a:stretch>
-        </p:blipFill>
-        <p:spPr>
-          <a:xfrm>
-            <a:off x="1855745" y="2227356"/>
-            <a:ext cx="4843852" cy="7018641"/>
-          </a:xfrm>
-          <a:prstGeom prst="rect">
-            <a:avLst/>
-          </a:prstGeom>
-          <a:ln w="12700">
-            <a:miter lim="400000"/>
-          </a:ln>
-        </p:spPr>
-      </p:pic>
-      <p:sp>
-        <p:nvSpPr>
-          <p:cNvPr id="215" name="Bump (in salary)"/>
+      <p:sp>
+        <p:nvSpPr>
+          <p:cNvPr id="215" name="Why Move At All?…"/>
           <p:cNvSpPr txBox="1"/>
           <p:nvPr>
             <p:ph type="title"/>
@@ -5307,528 +5223,28 @@
           <a:bodyPr/>
           <a:lstStyle/>
           <a:p>
-            <a:pPr/>
-            <a:r>
-              <a:t>Bump (in salary)</a:t>
-            </a:r>
-          </a:p>
-        </p:txBody>
-      </p:sp>
-      <p:sp>
-        <p:nvSpPr>
-          <p:cNvPr id="216" name="Company Change"/>
-          <p:cNvSpPr txBox="1"/>
-          <p:nvPr/>
-        </p:nvSpPr>
-        <p:spPr>
-          <a:xfrm>
-            <a:off x="9610629" y="4232555"/>
-            <a:ext cx="2710892" cy="461060"/>
-          </a:xfrm>
-          <a:prstGeom prst="rect">
-            <a:avLst/>
-          </a:prstGeom>
-          <a:ln w="12700">
-            <a:miter lim="400000"/>
-          </a:ln>
-          <a:extLst>
-            <a:ext uri="{C572A759-6A51-4108-AA02-DFA0A04FC94B}">
-              <ma14:wrappingTextBoxFlag xmlns:ma14="http://schemas.microsoft.com/office/mac/drawingml/2011/main" val="1"/>
-            </a:ext>
-          </a:extLst>
-        </p:spPr>
-        <p:txBody>
-          <a:bodyPr wrap="none" lIns="50800" tIns="50800" rIns="50800" bIns="50800" anchor="ctr">
-            <a:spAutoFit/>
-          </a:bodyPr>
-          <a:lstStyle/>
-          <a:p>
-            <a:pPr/>
-            <a:r>
-              <a:t>Company Change</a:t>
-            </a:r>
-          </a:p>
-        </p:txBody>
-      </p:sp>
-      <p:sp>
-        <p:nvSpPr>
-          <p:cNvPr id="217" name="Position Change"/>
-          <p:cNvSpPr txBox="1"/>
-          <p:nvPr/>
-        </p:nvSpPr>
-        <p:spPr>
-          <a:xfrm>
-            <a:off x="9712432" y="5928970"/>
-            <a:ext cx="2507286" cy="461060"/>
-          </a:xfrm>
-          <a:prstGeom prst="rect">
-            <a:avLst/>
-          </a:prstGeom>
-          <a:ln w="12700">
-            <a:miter lim="400000"/>
-          </a:ln>
-          <a:extLst>
-            <a:ext uri="{C572A759-6A51-4108-AA02-DFA0A04FC94B}">
-              <ma14:wrappingTextBoxFlag xmlns:ma14="http://schemas.microsoft.com/office/mac/drawingml/2011/main" val="1"/>
-            </a:ext>
-          </a:extLst>
-        </p:spPr>
-        <p:txBody>
-          <a:bodyPr wrap="none" lIns="50800" tIns="50800" rIns="50800" bIns="50800" anchor="ctr">
-            <a:spAutoFit/>
-          </a:bodyPr>
-          <a:lstStyle/>
-          <a:p>
-            <a:pPr/>
-            <a:r>
-              <a:t>Position Change</a:t>
-            </a:r>
-          </a:p>
-        </p:txBody>
-      </p:sp>
-      <p:sp>
-        <p:nvSpPr>
-          <p:cNvPr id="218" name="Working for Self"/>
-          <p:cNvSpPr txBox="1"/>
-          <p:nvPr/>
-        </p:nvSpPr>
-        <p:spPr>
-          <a:xfrm>
-            <a:off x="9746722" y="4934713"/>
-            <a:ext cx="2438706" cy="461060"/>
-          </a:xfrm>
-          <a:prstGeom prst="rect">
-            <a:avLst/>
-          </a:prstGeom>
-          <a:ln w="12700">
-            <a:miter lim="400000"/>
-          </a:ln>
-          <a:extLst>
-            <a:ext uri="{C572A759-6A51-4108-AA02-DFA0A04FC94B}">
-              <ma14:wrappingTextBoxFlag xmlns:ma14="http://schemas.microsoft.com/office/mac/drawingml/2011/main" val="1"/>
-            </a:ext>
-          </a:extLst>
-        </p:spPr>
-        <p:txBody>
-          <a:bodyPr wrap="none" lIns="50800" tIns="50800" rIns="50800" bIns="50800" anchor="ctr">
-            <a:spAutoFit/>
-          </a:bodyPr>
-          <a:lstStyle/>
-          <a:p>
-            <a:pPr/>
-            <a:r>
-              <a:t>Working for Self</a:t>
-            </a:r>
-          </a:p>
-        </p:txBody>
-      </p:sp>
-      <p:sp>
-        <p:nvSpPr>
-          <p:cNvPr id="219" name="Line"/>
-          <p:cNvSpPr/>
-          <p:nvPr/>
-        </p:nvSpPr>
-        <p:spPr>
-          <a:xfrm flipH="1" flipV="1">
-            <a:off x="6699966" y="3359536"/>
-            <a:ext cx="2901580" cy="2810006"/>
-          </a:xfrm>
-          <a:prstGeom prst="line">
-            <a:avLst/>
-          </a:prstGeom>
-          <a:ln w="25400">
-            <a:solidFill>
-              <a:srgbClr val="00F900"/>
-            </a:solidFill>
-            <a:miter lim="400000"/>
-            <a:tailEnd type="triangle"/>
-          </a:ln>
-        </p:spPr>
-        <p:txBody>
-          <a:bodyPr lIns="50800" tIns="50800" rIns="50800" bIns="50800" anchor="ctr"/>
-          <a:lstStyle/>
-          <a:p>
-            <a:pPr>
-              <a:defRPr b="0" sz="2200">
-                <a:latin typeface="+mn-lt"/>
-                <a:ea typeface="+mn-ea"/>
-                <a:cs typeface="+mn-cs"/>
-                <a:sym typeface="Helvetica Neue Medium"/>
-              </a:defRPr>
+            <a:pPr defTabSz="502412">
+              <a:defRPr sz="6880"/>
             </a:pPr>
-          </a:p>
-        </p:txBody>
-      </p:sp>
-      <p:sp>
-        <p:nvSpPr>
-          <p:cNvPr id="220" name="Line"/>
-          <p:cNvSpPr/>
-          <p:nvPr/>
-        </p:nvSpPr>
-        <p:spPr>
-          <a:xfrm flipH="1" flipV="1">
-            <a:off x="6705642" y="3626660"/>
-            <a:ext cx="2890407" cy="2531621"/>
-          </a:xfrm>
-          <a:prstGeom prst="line">
-            <a:avLst/>
-          </a:prstGeom>
-          <a:ln w="25400">
-            <a:solidFill>
-              <a:srgbClr val="00F900"/>
-            </a:solidFill>
-            <a:miter lim="400000"/>
-            <a:tailEnd type="triangle"/>
-          </a:ln>
-        </p:spPr>
-        <p:txBody>
-          <a:bodyPr lIns="50800" tIns="50800" rIns="50800" bIns="50800" anchor="ctr"/>
-          <a:lstStyle/>
-          <a:p>
-            <a:pPr>
-              <a:defRPr b="0" sz="2200">
-                <a:latin typeface="+mn-lt"/>
-                <a:ea typeface="+mn-ea"/>
-                <a:cs typeface="+mn-cs"/>
-                <a:sym typeface="Helvetica Neue Medium"/>
-              </a:defRPr>
+            <a:r>
+              <a:t>Why Move At All?</a:t>
+            </a:r>
+          </a:p>
+          <a:p>
+            <a:pPr defTabSz="502412">
+              <a:defRPr sz="6880"/>
             </a:pPr>
-          </a:p>
-        </p:txBody>
-      </p:sp>
-      <p:sp>
-        <p:nvSpPr>
-          <p:cNvPr id="221" name="Line"/>
-          <p:cNvSpPr/>
-          <p:nvPr/>
-        </p:nvSpPr>
-        <p:spPr>
-          <a:xfrm flipH="1">
-            <a:off x="6700038" y="6260107"/>
-            <a:ext cx="2902228" cy="2445148"/>
-          </a:xfrm>
-          <a:prstGeom prst="line">
-            <a:avLst/>
-          </a:prstGeom>
-          <a:ln w="25400">
-            <a:solidFill>
-              <a:srgbClr val="00F900"/>
-            </a:solidFill>
-            <a:miter lim="400000"/>
-            <a:tailEnd type="triangle"/>
-          </a:ln>
-        </p:spPr>
-        <p:txBody>
-          <a:bodyPr lIns="50800" tIns="50800" rIns="50800" bIns="50800" anchor="ctr"/>
-          <a:lstStyle/>
-          <a:p>
-            <a:pPr>
-              <a:defRPr b="0" sz="2200">
-                <a:latin typeface="+mn-lt"/>
-                <a:ea typeface="+mn-ea"/>
-                <a:cs typeface="+mn-cs"/>
-                <a:sym typeface="Helvetica Neue Medium"/>
-              </a:defRPr>
+            <a:r>
+              <a:t>Or</a:t>
+            </a:r>
+          </a:p>
+          <a:p>
+            <a:pPr defTabSz="502412">
+              <a:defRPr sz="6880"/>
             </a:pPr>
-          </a:p>
-        </p:txBody>
-      </p:sp>
-      <p:sp>
-        <p:nvSpPr>
-          <p:cNvPr id="222" name="Line"/>
-          <p:cNvSpPr/>
-          <p:nvPr/>
-        </p:nvSpPr>
-        <p:spPr>
-          <a:xfrm flipH="1">
-            <a:off x="6699970" y="6335563"/>
-            <a:ext cx="2901892" cy="2643387"/>
-          </a:xfrm>
-          <a:prstGeom prst="line">
-            <a:avLst/>
-          </a:prstGeom>
-          <a:ln w="25400">
-            <a:solidFill>
-              <a:srgbClr val="00F900"/>
-            </a:solidFill>
-            <a:miter lim="400000"/>
-            <a:tailEnd type="triangle"/>
-          </a:ln>
-        </p:spPr>
-        <p:txBody>
-          <a:bodyPr lIns="50800" tIns="50800" rIns="50800" bIns="50800" anchor="ctr"/>
-          <a:lstStyle/>
-          <a:p>
-            <a:pPr>
-              <a:defRPr b="0" sz="2200">
-                <a:latin typeface="+mn-lt"/>
-                <a:ea typeface="+mn-ea"/>
-                <a:cs typeface="+mn-cs"/>
-                <a:sym typeface="Helvetica Neue Medium"/>
-              </a:defRPr>
-            </a:pPr>
-          </a:p>
-        </p:txBody>
-      </p:sp>
-      <p:sp>
-        <p:nvSpPr>
-          <p:cNvPr id="223" name="Line"/>
-          <p:cNvSpPr/>
-          <p:nvPr/>
-        </p:nvSpPr>
-        <p:spPr>
-          <a:xfrm flipH="1">
-            <a:off x="6706032" y="5268430"/>
-            <a:ext cx="2896681" cy="403360"/>
-          </a:xfrm>
-          <a:prstGeom prst="line">
-            <a:avLst/>
-          </a:prstGeom>
-          <a:ln w="25400">
-            <a:solidFill>
-              <a:schemeClr val="accent4">
-                <a:hueOff val="-624705"/>
-                <a:lumOff val="1372"/>
-              </a:schemeClr>
-            </a:solidFill>
-            <a:miter lim="400000"/>
-            <a:tailEnd type="triangle"/>
-          </a:ln>
-        </p:spPr>
-        <p:txBody>
-          <a:bodyPr lIns="50800" tIns="50800" rIns="50800" bIns="50800" anchor="ctr"/>
-          <a:lstStyle/>
-          <a:p>
-            <a:pPr>
-              <a:defRPr b="0" sz="2200">
-                <a:latin typeface="+mn-lt"/>
-                <a:ea typeface="+mn-ea"/>
-                <a:cs typeface="+mn-cs"/>
-                <a:sym typeface="Helvetica Neue Medium"/>
-              </a:defRPr>
-            </a:pPr>
-          </a:p>
-        </p:txBody>
-      </p:sp>
-      <p:sp>
-        <p:nvSpPr>
-          <p:cNvPr id="224" name="Line"/>
-          <p:cNvSpPr/>
-          <p:nvPr/>
-        </p:nvSpPr>
-        <p:spPr>
-          <a:xfrm flipH="1" flipV="1">
-            <a:off x="6767821" y="4104031"/>
-            <a:ext cx="2772383" cy="407061"/>
-          </a:xfrm>
-          <a:prstGeom prst="line">
-            <a:avLst/>
-          </a:prstGeom>
-          <a:ln w="25400">
-            <a:solidFill>
-              <a:schemeClr val="accent5"/>
-            </a:solidFill>
-            <a:miter lim="400000"/>
-            <a:tailEnd type="triangle"/>
-          </a:ln>
-        </p:spPr>
-        <p:txBody>
-          <a:bodyPr lIns="50800" tIns="50800" rIns="50800" bIns="50800" anchor="ctr"/>
-          <a:lstStyle/>
-          <a:p>
-            <a:pPr>
-              <a:defRPr b="0" sz="2200">
-                <a:latin typeface="+mn-lt"/>
-                <a:ea typeface="+mn-ea"/>
-                <a:cs typeface="+mn-cs"/>
-                <a:sym typeface="Helvetica Neue Medium"/>
-              </a:defRPr>
-            </a:pPr>
-          </a:p>
-        </p:txBody>
-      </p:sp>
-      <p:sp>
-        <p:nvSpPr>
-          <p:cNvPr id="225" name="Line"/>
-          <p:cNvSpPr/>
-          <p:nvPr/>
-        </p:nvSpPr>
-        <p:spPr>
-          <a:xfrm flipH="1">
-            <a:off x="6768177" y="4652190"/>
-            <a:ext cx="2771962" cy="461972"/>
-          </a:xfrm>
-          <a:prstGeom prst="line">
-            <a:avLst/>
-          </a:prstGeom>
-          <a:ln w="25400">
-            <a:solidFill>
-              <a:schemeClr val="accent5"/>
-            </a:solidFill>
-            <a:miter lim="400000"/>
-            <a:tailEnd type="triangle"/>
-          </a:ln>
-        </p:spPr>
-        <p:txBody>
-          <a:bodyPr lIns="50800" tIns="50800" rIns="50800" bIns="50800" anchor="ctr"/>
-          <a:lstStyle/>
-          <a:p>
-            <a:pPr>
-              <a:defRPr b="0" sz="2200">
-                <a:latin typeface="+mn-lt"/>
-                <a:ea typeface="+mn-ea"/>
-                <a:cs typeface="+mn-cs"/>
-                <a:sym typeface="Helvetica Neue Medium"/>
-              </a:defRPr>
-            </a:pPr>
-          </a:p>
-        </p:txBody>
-      </p:sp>
-      <p:sp>
-        <p:nvSpPr>
-          <p:cNvPr id="226" name="Line"/>
-          <p:cNvSpPr/>
-          <p:nvPr/>
-        </p:nvSpPr>
-        <p:spPr>
-          <a:xfrm flipH="1">
-            <a:off x="6563146" y="4548327"/>
-            <a:ext cx="2984359" cy="3716218"/>
-          </a:xfrm>
-          <a:prstGeom prst="line">
-            <a:avLst/>
-          </a:prstGeom>
-          <a:ln w="25400">
-            <a:solidFill>
-              <a:schemeClr val="accent5"/>
-            </a:solidFill>
-            <a:miter lim="400000"/>
-            <a:tailEnd type="triangle"/>
-          </a:ln>
-        </p:spPr>
-        <p:txBody>
-          <a:bodyPr lIns="50800" tIns="50800" rIns="50800" bIns="50800" anchor="ctr"/>
-          <a:lstStyle/>
-          <a:p>
-            <a:pPr>
-              <a:defRPr b="0" sz="2200">
-                <a:latin typeface="+mn-lt"/>
-                <a:ea typeface="+mn-ea"/>
-                <a:cs typeface="+mn-cs"/>
-                <a:sym typeface="Helvetica Neue Medium"/>
-              </a:defRPr>
-            </a:pPr>
-          </a:p>
-        </p:txBody>
-      </p:sp>
-      <p:sp>
-        <p:nvSpPr>
-          <p:cNvPr id="227" name="Line"/>
-          <p:cNvSpPr/>
-          <p:nvPr/>
-        </p:nvSpPr>
-        <p:spPr>
-          <a:xfrm flipH="1">
-            <a:off x="6571264" y="4586217"/>
-            <a:ext cx="2968888" cy="3155146"/>
-          </a:xfrm>
-          <a:prstGeom prst="line">
-            <a:avLst/>
-          </a:prstGeom>
-          <a:ln w="25400">
-            <a:solidFill>
-              <a:schemeClr val="accent5"/>
-            </a:solidFill>
-            <a:miter lim="400000"/>
-            <a:tailEnd type="triangle"/>
-          </a:ln>
-        </p:spPr>
-        <p:txBody>
-          <a:bodyPr lIns="50800" tIns="50800" rIns="50800" bIns="50800" anchor="ctr"/>
-          <a:lstStyle/>
-          <a:p>
-            <a:pPr>
-              <a:defRPr b="0" sz="2200">
-                <a:latin typeface="+mn-lt"/>
-                <a:ea typeface="+mn-ea"/>
-                <a:cs typeface="+mn-cs"/>
-                <a:sym typeface="Helvetica Neue Medium"/>
-              </a:defRPr>
-            </a:pPr>
-          </a:p>
-        </p:txBody>
-      </p:sp>
-      <p:sp>
-        <p:nvSpPr>
-          <p:cNvPr id="228" name="Line"/>
-          <p:cNvSpPr/>
-          <p:nvPr/>
-        </p:nvSpPr>
-        <p:spPr>
-          <a:xfrm flipH="1" flipV="1">
-            <a:off x="6657540" y="5397386"/>
-            <a:ext cx="2802119" cy="692915"/>
-          </a:xfrm>
-          <a:prstGeom prst="line">
-            <a:avLst/>
-          </a:prstGeom>
-          <a:ln w="25400">
-            <a:solidFill>
-              <a:srgbClr val="00F900"/>
-            </a:solidFill>
-            <a:miter lim="400000"/>
-            <a:tailEnd type="triangle"/>
-          </a:ln>
-        </p:spPr>
-        <p:txBody>
-          <a:bodyPr lIns="50800" tIns="50800" rIns="50800" bIns="50800" anchor="ctr"/>
-          <a:lstStyle/>
-          <a:p>
-            <a:pPr>
-              <a:defRPr b="0" sz="2200">
-                <a:latin typeface="+mn-lt"/>
-                <a:ea typeface="+mn-ea"/>
-                <a:cs typeface="+mn-cs"/>
-                <a:sym typeface="Helvetica Neue Medium"/>
-              </a:defRPr>
-            </a:pPr>
-          </a:p>
-        </p:txBody>
-      </p:sp>
-      <p:sp>
-        <p:nvSpPr>
-          <p:cNvPr id="229" name="Line"/>
-          <p:cNvSpPr/>
-          <p:nvPr/>
-        </p:nvSpPr>
-        <p:spPr>
-          <a:xfrm flipH="1">
-            <a:off x="6621857" y="6263353"/>
-            <a:ext cx="2870379" cy="1714383"/>
-          </a:xfrm>
-          <a:prstGeom prst="line">
-            <a:avLst/>
-          </a:prstGeom>
-          <a:ln w="25400">
-            <a:solidFill>
-              <a:srgbClr val="00F900"/>
-            </a:solidFill>
-            <a:miter lim="400000"/>
-            <a:tailEnd type="triangle"/>
-          </a:ln>
-        </p:spPr>
-        <p:txBody>
-          <a:bodyPr lIns="50800" tIns="50800" rIns="50800" bIns="50800" anchor="ctr"/>
-          <a:lstStyle/>
-          <a:p>
-            <a:pPr>
-              <a:defRPr b="0" sz="2200">
-                <a:latin typeface="+mn-lt"/>
-                <a:ea typeface="+mn-ea"/>
-                <a:cs typeface="+mn-cs"/>
-                <a:sym typeface="Helvetica Neue Medium"/>
-              </a:defRPr>
-            </a:pPr>
+            <a:r>
+              <a:t>The Three “B”s</a:t>
+            </a:r>
           </a:p>
         </p:txBody>
       </p:sp>
@@ -5858,33 +5274,9 @@
           <a:chExt cx="0" cy="0"/>
         </a:xfrm>
       </p:grpSpPr>
-      <p:sp>
-        <p:nvSpPr>
-          <p:cNvPr id="231" name="Burnout"/>
-          <p:cNvSpPr txBox="1"/>
-          <p:nvPr>
-            <p:ph type="title"/>
-          </p:nvPr>
-        </p:nvSpPr>
-        <p:spPr>
-          <a:prstGeom prst="rect">
-            <a:avLst/>
-          </a:prstGeom>
-        </p:spPr>
-        <p:txBody>
-          <a:bodyPr/>
-          <a:lstStyle/>
-          <a:p>
-            <a:pPr/>
-            <a:r>
-              <a:t>Burnout</a:t>
-            </a:r>
-          </a:p>
-        </p:txBody>
-      </p:sp>
       <p:pic>
         <p:nvPicPr>
-          <p:cNvPr id="232" name="maxresdefault.jpg" descr="maxresdefault.jpg"/>
+          <p:cNvPr id="217" name="Screen_Shot_2019-03-11_at_8_09_40_AM.png" descr="Screen_Shot_2019-03-11_at_8_09_40_AM.png"/>
           <p:cNvPicPr>
             <a:picLocks noChangeAspect="1"/>
           </p:cNvPicPr>
@@ -5900,8 +5292,8 @@
         </p:blipFill>
         <p:spPr>
           <a:xfrm>
-            <a:off x="1388453" y="2863804"/>
-            <a:ext cx="10227894" cy="5753192"/>
+            <a:off x="1855745" y="2227356"/>
+            <a:ext cx="4843852" cy="7018641"/>
           </a:xfrm>
           <a:prstGeom prst="rect">
             <a:avLst/>
@@ -5911,6 +5303,548 @@
           </a:ln>
         </p:spPr>
       </p:pic>
+      <p:sp>
+        <p:nvSpPr>
+          <p:cNvPr id="218" name="Bump (in salary)"/>
+          <p:cNvSpPr txBox="1"/>
+          <p:nvPr>
+            <p:ph type="title"/>
+          </p:nvPr>
+        </p:nvSpPr>
+        <p:spPr>
+          <a:prstGeom prst="rect">
+            <a:avLst/>
+          </a:prstGeom>
+        </p:spPr>
+        <p:txBody>
+          <a:bodyPr/>
+          <a:lstStyle/>
+          <a:p>
+            <a:pPr/>
+            <a:r>
+              <a:t>Bump (in salary)</a:t>
+            </a:r>
+          </a:p>
+        </p:txBody>
+      </p:sp>
+      <p:sp>
+        <p:nvSpPr>
+          <p:cNvPr id="219" name="Company Change"/>
+          <p:cNvSpPr txBox="1"/>
+          <p:nvPr/>
+        </p:nvSpPr>
+        <p:spPr>
+          <a:xfrm>
+            <a:off x="9610629" y="4232555"/>
+            <a:ext cx="2710892" cy="461060"/>
+          </a:xfrm>
+          <a:prstGeom prst="rect">
+            <a:avLst/>
+          </a:prstGeom>
+          <a:ln w="12700">
+            <a:miter lim="400000"/>
+          </a:ln>
+          <a:extLst>
+            <a:ext uri="{C572A759-6A51-4108-AA02-DFA0A04FC94B}">
+              <ma14:wrappingTextBoxFlag xmlns:ma14="http://schemas.microsoft.com/office/mac/drawingml/2011/main" val="1"/>
+            </a:ext>
+          </a:extLst>
+        </p:spPr>
+        <p:txBody>
+          <a:bodyPr wrap="none" lIns="50800" tIns="50800" rIns="50800" bIns="50800" anchor="ctr">
+            <a:spAutoFit/>
+          </a:bodyPr>
+          <a:lstStyle/>
+          <a:p>
+            <a:pPr/>
+            <a:r>
+              <a:t>Company Change</a:t>
+            </a:r>
+          </a:p>
+        </p:txBody>
+      </p:sp>
+      <p:sp>
+        <p:nvSpPr>
+          <p:cNvPr id="220" name="Position Change"/>
+          <p:cNvSpPr txBox="1"/>
+          <p:nvPr/>
+        </p:nvSpPr>
+        <p:spPr>
+          <a:xfrm>
+            <a:off x="9712432" y="5928970"/>
+            <a:ext cx="2507286" cy="461060"/>
+          </a:xfrm>
+          <a:prstGeom prst="rect">
+            <a:avLst/>
+          </a:prstGeom>
+          <a:ln w="12700">
+            <a:miter lim="400000"/>
+          </a:ln>
+          <a:extLst>
+            <a:ext uri="{C572A759-6A51-4108-AA02-DFA0A04FC94B}">
+              <ma14:wrappingTextBoxFlag xmlns:ma14="http://schemas.microsoft.com/office/mac/drawingml/2011/main" val="1"/>
+            </a:ext>
+          </a:extLst>
+        </p:spPr>
+        <p:txBody>
+          <a:bodyPr wrap="none" lIns="50800" tIns="50800" rIns="50800" bIns="50800" anchor="ctr">
+            <a:spAutoFit/>
+          </a:bodyPr>
+          <a:lstStyle/>
+          <a:p>
+            <a:pPr/>
+            <a:r>
+              <a:t>Position Change</a:t>
+            </a:r>
+          </a:p>
+        </p:txBody>
+      </p:sp>
+      <p:sp>
+        <p:nvSpPr>
+          <p:cNvPr id="221" name="Working for Self"/>
+          <p:cNvSpPr txBox="1"/>
+          <p:nvPr/>
+        </p:nvSpPr>
+        <p:spPr>
+          <a:xfrm>
+            <a:off x="9746722" y="4934713"/>
+            <a:ext cx="2438706" cy="461060"/>
+          </a:xfrm>
+          <a:prstGeom prst="rect">
+            <a:avLst/>
+          </a:prstGeom>
+          <a:ln w="12700">
+            <a:miter lim="400000"/>
+          </a:ln>
+          <a:extLst>
+            <a:ext uri="{C572A759-6A51-4108-AA02-DFA0A04FC94B}">
+              <ma14:wrappingTextBoxFlag xmlns:ma14="http://schemas.microsoft.com/office/mac/drawingml/2011/main" val="1"/>
+            </a:ext>
+          </a:extLst>
+        </p:spPr>
+        <p:txBody>
+          <a:bodyPr wrap="none" lIns="50800" tIns="50800" rIns="50800" bIns="50800" anchor="ctr">
+            <a:spAutoFit/>
+          </a:bodyPr>
+          <a:lstStyle/>
+          <a:p>
+            <a:pPr/>
+            <a:r>
+              <a:t>Working for Self</a:t>
+            </a:r>
+          </a:p>
+        </p:txBody>
+      </p:sp>
+      <p:sp>
+        <p:nvSpPr>
+          <p:cNvPr id="222" name="Line"/>
+          <p:cNvSpPr/>
+          <p:nvPr/>
+        </p:nvSpPr>
+        <p:spPr>
+          <a:xfrm flipH="1" flipV="1">
+            <a:off x="6699966" y="3359536"/>
+            <a:ext cx="2901580" cy="2810006"/>
+          </a:xfrm>
+          <a:prstGeom prst="line">
+            <a:avLst/>
+          </a:prstGeom>
+          <a:ln w="25400">
+            <a:solidFill>
+              <a:srgbClr val="00F900"/>
+            </a:solidFill>
+            <a:miter lim="400000"/>
+            <a:tailEnd type="triangle"/>
+          </a:ln>
+        </p:spPr>
+        <p:txBody>
+          <a:bodyPr lIns="50800" tIns="50800" rIns="50800" bIns="50800" anchor="ctr"/>
+          <a:lstStyle/>
+          <a:p>
+            <a:pPr>
+              <a:defRPr b="0" sz="2200">
+                <a:latin typeface="+mn-lt"/>
+                <a:ea typeface="+mn-ea"/>
+                <a:cs typeface="+mn-cs"/>
+                <a:sym typeface="Helvetica Neue Medium"/>
+              </a:defRPr>
+            </a:pPr>
+          </a:p>
+        </p:txBody>
+      </p:sp>
+      <p:sp>
+        <p:nvSpPr>
+          <p:cNvPr id="223" name="Line"/>
+          <p:cNvSpPr/>
+          <p:nvPr/>
+        </p:nvSpPr>
+        <p:spPr>
+          <a:xfrm flipH="1" flipV="1">
+            <a:off x="6705642" y="3626660"/>
+            <a:ext cx="2890407" cy="2531621"/>
+          </a:xfrm>
+          <a:prstGeom prst="line">
+            <a:avLst/>
+          </a:prstGeom>
+          <a:ln w="25400">
+            <a:solidFill>
+              <a:srgbClr val="00F900"/>
+            </a:solidFill>
+            <a:miter lim="400000"/>
+            <a:tailEnd type="triangle"/>
+          </a:ln>
+        </p:spPr>
+        <p:txBody>
+          <a:bodyPr lIns="50800" tIns="50800" rIns="50800" bIns="50800" anchor="ctr"/>
+          <a:lstStyle/>
+          <a:p>
+            <a:pPr>
+              <a:defRPr b="0" sz="2200">
+                <a:latin typeface="+mn-lt"/>
+                <a:ea typeface="+mn-ea"/>
+                <a:cs typeface="+mn-cs"/>
+                <a:sym typeface="Helvetica Neue Medium"/>
+              </a:defRPr>
+            </a:pPr>
+          </a:p>
+        </p:txBody>
+      </p:sp>
+      <p:sp>
+        <p:nvSpPr>
+          <p:cNvPr id="224" name="Line"/>
+          <p:cNvSpPr/>
+          <p:nvPr/>
+        </p:nvSpPr>
+        <p:spPr>
+          <a:xfrm flipH="1">
+            <a:off x="6700038" y="6260107"/>
+            <a:ext cx="2902228" cy="2445148"/>
+          </a:xfrm>
+          <a:prstGeom prst="line">
+            <a:avLst/>
+          </a:prstGeom>
+          <a:ln w="25400">
+            <a:solidFill>
+              <a:srgbClr val="00F900"/>
+            </a:solidFill>
+            <a:miter lim="400000"/>
+            <a:tailEnd type="triangle"/>
+          </a:ln>
+        </p:spPr>
+        <p:txBody>
+          <a:bodyPr lIns="50800" tIns="50800" rIns="50800" bIns="50800" anchor="ctr"/>
+          <a:lstStyle/>
+          <a:p>
+            <a:pPr>
+              <a:defRPr b="0" sz="2200">
+                <a:latin typeface="+mn-lt"/>
+                <a:ea typeface="+mn-ea"/>
+                <a:cs typeface="+mn-cs"/>
+                <a:sym typeface="Helvetica Neue Medium"/>
+              </a:defRPr>
+            </a:pPr>
+          </a:p>
+        </p:txBody>
+      </p:sp>
+      <p:sp>
+        <p:nvSpPr>
+          <p:cNvPr id="225" name="Line"/>
+          <p:cNvSpPr/>
+          <p:nvPr/>
+        </p:nvSpPr>
+        <p:spPr>
+          <a:xfrm flipH="1">
+            <a:off x="6699970" y="6335563"/>
+            <a:ext cx="2901892" cy="2643387"/>
+          </a:xfrm>
+          <a:prstGeom prst="line">
+            <a:avLst/>
+          </a:prstGeom>
+          <a:ln w="25400">
+            <a:solidFill>
+              <a:srgbClr val="00F900"/>
+            </a:solidFill>
+            <a:miter lim="400000"/>
+            <a:tailEnd type="triangle"/>
+          </a:ln>
+        </p:spPr>
+        <p:txBody>
+          <a:bodyPr lIns="50800" tIns="50800" rIns="50800" bIns="50800" anchor="ctr"/>
+          <a:lstStyle/>
+          <a:p>
+            <a:pPr>
+              <a:defRPr b="0" sz="2200">
+                <a:latin typeface="+mn-lt"/>
+                <a:ea typeface="+mn-ea"/>
+                <a:cs typeface="+mn-cs"/>
+                <a:sym typeface="Helvetica Neue Medium"/>
+              </a:defRPr>
+            </a:pPr>
+          </a:p>
+        </p:txBody>
+      </p:sp>
+      <p:sp>
+        <p:nvSpPr>
+          <p:cNvPr id="226" name="Line"/>
+          <p:cNvSpPr/>
+          <p:nvPr/>
+        </p:nvSpPr>
+        <p:spPr>
+          <a:xfrm flipH="1">
+            <a:off x="6706032" y="5268430"/>
+            <a:ext cx="2896681" cy="403360"/>
+          </a:xfrm>
+          <a:prstGeom prst="line">
+            <a:avLst/>
+          </a:prstGeom>
+          <a:ln w="25400">
+            <a:solidFill>
+              <a:schemeClr val="accent4">
+                <a:hueOff val="-624705"/>
+                <a:lumOff val="1372"/>
+              </a:schemeClr>
+            </a:solidFill>
+            <a:miter lim="400000"/>
+            <a:tailEnd type="triangle"/>
+          </a:ln>
+        </p:spPr>
+        <p:txBody>
+          <a:bodyPr lIns="50800" tIns="50800" rIns="50800" bIns="50800" anchor="ctr"/>
+          <a:lstStyle/>
+          <a:p>
+            <a:pPr>
+              <a:defRPr b="0" sz="2200">
+                <a:latin typeface="+mn-lt"/>
+                <a:ea typeface="+mn-ea"/>
+                <a:cs typeface="+mn-cs"/>
+                <a:sym typeface="Helvetica Neue Medium"/>
+              </a:defRPr>
+            </a:pPr>
+          </a:p>
+        </p:txBody>
+      </p:sp>
+      <p:sp>
+        <p:nvSpPr>
+          <p:cNvPr id="227" name="Line"/>
+          <p:cNvSpPr/>
+          <p:nvPr/>
+        </p:nvSpPr>
+        <p:spPr>
+          <a:xfrm flipH="1" flipV="1">
+            <a:off x="6767821" y="4104031"/>
+            <a:ext cx="2772383" cy="407061"/>
+          </a:xfrm>
+          <a:prstGeom prst="line">
+            <a:avLst/>
+          </a:prstGeom>
+          <a:ln w="25400">
+            <a:solidFill>
+              <a:schemeClr val="accent5"/>
+            </a:solidFill>
+            <a:miter lim="400000"/>
+            <a:tailEnd type="triangle"/>
+          </a:ln>
+        </p:spPr>
+        <p:txBody>
+          <a:bodyPr lIns="50800" tIns="50800" rIns="50800" bIns="50800" anchor="ctr"/>
+          <a:lstStyle/>
+          <a:p>
+            <a:pPr>
+              <a:defRPr b="0" sz="2200">
+                <a:latin typeface="+mn-lt"/>
+                <a:ea typeface="+mn-ea"/>
+                <a:cs typeface="+mn-cs"/>
+                <a:sym typeface="Helvetica Neue Medium"/>
+              </a:defRPr>
+            </a:pPr>
+          </a:p>
+        </p:txBody>
+      </p:sp>
+      <p:sp>
+        <p:nvSpPr>
+          <p:cNvPr id="228" name="Line"/>
+          <p:cNvSpPr/>
+          <p:nvPr/>
+        </p:nvSpPr>
+        <p:spPr>
+          <a:xfrm flipH="1">
+            <a:off x="6768177" y="4652190"/>
+            <a:ext cx="2771962" cy="461972"/>
+          </a:xfrm>
+          <a:prstGeom prst="line">
+            <a:avLst/>
+          </a:prstGeom>
+          <a:ln w="25400">
+            <a:solidFill>
+              <a:schemeClr val="accent5"/>
+            </a:solidFill>
+            <a:miter lim="400000"/>
+            <a:tailEnd type="triangle"/>
+          </a:ln>
+        </p:spPr>
+        <p:txBody>
+          <a:bodyPr lIns="50800" tIns="50800" rIns="50800" bIns="50800" anchor="ctr"/>
+          <a:lstStyle/>
+          <a:p>
+            <a:pPr>
+              <a:defRPr b="0" sz="2200">
+                <a:latin typeface="+mn-lt"/>
+                <a:ea typeface="+mn-ea"/>
+                <a:cs typeface="+mn-cs"/>
+                <a:sym typeface="Helvetica Neue Medium"/>
+              </a:defRPr>
+            </a:pPr>
+          </a:p>
+        </p:txBody>
+      </p:sp>
+      <p:sp>
+        <p:nvSpPr>
+          <p:cNvPr id="229" name="Line"/>
+          <p:cNvSpPr/>
+          <p:nvPr/>
+        </p:nvSpPr>
+        <p:spPr>
+          <a:xfrm flipH="1">
+            <a:off x="6563146" y="4548327"/>
+            <a:ext cx="2984359" cy="3716218"/>
+          </a:xfrm>
+          <a:prstGeom prst="line">
+            <a:avLst/>
+          </a:prstGeom>
+          <a:ln w="25400">
+            <a:solidFill>
+              <a:schemeClr val="accent5"/>
+            </a:solidFill>
+            <a:miter lim="400000"/>
+            <a:tailEnd type="triangle"/>
+          </a:ln>
+        </p:spPr>
+        <p:txBody>
+          <a:bodyPr lIns="50800" tIns="50800" rIns="50800" bIns="50800" anchor="ctr"/>
+          <a:lstStyle/>
+          <a:p>
+            <a:pPr>
+              <a:defRPr b="0" sz="2200">
+                <a:latin typeface="+mn-lt"/>
+                <a:ea typeface="+mn-ea"/>
+                <a:cs typeface="+mn-cs"/>
+                <a:sym typeface="Helvetica Neue Medium"/>
+              </a:defRPr>
+            </a:pPr>
+          </a:p>
+        </p:txBody>
+      </p:sp>
+      <p:sp>
+        <p:nvSpPr>
+          <p:cNvPr id="230" name="Line"/>
+          <p:cNvSpPr/>
+          <p:nvPr/>
+        </p:nvSpPr>
+        <p:spPr>
+          <a:xfrm flipH="1">
+            <a:off x="6571264" y="4586217"/>
+            <a:ext cx="2968888" cy="3155146"/>
+          </a:xfrm>
+          <a:prstGeom prst="line">
+            <a:avLst/>
+          </a:prstGeom>
+          <a:ln w="25400">
+            <a:solidFill>
+              <a:schemeClr val="accent5"/>
+            </a:solidFill>
+            <a:miter lim="400000"/>
+            <a:tailEnd type="triangle"/>
+          </a:ln>
+        </p:spPr>
+        <p:txBody>
+          <a:bodyPr lIns="50800" tIns="50800" rIns="50800" bIns="50800" anchor="ctr"/>
+          <a:lstStyle/>
+          <a:p>
+            <a:pPr>
+              <a:defRPr b="0" sz="2200">
+                <a:latin typeface="+mn-lt"/>
+                <a:ea typeface="+mn-ea"/>
+                <a:cs typeface="+mn-cs"/>
+                <a:sym typeface="Helvetica Neue Medium"/>
+              </a:defRPr>
+            </a:pPr>
+          </a:p>
+        </p:txBody>
+      </p:sp>
+      <p:sp>
+        <p:nvSpPr>
+          <p:cNvPr id="231" name="Line"/>
+          <p:cNvSpPr/>
+          <p:nvPr/>
+        </p:nvSpPr>
+        <p:spPr>
+          <a:xfrm flipH="1" flipV="1">
+            <a:off x="6657540" y="5397386"/>
+            <a:ext cx="2802119" cy="692915"/>
+          </a:xfrm>
+          <a:prstGeom prst="line">
+            <a:avLst/>
+          </a:prstGeom>
+          <a:ln w="25400">
+            <a:solidFill>
+              <a:srgbClr val="00F900"/>
+            </a:solidFill>
+            <a:miter lim="400000"/>
+            <a:tailEnd type="triangle"/>
+          </a:ln>
+        </p:spPr>
+        <p:txBody>
+          <a:bodyPr lIns="50800" tIns="50800" rIns="50800" bIns="50800" anchor="ctr"/>
+          <a:lstStyle/>
+          <a:p>
+            <a:pPr>
+              <a:defRPr b="0" sz="2200">
+                <a:latin typeface="+mn-lt"/>
+                <a:ea typeface="+mn-ea"/>
+                <a:cs typeface="+mn-cs"/>
+                <a:sym typeface="Helvetica Neue Medium"/>
+              </a:defRPr>
+            </a:pPr>
+          </a:p>
+        </p:txBody>
+      </p:sp>
+      <p:sp>
+        <p:nvSpPr>
+          <p:cNvPr id="232" name="Line"/>
+          <p:cNvSpPr/>
+          <p:nvPr/>
+        </p:nvSpPr>
+        <p:spPr>
+          <a:xfrm flipH="1">
+            <a:off x="6621857" y="6263353"/>
+            <a:ext cx="2870379" cy="1714383"/>
+          </a:xfrm>
+          <a:prstGeom prst="line">
+            <a:avLst/>
+          </a:prstGeom>
+          <a:ln w="25400">
+            <a:solidFill>
+              <a:srgbClr val="00F900"/>
+            </a:solidFill>
+            <a:miter lim="400000"/>
+            <a:tailEnd type="triangle"/>
+          </a:ln>
+        </p:spPr>
+        <p:txBody>
+          <a:bodyPr lIns="50800" tIns="50800" rIns="50800" bIns="50800" anchor="ctr"/>
+          <a:lstStyle/>
+          <a:p>
+            <a:pPr>
+              <a:defRPr b="0" sz="2200">
+                <a:latin typeface="+mn-lt"/>
+                <a:ea typeface="+mn-ea"/>
+                <a:cs typeface="+mn-cs"/>
+                <a:sym typeface="Helvetica Neue Medium"/>
+              </a:defRPr>
+            </a:pPr>
+          </a:p>
+        </p:txBody>
+      </p:sp>
     </p:spTree>
   </p:cSld>
   <p:clrMapOvr>
@@ -5939,7 +5873,7 @@
       </p:grpSpPr>
       <p:sp>
         <p:nvSpPr>
-          <p:cNvPr id="234" name="Boredom"/>
+          <p:cNvPr id="234" name="Burnout"/>
           <p:cNvSpPr txBox="1"/>
           <p:nvPr>
             <p:ph type="title"/>
@@ -5956,14 +5890,14 @@
           <a:p>
             <a:pPr/>
             <a:r>
-              <a:t>Boredom</a:t>
+              <a:t>Burnout</a:t>
             </a:r>
           </a:p>
         </p:txBody>
       </p:sp>
       <p:pic>
         <p:nvPicPr>
-          <p:cNvPr id="235" name="Paper.Notes.23.png" descr="Paper.Notes.23.png"/>
+          <p:cNvPr id="235" name="maxresdefault.jpg" descr="maxresdefault.jpg"/>
           <p:cNvPicPr>
             <a:picLocks noChangeAspect="1"/>
           </p:cNvPicPr>
@@ -5973,45 +5907,14 @@
           <a:blip r:embed="rId2">
             <a:extLst/>
           </a:blip>
-          <a:srcRect l="5534" t="60098" r="74366" b="19061"/>
           <a:stretch>
             <a:fillRect/>
           </a:stretch>
         </p:blipFill>
         <p:spPr>
           <a:xfrm>
-            <a:off x="7183866" y="5262102"/>
-            <a:ext cx="5247083" cy="4080301"/>
-          </a:xfrm>
-          <a:prstGeom prst="rect">
-            <a:avLst/>
-          </a:prstGeom>
-          <a:ln w="12700">
-            <a:miter lim="400000"/>
-          </a:ln>
-        </p:spPr>
-      </p:pic>
-      <p:pic>
-        <p:nvPicPr>
-          <p:cNvPr id="236" name="Paper.Notes.23.png" descr="Paper.Notes.23.png"/>
-          <p:cNvPicPr>
-            <a:picLocks noChangeAspect="1"/>
-          </p:cNvPicPr>
-          <p:nvPr/>
-        </p:nvPicPr>
-        <p:blipFill>
-          <a:blip r:embed="rId3">
-            <a:extLst/>
-          </a:blip>
-          <a:srcRect l="6380" t="30624" r="64299" b="45229"/>
-          <a:stretch>
-            <a:fillRect/>
-          </a:stretch>
-        </p:blipFill>
-        <p:spPr>
-          <a:xfrm>
-            <a:off x="565827" y="2579215"/>
-            <a:ext cx="6067718" cy="3747677"/>
+            <a:off x="1388453" y="2863804"/>
+            <a:ext cx="10227894" cy="5753192"/>
           </a:xfrm>
           <a:prstGeom prst="rect">
             <a:avLst/>
@@ -6049,17 +5952,13 @@
       </p:grpSpPr>
       <p:sp>
         <p:nvSpPr>
-          <p:cNvPr id="238" name="–Peter Diamandis…"/>
+          <p:cNvPr id="237" name="Boredom"/>
           <p:cNvSpPr txBox="1"/>
           <p:nvPr>
-            <p:ph type="body" idx="13"/>
+            <p:ph type="title"/>
           </p:nvPr>
         </p:nvSpPr>
         <p:spPr>
-          <a:xfrm>
-            <a:off x="1270000" y="6362700"/>
-            <a:ext cx="10464800" cy="829666"/>
-          </a:xfrm>
           <a:prstGeom prst="rect">
             <a:avLst/>
           </a:prstGeom>
@@ -6070,37 +5969,107 @@
           <a:p>
             <a:pPr/>
             <a:r>
-              <a:t>–Peter Diamandis</a:t>
-            </a:r>
-          </a:p>
-          <a:p>
-            <a:pPr/>
-            <a:r>
-              <a:t>Co-founder and Executive Chairman of Singularity University</a:t>
-            </a:r>
-          </a:p>
-        </p:txBody>
-      </p:sp>
-      <p:sp>
-        <p:nvSpPr>
-          <p:cNvPr id="239" name="“If you don’t disrupt yourself, somebody else will”"/>
+              <a:t>Boredom</a:t>
+            </a:r>
+          </a:p>
+        </p:txBody>
+      </p:sp>
+      <p:pic>
+        <p:nvPicPr>
+          <p:cNvPr id="238" name="Paper.Notes.23.png" descr="Paper.Notes.23.png"/>
+          <p:cNvPicPr>
+            <a:picLocks noChangeAspect="1"/>
+          </p:cNvPicPr>
+          <p:nvPr/>
+        </p:nvPicPr>
+        <p:blipFill>
+          <a:blip r:embed="rId2">
+            <a:extLst/>
+          </a:blip>
+          <a:srcRect l="5534" t="60098" r="74366" b="19061"/>
+          <a:stretch>
+            <a:fillRect/>
+          </a:stretch>
+        </p:blipFill>
+        <p:spPr>
+          <a:xfrm>
+            <a:off x="7183866" y="5262102"/>
+            <a:ext cx="5247083" cy="4080301"/>
+          </a:xfrm>
+          <a:prstGeom prst="rect">
+            <a:avLst/>
+          </a:prstGeom>
+          <a:ln w="12700">
+            <a:miter lim="400000"/>
+          </a:ln>
+        </p:spPr>
+      </p:pic>
+      <p:pic>
+        <p:nvPicPr>
+          <p:cNvPr id="239" name="Paper.Notes.23.png" descr="Paper.Notes.23.png"/>
+          <p:cNvPicPr>
+            <a:picLocks noChangeAspect="1"/>
+          </p:cNvPicPr>
+          <p:nvPr/>
+        </p:nvPicPr>
+        <p:blipFill>
+          <a:blip r:embed="rId3">
+            <a:extLst/>
+          </a:blip>
+          <a:srcRect l="6380" t="30624" r="64299" b="45229"/>
+          <a:stretch>
+            <a:fillRect/>
+          </a:stretch>
+        </p:blipFill>
+        <p:spPr>
+          <a:xfrm>
+            <a:off x="565827" y="2579215"/>
+            <a:ext cx="6067718" cy="3747677"/>
+          </a:xfrm>
+          <a:prstGeom prst="rect">
+            <a:avLst/>
+          </a:prstGeom>
+          <a:ln w="12700">
+            <a:miter lim="400000"/>
+          </a:ln>
+        </p:spPr>
+      </p:pic>
+      <p:sp>
+        <p:nvSpPr>
+          <p:cNvPr id="240" name="“Disrupt yourself”, by Whitney Johnson"/>
           <p:cNvSpPr txBox="1"/>
-          <p:nvPr>
-            <p:ph type="body" idx="14"/>
-          </p:nvPr>
-        </p:nvSpPr>
-        <p:spPr>
-          <a:prstGeom prst="rect">
-            <a:avLst/>
-          </a:prstGeom>
-        </p:spPr>
-        <p:txBody>
-          <a:bodyPr/>
-          <a:lstStyle/>
-          <a:p>
-            <a:pPr/>
-            <a:r>
-              <a:t>“If you don’t disrupt yourself, somebody else will” </a:t>
+          <p:nvPr/>
+        </p:nvSpPr>
+        <p:spPr>
+          <a:xfrm>
+            <a:off x="196897" y="9066895"/>
+            <a:ext cx="4120059" cy="374600"/>
+          </a:xfrm>
+          <a:prstGeom prst="rect">
+            <a:avLst/>
+          </a:prstGeom>
+          <a:ln w="12700">
+            <a:miter lim="400000"/>
+          </a:ln>
+          <a:extLst>
+            <a:ext uri="{C572A759-6A51-4108-AA02-DFA0A04FC94B}">
+              <ma14:wrappingTextBoxFlag xmlns:ma14="http://schemas.microsoft.com/office/mac/drawingml/2011/main" val="1"/>
+            </a:ext>
+          </a:extLst>
+        </p:spPr>
+        <p:txBody>
+          <a:bodyPr wrap="none" lIns="50800" tIns="50800" rIns="50800" bIns="50800" anchor="ctr">
+            <a:spAutoFit/>
+          </a:bodyPr>
+          <a:lstStyle>
+            <a:lvl1pPr>
+              <a:defRPr b="0" sz="1800"/>
+            </a:lvl1pPr>
+          </a:lstStyle>
+          <a:p>
+            <a:pPr/>
+            <a:r>
+              <a:t>“Disrupt yourself”, by Whitney Johnson</a:t>
             </a:r>
           </a:p>
         </p:txBody>
@@ -6133,14 +6102,98 @@
       </p:grpSpPr>
       <p:sp>
         <p:nvSpPr>
-          <p:cNvPr id="241" name="So disrupt yourself on your terms and plan it like a chess move"/>
+          <p:cNvPr id="242" name="–Peter Diamandis…"/>
+          <p:cNvSpPr txBox="1"/>
+          <p:nvPr>
+            <p:ph type="body" idx="13"/>
+          </p:nvPr>
+        </p:nvSpPr>
+        <p:spPr>
+          <a:xfrm>
+            <a:off x="1270000" y="6362700"/>
+            <a:ext cx="10464800" cy="829666"/>
+          </a:xfrm>
+          <a:prstGeom prst="rect">
+            <a:avLst/>
+          </a:prstGeom>
+        </p:spPr>
+        <p:txBody>
+          <a:bodyPr/>
+          <a:lstStyle/>
+          <a:p>
+            <a:pPr/>
+            <a:r>
+              <a:t>–Peter Diamandis</a:t>
+            </a:r>
+          </a:p>
+          <a:p>
+            <a:pPr/>
+            <a:r>
+              <a:t>Co-founder and Executive Chairman of Singularity University</a:t>
+            </a:r>
+          </a:p>
+        </p:txBody>
+      </p:sp>
+      <p:sp>
+        <p:nvSpPr>
+          <p:cNvPr id="243" name="“If you don’t disrupt yourself, somebody else will”"/>
+          <p:cNvSpPr txBox="1"/>
+          <p:nvPr>
+            <p:ph type="body" idx="14"/>
+          </p:nvPr>
+        </p:nvSpPr>
+        <p:spPr>
+          <a:prstGeom prst="rect">
+            <a:avLst/>
+          </a:prstGeom>
+        </p:spPr>
+        <p:txBody>
+          <a:bodyPr/>
+          <a:lstStyle/>
+          <a:p>
+            <a:pPr/>
+            <a:r>
+              <a:t>“If you don’t disrupt yourself, somebody else will” </a:t>
+            </a:r>
+          </a:p>
+        </p:txBody>
+      </p:sp>
+    </p:spTree>
+  </p:cSld>
+  <p:clrMapOvr>
+    <a:masterClrMapping/>
+  </p:clrMapOvr>
+  <p:transition xmlns:p14="http://schemas.microsoft.com/office/powerpoint/2010/main" spd="med" advClick="1"/>
+</p:sld>
+</file>
+
+<file path=ppt/slides/slide27.xml><?xml version="1.0" encoding="utf-8"?>
+<p:sld xmlns:a="http://schemas.openxmlformats.org/drawingml/2006/main" xmlns:r="http://schemas.openxmlformats.org/officeDocument/2006/relationships" xmlns:p="http://schemas.openxmlformats.org/presentationml/2006/main" xmlns:m="http://schemas.openxmlformats.org/officeDocument/2006/math" xmlns:a14="http://schemas.microsoft.com/office/drawing/2010/main" showMasterSp="1" showMasterPhAnim="1">
+  <p:cSld>
+    <p:spTree>
+      <p:nvGrpSpPr>
+        <p:cNvPr id="1" name=""/>
+        <p:cNvGrpSpPr/>
+        <p:nvPr/>
+      </p:nvGrpSpPr>
+      <p:grpSpPr>
+        <a:xfrm>
+          <a:off x="0" y="0"/>
+          <a:ext cx="0" cy="0"/>
+          <a:chOff x="0" y="0"/>
+          <a:chExt cx="0" cy="0"/>
+        </a:xfrm>
+      </p:grpSpPr>
+      <p:sp>
+        <p:nvSpPr>
+          <p:cNvPr id="245" name="So disrupt yourself"/>
           <p:cNvSpPr txBox="1"/>
           <p:nvPr/>
         </p:nvSpPr>
         <p:spPr>
           <a:xfrm>
-            <a:off x="1884984" y="4646270"/>
-            <a:ext cx="9234832" cy="461060"/>
+            <a:off x="5203545" y="2979262"/>
+            <a:ext cx="2851710" cy="461060"/>
           </a:xfrm>
           <a:prstGeom prst="rect">
             <a:avLst/>
@@ -6162,7 +6215,79 @@
           <a:p>
             <a:pPr/>
             <a:r>
-              <a:t>So disrupt yourself on your terms and plan it like a chess move</a:t>
+              <a:t>So disrupt yourself</a:t>
+            </a:r>
+          </a:p>
+        </p:txBody>
+      </p:sp>
+      <p:sp>
+        <p:nvSpPr>
+          <p:cNvPr id="246" name="on your terms"/>
+          <p:cNvSpPr txBox="1"/>
+          <p:nvPr/>
+        </p:nvSpPr>
+        <p:spPr>
+          <a:xfrm>
+            <a:off x="5561837" y="4179623"/>
+            <a:ext cx="2135125" cy="461060"/>
+          </a:xfrm>
+          <a:prstGeom prst="rect">
+            <a:avLst/>
+          </a:prstGeom>
+          <a:ln w="12700">
+            <a:miter lim="400000"/>
+          </a:ln>
+          <a:extLst>
+            <a:ext uri="{C572A759-6A51-4108-AA02-DFA0A04FC94B}">
+              <ma14:wrappingTextBoxFlag xmlns:ma14="http://schemas.microsoft.com/office/mac/drawingml/2011/main" val="1"/>
+            </a:ext>
+          </a:extLst>
+        </p:spPr>
+        <p:txBody>
+          <a:bodyPr wrap="none" lIns="50800" tIns="50800" rIns="50800" bIns="50800" anchor="ctr">
+            <a:spAutoFit/>
+          </a:bodyPr>
+          <a:lstStyle/>
+          <a:p>
+            <a:pPr/>
+            <a:r>
+              <a:t>on your terms</a:t>
+            </a:r>
+          </a:p>
+        </p:txBody>
+      </p:sp>
+      <p:sp>
+        <p:nvSpPr>
+          <p:cNvPr id="247" name="and plan it like a chess move"/>
+          <p:cNvSpPr txBox="1"/>
+          <p:nvPr/>
+        </p:nvSpPr>
+        <p:spPr>
+          <a:xfrm>
+            <a:off x="4475835" y="5379985"/>
+            <a:ext cx="4307130" cy="461059"/>
+          </a:xfrm>
+          <a:prstGeom prst="rect">
+            <a:avLst/>
+          </a:prstGeom>
+          <a:ln w="12700">
+            <a:miter lim="400000"/>
+          </a:ln>
+          <a:extLst>
+            <a:ext uri="{C572A759-6A51-4108-AA02-DFA0A04FC94B}">
+              <ma14:wrappingTextBoxFlag xmlns:ma14="http://schemas.microsoft.com/office/mac/drawingml/2011/main" val="1"/>
+            </a:ext>
+          </a:extLst>
+        </p:spPr>
+        <p:txBody>
+          <a:bodyPr wrap="none" lIns="50800" tIns="50800" rIns="50800" bIns="50800" anchor="ctr">
+            <a:spAutoFit/>
+          </a:bodyPr>
+          <a:lstStyle/>
+          <a:p>
+            <a:pPr/>
+            <a:r>
+              <a:t>and plan it like a chess move</a:t>
             </a:r>
           </a:p>
         </p:txBody>
@@ -6173,6 +6298,312 @@
     <a:masterClrMapping/>
   </p:clrMapOvr>
   <p:transition xmlns:p14="http://schemas.microsoft.com/office/powerpoint/2010/main" spd="med" advClick="1"/>
+  <p:timing>
+    <p:tnLst>
+      <p:par>
+        <p:cTn id="1" nodeType="tmRoot" restart="never" dur="indefinite" fill="hold">
+          <p:childTnLst>
+            <p:seq concurrent="1" prevAc="none" nextAc="seek">
+              <p:cTn id="2" nodeType="mainSeq" dur="indefinite" fill="hold">
+                <p:childTnLst>
+                  <p:par>
+                    <p:cTn id="3" fill="hold">
+                      <p:stCondLst>
+                        <p:cond delay="indefinite"/>
+                      </p:stCondLst>
+                      <p:childTnLst>
+                        <p:par>
+                          <p:cTn id="4" fill="hold">
+                            <p:stCondLst>
+                              <p:cond delay="0"/>
+                            </p:stCondLst>
+                            <p:childTnLst>
+                              <p:par>
+                                <p:cTn id="5" presetClass="entr" nodeType="clickEffect" presetSubtype="0" presetID="1" grpId="1" fill="hold">
+                                  <p:stCondLst>
+                                    <p:cond delay="0"/>
+                                  </p:stCondLst>
+                                  <p:iterate type="el" backwards="0">
+                                    <p:tmAbs val="0"/>
+                                  </p:iterate>
+                                  <p:childTnLst>
+                                    <p:set>
+                                      <p:cBhvr>
+                                        <p:cTn id="6" fill="hold"/>
+                                        <p:tgtEl>
+                                          <p:spTgt spid="245"/>
+                                        </p:tgtEl>
+                                        <p:attrNameLst>
+                                          <p:attrName>style.visibility</p:attrName>
+                                        </p:attrNameLst>
+                                      </p:cBhvr>
+                                      <p:to>
+                                        <p:strVal val="visible"/>
+                                      </p:to>
+                                    </p:set>
+                                  </p:childTnLst>
+                                </p:cTn>
+                              </p:par>
+                            </p:childTnLst>
+                          </p:cTn>
+                        </p:par>
+                      </p:childTnLst>
+                    </p:cTn>
+                  </p:par>
+                  <p:par>
+                    <p:cTn id="7" fill="hold">
+                      <p:stCondLst>
+                        <p:cond delay="indefinite"/>
+                      </p:stCondLst>
+                      <p:childTnLst>
+                        <p:par>
+                          <p:cTn id="8" fill="hold">
+                            <p:stCondLst>
+                              <p:cond delay="0"/>
+                            </p:stCondLst>
+                            <p:childTnLst>
+                              <p:par>
+                                <p:cTn id="9" presetClass="entr" nodeType="clickEffect" presetSubtype="0" presetID="1" grpId="2" fill="hold">
+                                  <p:stCondLst>
+                                    <p:cond delay="0"/>
+                                  </p:stCondLst>
+                                  <p:iterate type="el" backwards="0">
+                                    <p:tmAbs val="0"/>
+                                  </p:iterate>
+                                  <p:childTnLst>
+                                    <p:set>
+                                      <p:cBhvr>
+                                        <p:cTn id="10" fill="hold"/>
+                                        <p:tgtEl>
+                                          <p:spTgt spid="246"/>
+                                        </p:tgtEl>
+                                        <p:attrNameLst>
+                                          <p:attrName>style.visibility</p:attrName>
+                                        </p:attrNameLst>
+                                      </p:cBhvr>
+                                      <p:to>
+                                        <p:strVal val="visible"/>
+                                      </p:to>
+                                    </p:set>
+                                  </p:childTnLst>
+                                </p:cTn>
+                              </p:par>
+                            </p:childTnLst>
+                          </p:cTn>
+                        </p:par>
+                      </p:childTnLst>
+                    </p:cTn>
+                  </p:par>
+                  <p:par>
+                    <p:cTn id="11" fill="hold">
+                      <p:stCondLst>
+                        <p:cond delay="indefinite"/>
+                      </p:stCondLst>
+                      <p:childTnLst>
+                        <p:par>
+                          <p:cTn id="12" fill="hold">
+                            <p:stCondLst>
+                              <p:cond delay="0"/>
+                            </p:stCondLst>
+                            <p:childTnLst>
+                              <p:par>
+                                <p:cTn id="13" presetClass="entr" nodeType="clickEffect" presetSubtype="0" presetID="1" grpId="3" fill="hold">
+                                  <p:stCondLst>
+                                    <p:cond delay="0"/>
+                                  </p:stCondLst>
+                                  <p:iterate type="el" backwards="0">
+                                    <p:tmAbs val="0"/>
+                                  </p:iterate>
+                                  <p:childTnLst>
+                                    <p:set>
+                                      <p:cBhvr>
+                                        <p:cTn id="14" fill="hold"/>
+                                        <p:tgtEl>
+                                          <p:spTgt spid="247"/>
+                                        </p:tgtEl>
+                                        <p:attrNameLst>
+                                          <p:attrName>style.visibility</p:attrName>
+                                        </p:attrNameLst>
+                                      </p:cBhvr>
+                                      <p:to>
+                                        <p:strVal val="visible"/>
+                                      </p:to>
+                                    </p:set>
+                                  </p:childTnLst>
+                                </p:cTn>
+                              </p:par>
+                            </p:childTnLst>
+                          </p:cTn>
+                        </p:par>
+                      </p:childTnLst>
+                    </p:cTn>
+                  </p:par>
+                </p:childTnLst>
+              </p:cTn>
+              <p:prevCondLst>
+                <p:cond evt="onPrev">
+                  <p:tgtEl>
+                    <p:sldTgt/>
+                  </p:tgtEl>
+                </p:cond>
+              </p:prevCondLst>
+              <p:nextCondLst>
+                <p:cond evt="onNext">
+                  <p:tgtEl>
+                    <p:sldTgt/>
+                  </p:tgtEl>
+                </p:cond>
+              </p:nextCondLst>
+            </p:seq>
+          </p:childTnLst>
+        </p:cTn>
+      </p:par>
+    </p:tnLst>
+    <p:bldLst>
+      <p:bldP build="whole" bldLvl="1" animBg="1" rev="0" advAuto="0" spid="247" grpId="3"/>
+      <p:bldP build="whole" bldLvl="1" animBg="1" rev="0" advAuto="0" spid="246" grpId="2"/>
+      <p:bldP build="whole" bldLvl="1" animBg="1" rev="0" advAuto="0" spid="245" grpId="1"/>
+    </p:bldLst>
+  </p:timing>
+</p:sld>
+</file>
+
+<file path=ppt/slides/slide28.xml><?xml version="1.0" encoding="utf-8"?>
+<p:sld xmlns:a="http://schemas.openxmlformats.org/drawingml/2006/main" xmlns:r="http://schemas.openxmlformats.org/officeDocument/2006/relationships" xmlns:p="http://schemas.openxmlformats.org/presentationml/2006/main" xmlns:m="http://schemas.openxmlformats.org/officeDocument/2006/math" xmlns:a14="http://schemas.microsoft.com/office/drawing/2010/main" showMasterSp="1" showMasterPhAnim="1">
+  <p:cSld>
+    <p:spTree>
+      <p:nvGrpSpPr>
+        <p:cNvPr id="1" name=""/>
+        <p:cNvGrpSpPr/>
+        <p:nvPr/>
+      </p:nvGrpSpPr>
+      <p:grpSpPr>
+        <a:xfrm>
+          <a:off x="0" y="0"/>
+          <a:ext cx="0" cy="0"/>
+          <a:chOff x="0" y="0"/>
+          <a:chExt cx="0" cy="0"/>
+        </a:xfrm>
+      </p:grpSpPr>
+      <p:sp>
+        <p:nvSpPr>
+          <p:cNvPr id="249" name="Thank You"/>
+          <p:cNvSpPr txBox="1"/>
+          <p:nvPr/>
+        </p:nvSpPr>
+        <p:spPr>
+          <a:xfrm>
+            <a:off x="5685840" y="4646270"/>
+            <a:ext cx="1633120" cy="461060"/>
+          </a:xfrm>
+          <a:prstGeom prst="rect">
+            <a:avLst/>
+          </a:prstGeom>
+          <a:ln w="12700">
+            <a:miter lim="400000"/>
+          </a:ln>
+          <a:extLst>
+            <a:ext uri="{C572A759-6A51-4108-AA02-DFA0A04FC94B}">
+              <ma14:wrappingTextBoxFlag xmlns:ma14="http://schemas.microsoft.com/office/mac/drawingml/2011/main" val="1"/>
+            </a:ext>
+          </a:extLst>
+        </p:spPr>
+        <p:txBody>
+          <a:bodyPr wrap="none" lIns="50800" tIns="50800" rIns="50800" bIns="50800" anchor="ctr">
+            <a:spAutoFit/>
+          </a:bodyPr>
+          <a:lstStyle/>
+          <a:p>
+            <a:pPr/>
+            <a:r>
+              <a:t>Thank You</a:t>
+            </a:r>
+          </a:p>
+        </p:txBody>
+      </p:sp>
+    </p:spTree>
+  </p:cSld>
+  <p:clrMapOvr>
+    <a:masterClrMapping/>
+  </p:clrMapOvr>
+  <p:transition xmlns:p14="http://schemas.microsoft.com/office/powerpoint/2010/main" spd="med" advClick="1"/>
+  <p:timing>
+    <p:tnLst>
+      <p:par>
+        <p:cTn id="1" nodeType="tmRoot" restart="never" dur="indefinite" fill="hold">
+          <p:childTnLst>
+            <p:seq concurrent="1" prevAc="none" nextAc="seek">
+              <p:cTn id="2" nodeType="mainSeq" dur="indefinite" fill="hold">
+                <p:childTnLst>
+                  <p:par>
+                    <p:cTn id="3" fill="hold">
+                      <p:stCondLst>
+                        <p:cond delay="indefinite"/>
+                      </p:stCondLst>
+                      <p:childTnLst>
+                        <p:par>
+                          <p:cTn id="4" fill="hold">
+                            <p:stCondLst>
+                              <p:cond delay="0"/>
+                            </p:stCondLst>
+                            <p:childTnLst>
+                              <p:par>
+                                <p:cTn id="5" presetClass="entr" nodeType="clickEffect" presetSubtype="0" presetID="1" grpId="1" fill="hold">
+                                  <p:stCondLst>
+                                    <p:cond delay="0"/>
+                                  </p:stCondLst>
+                                  <p:iterate type="el" backwards="0">
+                                    <p:tmAbs val="0"/>
+                                  </p:iterate>
+                                  <p:childTnLst>
+                                    <p:set>
+                                      <p:cBhvr>
+                                        <p:cTn id="6" fill="hold"/>
+                                        <p:tgtEl>
+                                          <p:spTgt spid="249"/>
+                                        </p:tgtEl>
+                                        <p:attrNameLst>
+                                          <p:attrName>style.visibility</p:attrName>
+                                        </p:attrNameLst>
+                                      </p:cBhvr>
+                                      <p:to>
+                                        <p:strVal val="visible"/>
+                                      </p:to>
+                                    </p:set>
+                                  </p:childTnLst>
+                                </p:cTn>
+                              </p:par>
+                            </p:childTnLst>
+                          </p:cTn>
+                        </p:par>
+                      </p:childTnLst>
+                    </p:cTn>
+                  </p:par>
+                </p:childTnLst>
+              </p:cTn>
+              <p:prevCondLst>
+                <p:cond evt="onPrev">
+                  <p:tgtEl>
+                    <p:sldTgt/>
+                  </p:tgtEl>
+                </p:cond>
+              </p:prevCondLst>
+              <p:nextCondLst>
+                <p:cond evt="onNext">
+                  <p:tgtEl>
+                    <p:sldTgt/>
+                  </p:tgtEl>
+                </p:cond>
+              </p:nextCondLst>
+            </p:seq>
+          </p:childTnLst>
+        </p:cTn>
+      </p:par>
+    </p:tnLst>
+    <p:bldLst>
+      <p:bldP build="whole" bldLvl="1" animBg="1" rev="0" advAuto="0" spid="249" grpId="1"/>
+    </p:bldLst>
+  </p:timing>
 </p:sld>
 </file>
 
@@ -6931,7 +7362,7 @@
       </p:grpSpPr>
       <p:pic>
         <p:nvPicPr>
-          <p:cNvPr id="153" name="Screen Shot 2019-03-15 at 8.54.27 AM.png" descr="Screen Shot 2019-03-15 at 8.54.27 AM.png"/>
+          <p:cNvPr id="153" name="Map-Your-Career-mind-map.jpg" descr="Map-Your-Career-mind-map.jpg"/>
           <p:cNvPicPr>
             <a:picLocks noChangeAspect="0"/>
           </p:cNvPicPr>
@@ -6943,7 +7374,7 @@
           <a:blip r:embed="rId2">
             <a:extLst/>
           </a:blip>
-          <a:srcRect l="5880" t="0" r="5880" b="0"/>
+          <a:srcRect l="27063" t="0" r="27063" b="0"/>
           <a:stretch>
             <a:fillRect/>
           </a:stretch>
@@ -6951,7 +7382,7 @@
         <p:spPr>
           <a:xfrm>
             <a:off x="6718300" y="638919"/>
-            <a:ext cx="5334001" cy="8216901"/>
+            <a:ext cx="5334000" cy="8216901"/>
           </a:xfrm>
           <a:prstGeom prst="rect">
             <a:avLst/>
@@ -6960,7 +7391,7 @@
       </p:pic>
       <p:sp>
         <p:nvSpPr>
-          <p:cNvPr id="154" name="From/To &amp; Interviewing"/>
+          <p:cNvPr id="154" name="Personal Experience Map"/>
           <p:cNvSpPr txBox="1"/>
           <p:nvPr>
             <p:ph type="title"/>
@@ -6977,7 +7408,7 @@
           <a:p>
             <a:pPr/>
             <a:r>
-              <a:t>From/To &amp; Interviewing</a:t>
+              <a:t>Personal Experience Map</a:t>
             </a:r>
           </a:p>
         </p:txBody>
@@ -7031,7 +7462,7 @@
       </p:grpSpPr>
       <p:sp>
         <p:nvSpPr>
-          <p:cNvPr id="157" name="From/To"/>
+          <p:cNvPr id="157" name="Experiences"/>
           <p:cNvSpPr txBox="1"/>
           <p:nvPr>
             <p:ph type="title"/>
@@ -7048,23 +7479,23 @@
           <a:p>
             <a:pPr/>
             <a:r>
-              <a:t>From/To</a:t>
-            </a:r>
-          </a:p>
-        </p:txBody>
-      </p:sp>
-      <p:sp>
-        <p:nvSpPr>
-          <p:cNvPr id="158" name="Start with:…"/>
+              <a:t>Experiences</a:t>
+            </a:r>
+          </a:p>
+        </p:txBody>
+      </p:sp>
+      <p:sp>
+        <p:nvSpPr>
+          <p:cNvPr id="158" name="Two types of experience…"/>
           <p:cNvSpPr txBox="1"/>
           <p:nvPr>
-            <p:ph type="body" idx="1"/>
+            <p:ph type="body" sz="half" idx="1"/>
           </p:nvPr>
         </p:nvSpPr>
         <p:spPr>
           <a:xfrm>
             <a:off x="952500" y="2590800"/>
-            <a:ext cx="11099800" cy="5223258"/>
+            <a:ext cx="11099800" cy="2779478"/>
           </a:xfrm>
           <a:prstGeom prst="rect">
             <a:avLst/>
@@ -7074,88 +7505,109 @@
           <a:bodyPr/>
           <a:lstStyle/>
           <a:p>
-            <a:pPr marL="0" indent="0">
-              <a:buSzTx/>
-              <a:buNone/>
+            <a:pPr marL="312039" indent="-312039" defTabSz="531622">
+              <a:spcBef>
+                <a:spcPts val="2900"/>
+              </a:spcBef>
+              <a:defRPr sz="2548"/>
             </a:pPr>
             <a:r>
-              <a:t>Start with:</a:t>
-            </a:r>
-          </a:p>
-          <a:p>
-            <a:pPr lvl="1"/>
-            <a:r>
-              <a:t>What is your </a:t>
-            </a:r>
-            <a:r>
-              <a:rPr b="1">
-                <a:solidFill>
-                  <a:srgbClr val="FFFB00"/>
-                </a:solidFill>
-              </a:rPr>
-              <a:t>next</a:t>
-            </a:r>
-            <a:r>
-              <a:t> move?</a:t>
-            </a:r>
-          </a:p>
-          <a:p>
-            <a:pPr lvl="1"/>
-            <a:r>
-              <a:t>What </a:t>
-            </a:r>
-            <a:r>
-              <a:rPr b="1">
-                <a:solidFill>
-                  <a:srgbClr val="FFFB00"/>
-                </a:solidFill>
-              </a:rPr>
-              <a:t>experience</a:t>
-            </a:r>
-            <a:r>
-              <a:t> do you want next?</a:t>
-            </a:r>
-          </a:p>
-          <a:p>
-            <a:pPr lvl="1"/>
-            <a:r>
-              <a:t>What </a:t>
-            </a:r>
-            <a:r>
-              <a:rPr b="1">
-                <a:solidFill>
-                  <a:srgbClr val="FFFB00"/>
-                </a:solidFill>
-              </a:rPr>
-              <a:t>technology</a:t>
-            </a:r>
-            <a:r>
-              <a:t> do you want to learn?</a:t>
-            </a:r>
-          </a:p>
-          <a:p>
-            <a:pPr lvl="1"/>
-            <a:r>
-              <a:t>What </a:t>
-            </a:r>
-            <a:r>
-              <a:rPr b="1">
-                <a:solidFill>
-                  <a:schemeClr val="accent4">
-                    <a:hueOff val="468000"/>
-                    <a:satOff val="-4761"/>
-                    <a:lumOff val="10196"/>
-                  </a:schemeClr>
-                </a:solidFill>
-              </a:rPr>
-              <a:t>industry</a:t>
-            </a:r>
-            <a:r>
-              <a:t> looks interesting or could help you grow?</a:t>
-            </a:r>
-          </a:p>
-        </p:txBody>
-      </p:sp>
+              <a:t>Two types of experience</a:t>
+            </a:r>
+          </a:p>
+          <a:p>
+            <a:pPr lvl="1" marL="624078" indent="-312039" defTabSz="531622">
+              <a:spcBef>
+                <a:spcPts val="2900"/>
+              </a:spcBef>
+              <a:defRPr sz="2548"/>
+            </a:pPr>
+            <a:r>
+              <a:t>Functional: Show competency in skills</a:t>
+            </a:r>
+          </a:p>
+          <a:p>
+            <a:pPr lvl="1" marL="624078" indent="-312039" defTabSz="531622">
+              <a:spcBef>
+                <a:spcPts val="2900"/>
+              </a:spcBef>
+              <a:defRPr sz="2548"/>
+            </a:pPr>
+            <a:r>
+              <a:t>Management: Show how you perform in situations</a:t>
+            </a:r>
+          </a:p>
+          <a:p>
+            <a:pPr marL="312039" indent="-312039" defTabSz="531622">
+              <a:spcBef>
+                <a:spcPts val="2900"/>
+              </a:spcBef>
+              <a:defRPr sz="2548"/>
+            </a:pPr>
+            <a:r>
+              <a:t>How do you find out what experiences to go after? You ask someone</a:t>
+            </a:r>
+          </a:p>
+        </p:txBody>
+      </p:sp>
+      <p:pic>
+        <p:nvPicPr>
+          <p:cNvPr id="159" name="images.jpeg" descr="images.jpeg"/>
+          <p:cNvPicPr>
+            <a:picLocks noChangeAspect="1"/>
+          </p:cNvPicPr>
+          <p:nvPr/>
+        </p:nvPicPr>
+        <p:blipFill>
+          <a:blip r:embed="rId2">
+            <a:extLst/>
+          </a:blip>
+          <a:stretch>
+            <a:fillRect/>
+          </a:stretch>
+        </p:blipFill>
+        <p:spPr>
+          <a:xfrm>
+            <a:off x="7217484" y="5548077"/>
+            <a:ext cx="4584440" cy="3377088"/>
+          </a:xfrm>
+          <a:prstGeom prst="rect">
+            <a:avLst/>
+          </a:prstGeom>
+          <a:ln w="12700">
+            <a:miter lim="400000"/>
+          </a:ln>
+        </p:spPr>
+      </p:pic>
+      <p:pic>
+        <p:nvPicPr>
+          <p:cNvPr id="160" name="1_w_gG-CXQX4TV3B5bN24nqg.png" descr="1_w_gG-CXQX4TV3B5bN24nqg.png"/>
+          <p:cNvPicPr>
+            <a:picLocks noChangeAspect="1"/>
+          </p:cNvPicPr>
+          <p:nvPr/>
+        </p:nvPicPr>
+        <p:blipFill>
+          <a:blip r:embed="rId3">
+            <a:extLst/>
+          </a:blip>
+          <a:stretch>
+            <a:fillRect/>
+          </a:stretch>
+        </p:blipFill>
+        <p:spPr>
+          <a:xfrm>
+            <a:off x="1059139" y="5548077"/>
+            <a:ext cx="5055519" cy="3377087"/>
+          </a:xfrm>
+          <a:prstGeom prst="rect">
+            <a:avLst/>
+          </a:prstGeom>
+          <a:ln w="12700">
+            <a:miter lim="400000"/>
+          </a:ln>
+        </p:spPr>
+      </p:pic>
     </p:spTree>
   </p:cSld>
   <p:clrMapOvr>
@@ -7184,7 +7636,7 @@
       </p:grpSpPr>
       <p:sp>
         <p:nvSpPr>
-          <p:cNvPr id="160" name="The Statement"/>
+          <p:cNvPr id="162" name="Interview Experts"/>
           <p:cNvSpPr txBox="1"/>
           <p:nvPr>
             <p:ph type="title"/>
@@ -7201,14 +7653,14 @@
           <a:p>
             <a:pPr/>
             <a:r>
-              <a:t>The Statement</a:t>
-            </a:r>
-          </a:p>
-        </p:txBody>
-      </p:sp>
-      <p:sp>
-        <p:nvSpPr>
-          <p:cNvPr id="161" name="“From a _____ to a _______”…"/>
+              <a:t>Interview Experts</a:t>
+            </a:r>
+          </a:p>
+        </p:txBody>
+      </p:sp>
+      <p:sp>
+        <p:nvSpPr>
+          <p:cNvPr id="163" name="Interview best and brightest in the field, ask them what helped them get to where they are…"/>
           <p:cNvSpPr txBox="1"/>
           <p:nvPr>
             <p:ph type="body" idx="1"/>
@@ -7223,21 +7675,58 @@
           <a:bodyPr/>
           <a:lstStyle/>
           <a:p>
-            <a:pPr/>
-            <a:r>
-              <a:t>“From a _____ to a _______”</a:t>
-            </a:r>
-          </a:p>
-          <a:p>
-            <a:pPr/>
-            <a:r>
-              <a:t>From a pure backend developer to a full stack expert with a focus on rails and react.</a:t>
-            </a:r>
-          </a:p>
-          <a:p>
-            <a:pPr/>
-            <a:r>
-              <a:t>From an individual contributor who adds value through technical expertise to a leader who provides vision and direction through clear collaboration on technical architecture decisions.</a:t>
+            <a:pPr marL="391159" indent="-391159" defTabSz="514095">
+              <a:spcBef>
+                <a:spcPts val="3600"/>
+              </a:spcBef>
+              <a:defRPr sz="2816"/>
+            </a:pPr>
+            <a:r>
+              <a:t>Interview best and brightest in the field, ask them what helped them get to where they are</a:t>
+            </a:r>
+          </a:p>
+          <a:p>
+            <a:pPr marL="391159" indent="-391159" defTabSz="514095">
+              <a:spcBef>
+                <a:spcPts val="3600"/>
+              </a:spcBef>
+              <a:defRPr sz="2816"/>
+            </a:pPr>
+            <a:r>
+              <a:t>Find leaders on the “best” lists  (articles in trade mags, books you like, speakers at conferences, referrals from people you work with)</a:t>
+            </a:r>
+          </a:p>
+          <a:p>
+            <a:pPr marL="391159" indent="-391159" defTabSz="514095">
+              <a:spcBef>
+                <a:spcPts val="3600"/>
+              </a:spcBef>
+              <a:defRPr sz="2816"/>
+            </a:pPr>
+            <a:r>
+              <a:t>Request an interview asking them to help someone (you) in their field</a:t>
+            </a:r>
+          </a:p>
+          <a:p>
+            <a:pPr marL="391159" indent="-391159" defTabSz="514095">
+              <a:spcBef>
+                <a:spcPts val="3600"/>
+              </a:spcBef>
+              <a:defRPr sz="2816"/>
+            </a:pPr>
+            <a:r>
+              <a:t>Ask for insights on what experiences helped them grow the most</a:t>
+            </a:r>
+          </a:p>
+          <a:p>
+            <a:pPr marL="391159" indent="-391159" defTabSz="514095">
+              <a:spcBef>
+                <a:spcPts val="3600"/>
+              </a:spcBef>
+              <a:defRPr sz="2816"/>
+            </a:pPr>
+            <a:r>
+              <a:t>Resume and LinkedIn stalk: Look at what they say helped them or what value they provided</a:t>
             </a:r>
           </a:p>
         </p:txBody>
@@ -7268,9 +7757,38 @@
           <a:chExt cx="0" cy="0"/>
         </a:xfrm>
       </p:grpSpPr>
-      <p:sp>
-        <p:nvSpPr>
-          <p:cNvPr id="163" name="Interviewing"/>
+      <p:pic>
+        <p:nvPicPr>
+          <p:cNvPr id="165" name="map-of-london.jpg" descr="map-of-london.jpg"/>
+          <p:cNvPicPr>
+            <a:picLocks noChangeAspect="1"/>
+          </p:cNvPicPr>
+          <p:nvPr>
+            <p:ph type="pic" idx="13"/>
+          </p:nvPr>
+        </p:nvPicPr>
+        <p:blipFill>
+          <a:blip r:embed="rId2">
+            <a:extLst/>
+          </a:blip>
+          <a:srcRect l="31501" t="0" r="11905" b="0"/>
+          <a:stretch>
+            <a:fillRect/>
+          </a:stretch>
+        </p:blipFill>
+        <p:spPr>
+          <a:xfrm>
+            <a:off x="6718300" y="2590800"/>
+            <a:ext cx="5334000" cy="6286500"/>
+          </a:xfrm>
+          <a:prstGeom prst="rect">
+            <a:avLst/>
+          </a:prstGeom>
+        </p:spPr>
+      </p:pic>
+      <p:sp>
+        <p:nvSpPr>
+          <p:cNvPr id="166" name="Build the Map"/>
           <p:cNvSpPr txBox="1"/>
           <p:nvPr>
             <p:ph type="title"/>
@@ -7287,17 +7805,17 @@
           <a:p>
             <a:pPr/>
             <a:r>
-              <a:t>Interviewing</a:t>
-            </a:r>
-          </a:p>
-        </p:txBody>
-      </p:sp>
-      <p:sp>
-        <p:nvSpPr>
-          <p:cNvPr id="164" name="Check your ego at the door…"/>
+              <a:t>Build the Map</a:t>
+            </a:r>
+          </a:p>
+        </p:txBody>
+      </p:sp>
+      <p:sp>
+        <p:nvSpPr>
+          <p:cNvPr id="167" name="4-7 Functional Experiences (horizontal)…"/>
           <p:cNvSpPr txBox="1"/>
           <p:nvPr>
-            <p:ph type="body" idx="1"/>
+            <p:ph type="body" sz="half" idx="1"/>
           </p:nvPr>
         </p:nvSpPr>
         <p:spPr>
@@ -7311,19 +7829,25 @@
           <a:p>
             <a:pPr/>
             <a:r>
-              <a:t>Check your ego at the door</a:t>
-            </a:r>
-          </a:p>
-          <a:p>
-            <a:pPr/>
-            <a:r>
-              <a:t>Ask trusted superiors and colleagues for feedback on From/To</a:t>
-            </a:r>
-          </a:p>
-          <a:p>
-            <a:pPr/>
-            <a:r>
-              <a:t>Ask for brutal honesty because transparency will help you grow</a:t>
+              <a:t>4-7 Functional Experiences (horizontal)</a:t>
+            </a:r>
+          </a:p>
+          <a:p>
+            <a:pPr/>
+            <a:r>
+              <a:t>3-4 Management Experiences (vertical)</a:t>
+            </a:r>
+          </a:p>
+          <a:p>
+            <a:pPr/>
+            <a:r>
+              <a:t>Focus on experiences that will accelerate career</a:t>
+            </a:r>
+          </a:p>
+          <a:p>
+            <a:pPr/>
+            <a:r>
+              <a:t>Experiences should show meaningful business outcome</a:t>
             </a:r>
           </a:p>
         </p:txBody>

</xml_diff>

<commit_message>
references added to keynote for next move
</commit_message>
<xml_diff>
--- a/files/next_move.pptx
+++ b/files/next_move.pptx
@@ -37,6 +37,7 @@
     <p:sldId id="282" r:id="rId34"/>
     <p:sldId id="283" r:id="rId35"/>
     <p:sldId id="284" r:id="rId36"/>
+    <p:sldId id="285" r:id="rId37"/>
   </p:sldIdLst>
   <p:sldSz cx="13004800" cy="9753600"/>
   <p:notesSz cx="6858000" cy="9144000"/>
@@ -364,7 +365,7 @@
       </p:grpSpPr>
       <p:sp>
         <p:nvSpPr>
-          <p:cNvPr id="128" name="Shape 128"/>
+          <p:cNvPr id="138" name="Shape 138"/>
           <p:cNvSpPr/>
           <p:nvPr>
             <p:ph type="sldImg"/>
@@ -389,7 +390,7 @@
       </p:sp>
       <p:sp>
         <p:nvSpPr>
-          <p:cNvPr id="129" name="Shape 129"/>
+          <p:cNvPr id="139" name="Shape 139"/>
           <p:cNvSpPr/>
           <p:nvPr>
             <p:ph type="body" sz="quarter" idx="1"/>
@@ -538,7 +539,7 @@
       </p:grpSpPr>
       <p:pic>
         <p:nvPicPr>
-          <p:cNvPr id="12" name="19380.8151a018.630x354o.08dcd4805516.jpeg" descr="19380.8151a018.630x354o.08dcd4805516.jpeg"/>
+          <p:cNvPr id="13" name="19380.8151a018.630x354o.08dcd4805516.jpeg" descr="19380.8151a018.630x354o.08dcd4805516.jpeg"/>
           <p:cNvPicPr>
             <a:picLocks noChangeAspect="1"/>
           </p:cNvPicPr>
@@ -568,7 +569,7 @@
       </p:pic>
       <p:sp>
         <p:nvSpPr>
-          <p:cNvPr id="13" name="Title Text"/>
+          <p:cNvPr id="14" name="Title Text"/>
           <p:cNvSpPr txBox="1"/>
           <p:nvPr>
             <p:ph type="title"/>
@@ -596,7 +597,7 @@
       </p:sp>
       <p:sp>
         <p:nvSpPr>
-          <p:cNvPr id="14" name="Body Level One…"/>
+          <p:cNvPr id="15" name="Body Level One…"/>
           <p:cNvSpPr txBox="1"/>
           <p:nvPr>
             <p:ph type="body" sz="quarter" idx="1"/>
@@ -694,7 +695,7 @@
       </p:sp>
       <p:sp>
         <p:nvSpPr>
-          <p:cNvPr id="15" name="Slide Number"/>
+          <p:cNvPr id="16" name="Slide Number"/>
           <p:cNvSpPr txBox="1"/>
           <p:nvPr>
             <p:ph type="sldNum" sz="quarter" idx="2"/>
@@ -742,7 +743,7 @@
       </p:grpSpPr>
       <p:pic>
         <p:nvPicPr>
-          <p:cNvPr id="102" name="19380.8151a018.630x354o.08dcd4805516.jpeg" descr="19380.8151a018.630x354o.08dcd4805516.jpeg"/>
+          <p:cNvPr id="110" name="19380.8151a018.630x354o.08dcd4805516.jpeg" descr="19380.8151a018.630x354o.08dcd4805516.jpeg"/>
           <p:cNvPicPr>
             <a:picLocks noChangeAspect="1"/>
           </p:cNvPicPr>
@@ -772,7 +773,7 @@
       </p:pic>
       <p:sp>
         <p:nvSpPr>
-          <p:cNvPr id="103" name="–Johnny Appleseed"/>
+          <p:cNvPr id="111" name="–Johnny Appleseed"/>
           <p:cNvSpPr txBox="1"/>
           <p:nvPr>
             <p:ph type="body" sz="quarter" idx="13"/>
@@ -812,7 +813,7 @@
       </p:sp>
       <p:sp>
         <p:nvSpPr>
-          <p:cNvPr id="104" name="“Type a quote here.”"/>
+          <p:cNvPr id="112" name="“Type a quote here.”"/>
           <p:cNvSpPr txBox="1"/>
           <p:nvPr>
             <p:ph type="body" sz="quarter" idx="14"/>
@@ -857,7 +858,47 @@
       </p:sp>
       <p:sp>
         <p:nvSpPr>
-          <p:cNvPr id="105" name="Slide Number"/>
+          <p:cNvPr id="113" name="http://bit.ly/next_move"/>
+          <p:cNvSpPr txBox="1"/>
+          <p:nvPr/>
+        </p:nvSpPr>
+        <p:spPr>
+          <a:xfrm>
+            <a:off x="160617" y="9138852"/>
+            <a:ext cx="2417675" cy="374601"/>
+          </a:xfrm>
+          <a:prstGeom prst="rect">
+            <a:avLst/>
+          </a:prstGeom>
+          <a:ln w="12700">
+            <a:miter lim="400000"/>
+          </a:ln>
+          <a:extLst>
+            <a:ext uri="{C572A759-6A51-4108-AA02-DFA0A04FC94B}">
+              <ma14:wrappingTextBoxFlag xmlns:ma14="http://schemas.microsoft.com/office/mac/drawingml/2011/main" val="1"/>
+            </a:ext>
+          </a:extLst>
+        </p:spPr>
+        <p:txBody>
+          <a:bodyPr wrap="none" lIns="50800" tIns="50800" rIns="50800" bIns="50800" anchor="ctr">
+            <a:spAutoFit/>
+          </a:bodyPr>
+          <a:lstStyle>
+            <a:lvl1pPr>
+              <a:defRPr b="0" sz="1800"/>
+            </a:lvl1pPr>
+          </a:lstStyle>
+          <a:p>
+            <a:pPr/>
+            <a:r>
+              <a:t>http://bit.ly/next_move</a:t>
+            </a:r>
+          </a:p>
+        </p:txBody>
+      </p:sp>
+      <p:sp>
+        <p:nvSpPr>
+          <p:cNvPr id="114" name="Slide Number"/>
           <p:cNvSpPr txBox="1"/>
           <p:nvPr>
             <p:ph type="sldNum" sz="quarter" idx="2"/>
@@ -889,111 +930,6 @@
 <file path=ppt/slideLayouts/slideLayout11.xml><?xml version="1.0" encoding="utf-8"?>
 <p:sldLayout xmlns:a="http://schemas.openxmlformats.org/drawingml/2006/main" xmlns:r="http://schemas.openxmlformats.org/officeDocument/2006/relationships" xmlns:p="http://schemas.openxmlformats.org/presentationml/2006/main" xmlns:m="http://schemas.openxmlformats.org/officeDocument/2006/math" xmlns:a14="http://schemas.microsoft.com/office/drawing/2010/main" type="tx" showMasterSp="0" showMasterPhAnim="1">
   <p:cSld name="Photo">
-    <p:spTree>
-      <p:nvGrpSpPr>
-        <p:cNvPr id="1" name=""/>
-        <p:cNvGrpSpPr/>
-        <p:nvPr/>
-      </p:nvGrpSpPr>
-      <p:grpSpPr>
-        <a:xfrm>
-          <a:off x="0" y="0"/>
-          <a:ext cx="0" cy="0"/>
-          <a:chOff x="0" y="0"/>
-          <a:chExt cx="0" cy="0"/>
-        </a:xfrm>
-      </p:grpSpPr>
-      <p:pic>
-        <p:nvPicPr>
-          <p:cNvPr id="112" name="19380.8151a018.630x354o.08dcd4805516.jpeg" descr="19380.8151a018.630x354o.08dcd4805516.jpeg"/>
-          <p:cNvPicPr>
-            <a:picLocks noChangeAspect="1"/>
-          </p:cNvPicPr>
-          <p:nvPr/>
-        </p:nvPicPr>
-        <p:blipFill>
-          <a:blip r:embed="rId2">
-            <a:alphaModFix amt="30075"/>
-            <a:extLst/>
-          </a:blip>
-          <a:stretch>
-            <a:fillRect/>
-          </a:stretch>
-        </p:blipFill>
-        <p:spPr>
-          <a:xfrm>
-            <a:off x="-3582275" y="-789827"/>
-            <a:ext cx="20169350" cy="11333254"/>
-          </a:xfrm>
-          <a:prstGeom prst="rect">
-            <a:avLst/>
-          </a:prstGeom>
-          <a:ln w="12700">
-            <a:miter lim="400000"/>
-          </a:ln>
-        </p:spPr>
-      </p:pic>
-      <p:sp>
-        <p:nvSpPr>
-          <p:cNvPr id="113" name="Image"/>
-          <p:cNvSpPr/>
-          <p:nvPr>
-            <p:ph type="pic" idx="13"/>
-          </p:nvPr>
-        </p:nvSpPr>
-        <p:spPr>
-          <a:xfrm>
-            <a:off x="0" y="0"/>
-            <a:ext cx="13004800" cy="9753600"/>
-          </a:xfrm>
-          <a:prstGeom prst="rect">
-            <a:avLst/>
-          </a:prstGeom>
-        </p:spPr>
-        <p:txBody>
-          <a:bodyPr lIns="91439" tIns="45719" rIns="91439" bIns="45719" anchor="t">
-            <a:noAutofit/>
-          </a:bodyPr>
-          <a:lstStyle/>
-          <a:p>
-            <a:pPr/>
-          </a:p>
-        </p:txBody>
-      </p:sp>
-      <p:sp>
-        <p:nvSpPr>
-          <p:cNvPr id="114" name="Slide Number"/>
-          <p:cNvSpPr txBox="1"/>
-          <p:nvPr>
-            <p:ph type="sldNum" sz="quarter" idx="2"/>
-          </p:nvPr>
-        </p:nvSpPr>
-        <p:spPr>
-          <a:prstGeom prst="rect">
-            <a:avLst/>
-          </a:prstGeom>
-        </p:spPr>
-        <p:txBody>
-          <a:bodyPr/>
-          <a:lstStyle/>
-          <a:p>
-            <a:pPr/>
-            <a:fld id="{86CB4B4D-7CA3-9044-876B-883B54F8677D}" type="slidenum"/>
-          </a:p>
-        </p:txBody>
-      </p:sp>
-    </p:spTree>
-  </p:cSld>
-  <p:clrMapOvr>
-    <a:masterClrMapping/>
-  </p:clrMapOvr>
-  <p:transition xmlns:p14="http://schemas.microsoft.com/office/powerpoint/2010/main" spd="med" advClick="1"/>
-</p:sldLayout>
-</file>
-
-<file path=ppt/slideLayouts/slideLayout12.xml><?xml version="1.0" encoding="utf-8"?>
-<p:sldLayout xmlns:a="http://schemas.openxmlformats.org/drawingml/2006/main" xmlns:r="http://schemas.openxmlformats.org/officeDocument/2006/relationships" xmlns:p="http://schemas.openxmlformats.org/presentationml/2006/main" xmlns:m="http://schemas.openxmlformats.org/officeDocument/2006/math" xmlns:a14="http://schemas.microsoft.com/office/drawing/2010/main" type="tx" showMasterSp="0" showMasterPhAnim="1">
-  <p:cSld name="Blank">
     <p:spTree>
       <p:nvGrpSpPr>
         <p:cNvPr id="1" name=""/>
@@ -1040,7 +976,152 @@
       </p:pic>
       <p:sp>
         <p:nvSpPr>
-          <p:cNvPr id="122" name="Slide Number"/>
+          <p:cNvPr id="122" name="Image"/>
+          <p:cNvSpPr/>
+          <p:nvPr>
+            <p:ph type="pic" idx="13"/>
+          </p:nvPr>
+        </p:nvSpPr>
+        <p:spPr>
+          <a:xfrm>
+            <a:off x="0" y="0"/>
+            <a:ext cx="13004800" cy="9753600"/>
+          </a:xfrm>
+          <a:prstGeom prst="rect">
+            <a:avLst/>
+          </a:prstGeom>
+        </p:spPr>
+        <p:txBody>
+          <a:bodyPr lIns="91439" tIns="45719" rIns="91439" bIns="45719" anchor="t">
+            <a:noAutofit/>
+          </a:bodyPr>
+          <a:lstStyle/>
+          <a:p>
+            <a:pPr/>
+          </a:p>
+        </p:txBody>
+      </p:sp>
+      <p:sp>
+        <p:nvSpPr>
+          <p:cNvPr id="123" name="Slide Number"/>
+          <p:cNvSpPr txBox="1"/>
+          <p:nvPr>
+            <p:ph type="sldNum" sz="quarter" idx="2"/>
+          </p:nvPr>
+        </p:nvSpPr>
+        <p:spPr>
+          <a:prstGeom prst="rect">
+            <a:avLst/>
+          </a:prstGeom>
+        </p:spPr>
+        <p:txBody>
+          <a:bodyPr/>
+          <a:lstStyle/>
+          <a:p>
+            <a:pPr/>
+            <a:fld id="{86CB4B4D-7CA3-9044-876B-883B54F8677D}" type="slidenum"/>
+          </a:p>
+        </p:txBody>
+      </p:sp>
+    </p:spTree>
+  </p:cSld>
+  <p:clrMapOvr>
+    <a:masterClrMapping/>
+  </p:clrMapOvr>
+  <p:transition xmlns:p14="http://schemas.microsoft.com/office/powerpoint/2010/main" spd="med" advClick="1"/>
+</p:sldLayout>
+</file>
+
+<file path=ppt/slideLayouts/slideLayout12.xml><?xml version="1.0" encoding="utf-8"?>
+<p:sldLayout xmlns:a="http://schemas.openxmlformats.org/drawingml/2006/main" xmlns:r="http://schemas.openxmlformats.org/officeDocument/2006/relationships" xmlns:p="http://schemas.openxmlformats.org/presentationml/2006/main" xmlns:m="http://schemas.openxmlformats.org/officeDocument/2006/math" xmlns:a14="http://schemas.microsoft.com/office/drawing/2010/main" type="tx" showMasterSp="0" showMasterPhAnim="1">
+  <p:cSld name="Blank">
+    <p:spTree>
+      <p:nvGrpSpPr>
+        <p:cNvPr id="1" name=""/>
+        <p:cNvGrpSpPr/>
+        <p:nvPr/>
+      </p:nvGrpSpPr>
+      <p:grpSpPr>
+        <a:xfrm>
+          <a:off x="0" y="0"/>
+          <a:ext cx="0" cy="0"/>
+          <a:chOff x="0" y="0"/>
+          <a:chExt cx="0" cy="0"/>
+        </a:xfrm>
+      </p:grpSpPr>
+      <p:pic>
+        <p:nvPicPr>
+          <p:cNvPr id="130" name="19380.8151a018.630x354o.08dcd4805516.jpeg" descr="19380.8151a018.630x354o.08dcd4805516.jpeg"/>
+          <p:cNvPicPr>
+            <a:picLocks noChangeAspect="1"/>
+          </p:cNvPicPr>
+          <p:nvPr/>
+        </p:nvPicPr>
+        <p:blipFill>
+          <a:blip r:embed="rId2">
+            <a:alphaModFix amt="30075"/>
+            <a:extLst/>
+          </a:blip>
+          <a:stretch>
+            <a:fillRect/>
+          </a:stretch>
+        </p:blipFill>
+        <p:spPr>
+          <a:xfrm>
+            <a:off x="-3582275" y="-789827"/>
+            <a:ext cx="20169350" cy="11333254"/>
+          </a:xfrm>
+          <a:prstGeom prst="rect">
+            <a:avLst/>
+          </a:prstGeom>
+          <a:ln w="12700">
+            <a:miter lim="400000"/>
+          </a:ln>
+        </p:spPr>
+      </p:pic>
+      <p:sp>
+        <p:nvSpPr>
+          <p:cNvPr id="131" name="http://bit.ly/next_move"/>
+          <p:cNvSpPr txBox="1"/>
+          <p:nvPr/>
+        </p:nvSpPr>
+        <p:spPr>
+          <a:xfrm>
+            <a:off x="160617" y="9138852"/>
+            <a:ext cx="2417675" cy="374601"/>
+          </a:xfrm>
+          <a:prstGeom prst="rect">
+            <a:avLst/>
+          </a:prstGeom>
+          <a:ln w="12700">
+            <a:miter lim="400000"/>
+          </a:ln>
+          <a:extLst>
+            <a:ext uri="{C572A759-6A51-4108-AA02-DFA0A04FC94B}">
+              <ma14:wrappingTextBoxFlag xmlns:ma14="http://schemas.microsoft.com/office/mac/drawingml/2011/main" val="1"/>
+            </a:ext>
+          </a:extLst>
+        </p:spPr>
+        <p:txBody>
+          <a:bodyPr wrap="none" lIns="50800" tIns="50800" rIns="50800" bIns="50800" anchor="ctr">
+            <a:spAutoFit/>
+          </a:bodyPr>
+          <a:lstStyle>
+            <a:lvl1pPr>
+              <a:defRPr b="0" sz="1800"/>
+            </a:lvl1pPr>
+          </a:lstStyle>
+          <a:p>
+            <a:pPr/>
+            <a:r>
+              <a:t>http://bit.ly/next_move</a:t>
+            </a:r>
+          </a:p>
+        </p:txBody>
+      </p:sp>
+      <p:sp>
+        <p:nvSpPr>
+          <p:cNvPr id="132" name="Slide Number"/>
           <p:cNvSpPr txBox="1"/>
           <p:nvPr>
             <p:ph type="sldNum" sz="quarter" idx="2"/>
@@ -1088,7 +1169,7 @@
       </p:grpSpPr>
       <p:pic>
         <p:nvPicPr>
-          <p:cNvPr id="22" name="19380.8151a018.630x354o.08dcd4805516.jpeg" descr="19380.8151a018.630x354o.08dcd4805516.jpeg"/>
+          <p:cNvPr id="23" name="19380.8151a018.630x354o.08dcd4805516.jpeg" descr="19380.8151a018.630x354o.08dcd4805516.jpeg"/>
           <p:cNvPicPr>
             <a:picLocks noChangeAspect="1"/>
           </p:cNvPicPr>
@@ -1118,7 +1199,7 @@
       </p:pic>
       <p:sp>
         <p:nvSpPr>
-          <p:cNvPr id="23" name="Image"/>
+          <p:cNvPr id="24" name="Image"/>
           <p:cNvSpPr/>
           <p:nvPr>
             <p:ph type="pic" idx="13"/>
@@ -1145,7 +1226,7 @@
       </p:sp>
       <p:sp>
         <p:nvSpPr>
-          <p:cNvPr id="24" name="Title Text"/>
+          <p:cNvPr id="25" name="Title Text"/>
           <p:cNvSpPr txBox="1"/>
           <p:nvPr>
             <p:ph type="title"/>
@@ -1173,7 +1254,7 @@
       </p:sp>
       <p:sp>
         <p:nvSpPr>
-          <p:cNvPr id="25" name="Body Level One…"/>
+          <p:cNvPr id="26" name="Body Level One…"/>
           <p:cNvSpPr txBox="1"/>
           <p:nvPr>
             <p:ph type="body" sz="quarter" idx="1"/>
@@ -1271,7 +1352,47 @@
       </p:sp>
       <p:sp>
         <p:nvSpPr>
-          <p:cNvPr id="26" name="Slide Number"/>
+          <p:cNvPr id="27" name="http://bit.ly/next_move"/>
+          <p:cNvSpPr txBox="1"/>
+          <p:nvPr/>
+        </p:nvSpPr>
+        <p:spPr>
+          <a:xfrm>
+            <a:off x="160617" y="9138852"/>
+            <a:ext cx="2417675" cy="374601"/>
+          </a:xfrm>
+          <a:prstGeom prst="rect">
+            <a:avLst/>
+          </a:prstGeom>
+          <a:ln w="12700">
+            <a:miter lim="400000"/>
+          </a:ln>
+          <a:extLst>
+            <a:ext uri="{C572A759-6A51-4108-AA02-DFA0A04FC94B}">
+              <ma14:wrappingTextBoxFlag xmlns:ma14="http://schemas.microsoft.com/office/mac/drawingml/2011/main" val="1"/>
+            </a:ext>
+          </a:extLst>
+        </p:spPr>
+        <p:txBody>
+          <a:bodyPr wrap="none" lIns="50800" tIns="50800" rIns="50800" bIns="50800" anchor="ctr">
+            <a:spAutoFit/>
+          </a:bodyPr>
+          <a:lstStyle>
+            <a:lvl1pPr>
+              <a:defRPr b="0" sz="1800"/>
+            </a:lvl1pPr>
+          </a:lstStyle>
+          <a:p>
+            <a:pPr/>
+            <a:r>
+              <a:t>http://bit.ly/next_move</a:t>
+            </a:r>
+          </a:p>
+        </p:txBody>
+      </p:sp>
+      <p:sp>
+        <p:nvSpPr>
+          <p:cNvPr id="28" name="Slide Number"/>
           <p:cNvSpPr txBox="1"/>
           <p:nvPr>
             <p:ph type="sldNum" sz="quarter" idx="2"/>
@@ -1319,7 +1440,7 @@
       </p:grpSpPr>
       <p:pic>
         <p:nvPicPr>
-          <p:cNvPr id="33" name="19380.8151a018.630x354o.08dcd4805516.jpeg" descr="19380.8151a018.630x354o.08dcd4805516.jpeg"/>
+          <p:cNvPr id="35" name="19380.8151a018.630x354o.08dcd4805516.jpeg" descr="19380.8151a018.630x354o.08dcd4805516.jpeg"/>
           <p:cNvPicPr>
             <a:picLocks noChangeAspect="1"/>
           </p:cNvPicPr>
@@ -1349,7 +1470,7 @@
       </p:pic>
       <p:sp>
         <p:nvSpPr>
-          <p:cNvPr id="34" name="Title Text"/>
+          <p:cNvPr id="36" name="Title Text"/>
           <p:cNvSpPr txBox="1"/>
           <p:nvPr>
             <p:ph type="title"/>
@@ -1377,7 +1498,47 @@
       </p:sp>
       <p:sp>
         <p:nvSpPr>
-          <p:cNvPr id="35" name="Slide Number"/>
+          <p:cNvPr id="37" name="http://bit.ly/next_move"/>
+          <p:cNvSpPr txBox="1"/>
+          <p:nvPr/>
+        </p:nvSpPr>
+        <p:spPr>
+          <a:xfrm>
+            <a:off x="160617" y="9138852"/>
+            <a:ext cx="2417675" cy="374601"/>
+          </a:xfrm>
+          <a:prstGeom prst="rect">
+            <a:avLst/>
+          </a:prstGeom>
+          <a:ln w="12700">
+            <a:miter lim="400000"/>
+          </a:ln>
+          <a:extLst>
+            <a:ext uri="{C572A759-6A51-4108-AA02-DFA0A04FC94B}">
+              <ma14:wrappingTextBoxFlag xmlns:ma14="http://schemas.microsoft.com/office/mac/drawingml/2011/main" val="1"/>
+            </a:ext>
+          </a:extLst>
+        </p:spPr>
+        <p:txBody>
+          <a:bodyPr wrap="none" lIns="50800" tIns="50800" rIns="50800" bIns="50800" anchor="ctr">
+            <a:spAutoFit/>
+          </a:bodyPr>
+          <a:lstStyle>
+            <a:lvl1pPr>
+              <a:defRPr b="0" sz="1800"/>
+            </a:lvl1pPr>
+          </a:lstStyle>
+          <a:p>
+            <a:pPr/>
+            <a:r>
+              <a:t>http://bit.ly/next_move</a:t>
+            </a:r>
+          </a:p>
+        </p:txBody>
+      </p:sp>
+      <p:sp>
+        <p:nvSpPr>
+          <p:cNvPr id="38" name="Slide Number"/>
           <p:cNvSpPr txBox="1"/>
           <p:nvPr>
             <p:ph type="sldNum" sz="quarter" idx="2"/>
@@ -1425,7 +1586,7 @@
       </p:grpSpPr>
       <p:pic>
         <p:nvPicPr>
-          <p:cNvPr id="42" name="19380.8151a018.630x354o.08dcd4805516.jpeg" descr="19380.8151a018.630x354o.08dcd4805516.jpeg"/>
+          <p:cNvPr id="45" name="19380.8151a018.630x354o.08dcd4805516.jpeg" descr="19380.8151a018.630x354o.08dcd4805516.jpeg"/>
           <p:cNvPicPr>
             <a:picLocks noChangeAspect="1"/>
           </p:cNvPicPr>
@@ -1455,7 +1616,7 @@
       </p:pic>
       <p:sp>
         <p:nvSpPr>
-          <p:cNvPr id="43" name="Image"/>
+          <p:cNvPr id="46" name="Image"/>
           <p:cNvSpPr/>
           <p:nvPr>
             <p:ph type="pic" sz="half" idx="13"/>
@@ -1482,7 +1643,7 @@
       </p:sp>
       <p:sp>
         <p:nvSpPr>
-          <p:cNvPr id="44" name="Title Text"/>
+          <p:cNvPr id="47" name="Title Text"/>
           <p:cNvSpPr txBox="1"/>
           <p:nvPr>
             <p:ph type="title"/>
@@ -1514,7 +1675,7 @@
       </p:sp>
       <p:sp>
         <p:nvSpPr>
-          <p:cNvPr id="45" name="Body Level One…"/>
+          <p:cNvPr id="48" name="Body Level One…"/>
           <p:cNvSpPr txBox="1"/>
           <p:nvPr>
             <p:ph type="body" sz="quarter" idx="1"/>
@@ -1612,7 +1773,47 @@
       </p:sp>
       <p:sp>
         <p:nvSpPr>
-          <p:cNvPr id="46" name="Slide Number"/>
+          <p:cNvPr id="49" name="http://bit.ly/next_move"/>
+          <p:cNvSpPr txBox="1"/>
+          <p:nvPr/>
+        </p:nvSpPr>
+        <p:spPr>
+          <a:xfrm>
+            <a:off x="160617" y="9138852"/>
+            <a:ext cx="2417675" cy="374601"/>
+          </a:xfrm>
+          <a:prstGeom prst="rect">
+            <a:avLst/>
+          </a:prstGeom>
+          <a:ln w="12700">
+            <a:miter lim="400000"/>
+          </a:ln>
+          <a:extLst>
+            <a:ext uri="{C572A759-6A51-4108-AA02-DFA0A04FC94B}">
+              <ma14:wrappingTextBoxFlag xmlns:ma14="http://schemas.microsoft.com/office/mac/drawingml/2011/main" val="1"/>
+            </a:ext>
+          </a:extLst>
+        </p:spPr>
+        <p:txBody>
+          <a:bodyPr wrap="none" lIns="50800" tIns="50800" rIns="50800" bIns="50800" anchor="ctr">
+            <a:spAutoFit/>
+          </a:bodyPr>
+          <a:lstStyle>
+            <a:lvl1pPr>
+              <a:defRPr b="0" sz="1800"/>
+            </a:lvl1pPr>
+          </a:lstStyle>
+          <a:p>
+            <a:pPr/>
+            <a:r>
+              <a:t>http://bit.ly/next_move</a:t>
+            </a:r>
+          </a:p>
+        </p:txBody>
+      </p:sp>
+      <p:sp>
+        <p:nvSpPr>
+          <p:cNvPr id="50" name="Slide Number"/>
           <p:cNvSpPr txBox="1"/>
           <p:nvPr>
             <p:ph type="sldNum" sz="quarter" idx="2"/>
@@ -1660,7 +1861,7 @@
       </p:grpSpPr>
       <p:sp>
         <p:nvSpPr>
-          <p:cNvPr id="53" name="Title Text"/>
+          <p:cNvPr id="57" name="Title Text"/>
           <p:cNvSpPr txBox="1"/>
           <p:nvPr>
             <p:ph type="title"/>
@@ -1684,7 +1885,7 @@
       </p:sp>
       <p:sp>
         <p:nvSpPr>
-          <p:cNvPr id="54" name="Slide Number"/>
+          <p:cNvPr id="58" name="Slide Number"/>
           <p:cNvSpPr txBox="1"/>
           <p:nvPr>
             <p:ph type="sldNum" sz="quarter" idx="2"/>
@@ -1732,7 +1933,7 @@
       </p:grpSpPr>
       <p:pic>
         <p:nvPicPr>
-          <p:cNvPr id="61" name="19380.8151a018.630x354o.08dcd4805516.jpeg" descr="19380.8151a018.630x354o.08dcd4805516.jpeg"/>
+          <p:cNvPr id="65" name="19380.8151a018.630x354o.08dcd4805516.jpeg" descr="19380.8151a018.630x354o.08dcd4805516.jpeg"/>
           <p:cNvPicPr>
             <a:picLocks noChangeAspect="1"/>
           </p:cNvPicPr>
@@ -1762,7 +1963,7 @@
       </p:pic>
       <p:sp>
         <p:nvSpPr>
-          <p:cNvPr id="62" name="Title Text"/>
+          <p:cNvPr id="66" name="Title Text"/>
           <p:cNvSpPr txBox="1"/>
           <p:nvPr>
             <p:ph type="title"/>
@@ -1786,7 +1987,7 @@
       </p:sp>
       <p:sp>
         <p:nvSpPr>
-          <p:cNvPr id="63" name="Body Level One…"/>
+          <p:cNvPr id="67" name="Body Level One…"/>
           <p:cNvSpPr txBox="1"/>
           <p:nvPr>
             <p:ph type="body" idx="1"/>
@@ -1850,7 +2051,47 @@
       </p:sp>
       <p:sp>
         <p:nvSpPr>
-          <p:cNvPr id="64" name="Slide Number"/>
+          <p:cNvPr id="68" name="http://bit.ly/next_move"/>
+          <p:cNvSpPr txBox="1"/>
+          <p:nvPr/>
+        </p:nvSpPr>
+        <p:spPr>
+          <a:xfrm>
+            <a:off x="160617" y="9138852"/>
+            <a:ext cx="2417675" cy="374601"/>
+          </a:xfrm>
+          <a:prstGeom prst="rect">
+            <a:avLst/>
+          </a:prstGeom>
+          <a:ln w="12700">
+            <a:miter lim="400000"/>
+          </a:ln>
+          <a:extLst>
+            <a:ext uri="{C572A759-6A51-4108-AA02-DFA0A04FC94B}">
+              <ma14:wrappingTextBoxFlag xmlns:ma14="http://schemas.microsoft.com/office/mac/drawingml/2011/main" val="1"/>
+            </a:ext>
+          </a:extLst>
+        </p:spPr>
+        <p:txBody>
+          <a:bodyPr wrap="none" lIns="50800" tIns="50800" rIns="50800" bIns="50800" anchor="ctr">
+            <a:spAutoFit/>
+          </a:bodyPr>
+          <a:lstStyle>
+            <a:lvl1pPr>
+              <a:defRPr b="0" sz="1800"/>
+            </a:lvl1pPr>
+          </a:lstStyle>
+          <a:p>
+            <a:pPr/>
+            <a:r>
+              <a:t>http://bit.ly/next_move</a:t>
+            </a:r>
+          </a:p>
+        </p:txBody>
+      </p:sp>
+      <p:sp>
+        <p:nvSpPr>
+          <p:cNvPr id="69" name="Slide Number"/>
           <p:cNvSpPr txBox="1"/>
           <p:nvPr>
             <p:ph type="sldNum" sz="quarter" idx="2"/>
@@ -1898,7 +2139,7 @@
       </p:grpSpPr>
       <p:pic>
         <p:nvPicPr>
-          <p:cNvPr id="71" name="19380.8151a018.630x354o.08dcd4805516.jpeg" descr="19380.8151a018.630x354o.08dcd4805516.jpeg"/>
+          <p:cNvPr id="76" name="19380.8151a018.630x354o.08dcd4805516.jpeg" descr="19380.8151a018.630x354o.08dcd4805516.jpeg"/>
           <p:cNvPicPr>
             <a:picLocks noChangeAspect="1"/>
           </p:cNvPicPr>
@@ -1928,7 +2169,7 @@
       </p:pic>
       <p:sp>
         <p:nvSpPr>
-          <p:cNvPr id="72" name="Image"/>
+          <p:cNvPr id="77" name="Image"/>
           <p:cNvSpPr/>
           <p:nvPr>
             <p:ph type="pic" sz="half" idx="13"/>
@@ -1955,7 +2196,7 @@
       </p:sp>
       <p:sp>
         <p:nvSpPr>
-          <p:cNvPr id="73" name="Title Text"/>
+          <p:cNvPr id="78" name="Title Text"/>
           <p:cNvSpPr txBox="1"/>
           <p:nvPr>
             <p:ph type="title"/>
@@ -1979,7 +2220,7 @@
       </p:sp>
       <p:sp>
         <p:nvSpPr>
-          <p:cNvPr id="74" name="Body Level One…"/>
+          <p:cNvPr id="79" name="Body Level One…"/>
           <p:cNvSpPr txBox="1"/>
           <p:nvPr>
             <p:ph type="body" sz="half" idx="1"/>
@@ -2067,7 +2308,47 @@
       </p:sp>
       <p:sp>
         <p:nvSpPr>
-          <p:cNvPr id="75" name="Slide Number"/>
+          <p:cNvPr id="80" name="http://bit.ly/next_move"/>
+          <p:cNvSpPr txBox="1"/>
+          <p:nvPr/>
+        </p:nvSpPr>
+        <p:spPr>
+          <a:xfrm>
+            <a:off x="160617" y="9138852"/>
+            <a:ext cx="2417675" cy="374601"/>
+          </a:xfrm>
+          <a:prstGeom prst="rect">
+            <a:avLst/>
+          </a:prstGeom>
+          <a:ln w="12700">
+            <a:miter lim="400000"/>
+          </a:ln>
+          <a:extLst>
+            <a:ext uri="{C572A759-6A51-4108-AA02-DFA0A04FC94B}">
+              <ma14:wrappingTextBoxFlag xmlns:ma14="http://schemas.microsoft.com/office/mac/drawingml/2011/main" val="1"/>
+            </a:ext>
+          </a:extLst>
+        </p:spPr>
+        <p:txBody>
+          <a:bodyPr wrap="none" lIns="50800" tIns="50800" rIns="50800" bIns="50800" anchor="ctr">
+            <a:spAutoFit/>
+          </a:bodyPr>
+          <a:lstStyle>
+            <a:lvl1pPr>
+              <a:defRPr b="0" sz="1800"/>
+            </a:lvl1pPr>
+          </a:lstStyle>
+          <a:p>
+            <a:pPr/>
+            <a:r>
+              <a:t>http://bit.ly/next_move</a:t>
+            </a:r>
+          </a:p>
+        </p:txBody>
+      </p:sp>
+      <p:sp>
+        <p:nvSpPr>
+          <p:cNvPr id="81" name="Slide Number"/>
           <p:cNvSpPr txBox="1"/>
           <p:nvPr>
             <p:ph type="sldNum" sz="quarter" idx="2"/>
@@ -2115,7 +2396,7 @@
       </p:grpSpPr>
       <p:pic>
         <p:nvPicPr>
-          <p:cNvPr id="82" name="19380.8151a018.630x354o.08dcd4805516.jpeg" descr="19380.8151a018.630x354o.08dcd4805516.jpeg"/>
+          <p:cNvPr id="88" name="19380.8151a018.630x354o.08dcd4805516.jpeg" descr="19380.8151a018.630x354o.08dcd4805516.jpeg"/>
           <p:cNvPicPr>
             <a:picLocks noChangeAspect="1"/>
           </p:cNvPicPr>
@@ -2145,7 +2426,7 @@
       </p:pic>
       <p:sp>
         <p:nvSpPr>
-          <p:cNvPr id="83" name="Body Level One…"/>
+          <p:cNvPr id="89" name="Body Level One…"/>
           <p:cNvSpPr txBox="1"/>
           <p:nvPr>
             <p:ph type="body" idx="1"/>
@@ -2213,7 +2494,47 @@
       </p:sp>
       <p:sp>
         <p:nvSpPr>
-          <p:cNvPr id="84" name="Slide Number"/>
+          <p:cNvPr id="90" name="http://bit.ly/next_move"/>
+          <p:cNvSpPr txBox="1"/>
+          <p:nvPr/>
+        </p:nvSpPr>
+        <p:spPr>
+          <a:xfrm>
+            <a:off x="160617" y="9138852"/>
+            <a:ext cx="2417675" cy="374601"/>
+          </a:xfrm>
+          <a:prstGeom prst="rect">
+            <a:avLst/>
+          </a:prstGeom>
+          <a:ln w="12700">
+            <a:miter lim="400000"/>
+          </a:ln>
+          <a:extLst>
+            <a:ext uri="{C572A759-6A51-4108-AA02-DFA0A04FC94B}">
+              <ma14:wrappingTextBoxFlag xmlns:ma14="http://schemas.microsoft.com/office/mac/drawingml/2011/main" val="1"/>
+            </a:ext>
+          </a:extLst>
+        </p:spPr>
+        <p:txBody>
+          <a:bodyPr wrap="none" lIns="50800" tIns="50800" rIns="50800" bIns="50800" anchor="ctr">
+            <a:spAutoFit/>
+          </a:bodyPr>
+          <a:lstStyle>
+            <a:lvl1pPr>
+              <a:defRPr b="0" sz="1800"/>
+            </a:lvl1pPr>
+          </a:lstStyle>
+          <a:p>
+            <a:pPr/>
+            <a:r>
+              <a:t>http://bit.ly/next_move</a:t>
+            </a:r>
+          </a:p>
+        </p:txBody>
+      </p:sp>
+      <p:sp>
+        <p:nvSpPr>
+          <p:cNvPr id="91" name="Slide Number"/>
           <p:cNvSpPr txBox="1"/>
           <p:nvPr>
             <p:ph type="sldNum" sz="quarter" idx="2"/>
@@ -2261,7 +2582,7 @@
       </p:grpSpPr>
       <p:pic>
         <p:nvPicPr>
-          <p:cNvPr id="91" name="19380.8151a018.630x354o.08dcd4805516.jpeg" descr="19380.8151a018.630x354o.08dcd4805516.jpeg"/>
+          <p:cNvPr id="98" name="19380.8151a018.630x354o.08dcd4805516.jpeg" descr="19380.8151a018.630x354o.08dcd4805516.jpeg"/>
           <p:cNvPicPr>
             <a:picLocks noChangeAspect="1"/>
           </p:cNvPicPr>
@@ -2291,7 +2612,7 @@
       </p:pic>
       <p:sp>
         <p:nvSpPr>
-          <p:cNvPr id="92" name="Image"/>
+          <p:cNvPr id="99" name="Image"/>
           <p:cNvSpPr/>
           <p:nvPr>
             <p:ph type="pic" sz="quarter" idx="13"/>
@@ -2318,7 +2639,7 @@
       </p:sp>
       <p:sp>
         <p:nvSpPr>
-          <p:cNvPr id="93" name="Image"/>
+          <p:cNvPr id="100" name="Image"/>
           <p:cNvSpPr/>
           <p:nvPr>
             <p:ph type="pic" sz="quarter" idx="14"/>
@@ -2345,7 +2666,7 @@
       </p:sp>
       <p:sp>
         <p:nvSpPr>
-          <p:cNvPr id="94" name="Image"/>
+          <p:cNvPr id="101" name="Image"/>
           <p:cNvSpPr/>
           <p:nvPr>
             <p:ph type="pic" sz="half" idx="15"/>
@@ -2372,7 +2693,47 @@
       </p:sp>
       <p:sp>
         <p:nvSpPr>
-          <p:cNvPr id="95" name="Slide Number"/>
+          <p:cNvPr id="102" name="http://bit.ly/next_move"/>
+          <p:cNvSpPr txBox="1"/>
+          <p:nvPr/>
+        </p:nvSpPr>
+        <p:spPr>
+          <a:xfrm>
+            <a:off x="160617" y="9138852"/>
+            <a:ext cx="2417675" cy="374601"/>
+          </a:xfrm>
+          <a:prstGeom prst="rect">
+            <a:avLst/>
+          </a:prstGeom>
+          <a:ln w="12700">
+            <a:miter lim="400000"/>
+          </a:ln>
+          <a:extLst>
+            <a:ext uri="{C572A759-6A51-4108-AA02-DFA0A04FC94B}">
+              <ma14:wrappingTextBoxFlag xmlns:ma14="http://schemas.microsoft.com/office/mac/drawingml/2011/main" val="1"/>
+            </a:ext>
+          </a:extLst>
+        </p:spPr>
+        <p:txBody>
+          <a:bodyPr wrap="none" lIns="50800" tIns="50800" rIns="50800" bIns="50800" anchor="ctr">
+            <a:spAutoFit/>
+          </a:bodyPr>
+          <a:lstStyle>
+            <a:lvl1pPr>
+              <a:defRPr b="0" sz="1800"/>
+            </a:lvl1pPr>
+          </a:lstStyle>
+          <a:p>
+            <a:pPr/>
+            <a:r>
+              <a:t>http://bit.ly/next_move</a:t>
+            </a:r>
+          </a:p>
+        </p:txBody>
+      </p:sp>
+      <p:sp>
+        <p:nvSpPr>
+          <p:cNvPr id="103" name="Slide Number"/>
           <p:cNvSpPr txBox="1"/>
           <p:nvPr>
             <p:ph type="sldNum" sz="quarter" idx="2"/>
@@ -2495,16 +2856,14 @@
       </p:sp>
       <p:sp>
         <p:nvSpPr>
-          <p:cNvPr id="4" name="Body Level One…"/>
+          <p:cNvPr id="4" name="http://bit.ly/next_move"/>
           <p:cNvSpPr txBox="1"/>
-          <p:nvPr>
-            <p:ph type="body" idx="1"/>
-          </p:nvPr>
+          <p:nvPr/>
         </p:nvSpPr>
         <p:spPr>
           <a:xfrm>
-            <a:off x="952500" y="2590800"/>
-            <a:ext cx="11099800" cy="6286500"/>
+            <a:off x="160617" y="9138852"/>
+            <a:ext cx="2417675" cy="374601"/>
           </a:xfrm>
           <a:prstGeom prst="rect">
             <a:avLst/>
@@ -2519,6 +2878,48 @@
           </a:extLst>
         </p:spPr>
         <p:txBody>
+          <a:bodyPr wrap="none" lIns="50800" tIns="50800" rIns="50800" bIns="50800" anchor="ctr">
+            <a:spAutoFit/>
+          </a:bodyPr>
+          <a:lstStyle>
+            <a:lvl1pPr>
+              <a:defRPr b="0" sz="1800"/>
+            </a:lvl1pPr>
+          </a:lstStyle>
+          <a:p>
+            <a:pPr/>
+            <a:r>
+              <a:t>http://bit.ly/next_move</a:t>
+            </a:r>
+          </a:p>
+        </p:txBody>
+      </p:sp>
+      <p:sp>
+        <p:nvSpPr>
+          <p:cNvPr id="5" name="Body Level One…"/>
+          <p:cNvSpPr txBox="1"/>
+          <p:nvPr>
+            <p:ph type="body" idx="1"/>
+          </p:nvPr>
+        </p:nvSpPr>
+        <p:spPr>
+          <a:xfrm>
+            <a:off x="952500" y="2590800"/>
+            <a:ext cx="11099800" cy="6286500"/>
+          </a:xfrm>
+          <a:prstGeom prst="rect">
+            <a:avLst/>
+          </a:prstGeom>
+          <a:ln w="12700">
+            <a:miter lim="400000"/>
+          </a:ln>
+          <a:extLst>
+            <a:ext uri="{C572A759-6A51-4108-AA02-DFA0A04FC94B}">
+              <ma14:wrappingTextBoxFlag xmlns:ma14="http://schemas.microsoft.com/office/mac/drawingml/2011/main" val="1"/>
+            </a:ext>
+          </a:extLst>
+        </p:spPr>
+        <p:txBody>
           <a:bodyPr lIns="50800" tIns="50800" rIns="50800" bIns="50800" anchor="ctr">
             <a:normAutofit fontScale="100000" lnSpcReduction="0"/>
           </a:bodyPr>
@@ -2557,7 +2958,7 @@
       </p:sp>
       <p:sp>
         <p:nvSpPr>
-          <p:cNvPr id="5" name="Slide Number"/>
+          <p:cNvPr id="6" name="Slide Number"/>
           <p:cNvSpPr txBox="1"/>
           <p:nvPr>
             <p:ph type="sldNum" sz="quarter" idx="2"/>
@@ -3444,7 +3845,7 @@
       </p:grpSpPr>
       <p:sp>
         <p:nvSpPr>
-          <p:cNvPr id="131" name="Plan Your Next Move Like a Chess Game"/>
+          <p:cNvPr id="141" name="Plan Your Next Move Like a Chess Game"/>
           <p:cNvSpPr txBox="1"/>
           <p:nvPr>
             <p:ph type="ctrTitle"/>
@@ -3468,7 +3869,7 @@
       </p:sp>
       <p:pic>
         <p:nvPicPr>
-          <p:cNvPr id="132" name="rubyHackLogoWhiteMtnsWhtHACK_gray-4ae56eb86b50068b7c111e2702fd254ebecef0b00bd5b1e1b73c658b11878319.png" descr="rubyHackLogoWhiteMtnsWhtHACK_gray-4ae56eb86b50068b7c111e2702fd254ebecef0b00bd5b1e1b73c658b11878319.png"/>
+          <p:cNvPr id="142" name="rubyHackLogoWhiteMtnsWhtHACK_gray-4ae56eb86b50068b7c111e2702fd254ebecef0b00bd5b1e1b73c658b11878319.png" descr="rubyHackLogoWhiteMtnsWhtHACK_gray-4ae56eb86b50068b7c111e2702fd254ebecef0b00bd5b1e1b73c658b11878319.png"/>
           <p:cNvPicPr>
             <a:picLocks noChangeAspect="1"/>
           </p:cNvPicPr>
@@ -3523,7 +3924,7 @@
       </p:grpSpPr>
       <p:pic>
         <p:nvPicPr>
-          <p:cNvPr id="168" name="map-of-london.jpg" descr="map-of-london.jpg"/>
+          <p:cNvPr id="178" name="map-of-london.jpg" descr="map-of-london.jpg"/>
           <p:cNvPicPr>
             <a:picLocks noChangeAspect="1"/>
           </p:cNvPicPr>
@@ -3552,7 +3953,7 @@
       </p:pic>
       <p:sp>
         <p:nvSpPr>
-          <p:cNvPr id="169" name="Build the Map"/>
+          <p:cNvPr id="179" name="Build the Map"/>
           <p:cNvSpPr txBox="1"/>
           <p:nvPr>
             <p:ph type="title"/>
@@ -3576,7 +3977,7 @@
       </p:sp>
       <p:sp>
         <p:nvSpPr>
-          <p:cNvPr id="170" name="4-7 Functional Experiences (horizontal)…"/>
+          <p:cNvPr id="180" name="4-7 Functional Experiences (horizontal)…"/>
           <p:cNvSpPr txBox="1"/>
           <p:nvPr>
             <p:ph type="body" sz="half" idx="1"/>
@@ -3644,7 +4045,7 @@
       </p:grpSpPr>
       <p:sp>
         <p:nvSpPr>
-          <p:cNvPr id="172" name="Focus on experiences which will help you move the direction you want (70-20-10 rule)…"/>
+          <p:cNvPr id="182" name="Focus on experiences which will help you move the direction you want (70-20-10 rule)…"/>
           <p:cNvSpPr txBox="1"/>
           <p:nvPr>
             <p:ph type="body" sz="half" idx="1"/>
@@ -3684,7 +4085,7 @@
       </p:sp>
       <p:pic>
         <p:nvPicPr>
-          <p:cNvPr id="173" name="antique-compass-3d-model-obj-fbx-c4d-stl.jpg" descr="antique-compass-3d-model-obj-fbx-c4d-stl.jpg"/>
+          <p:cNvPr id="183" name="antique-compass-3d-model-obj-fbx-c4d-stl.jpg" descr="antique-compass-3d-model-obj-fbx-c4d-stl.jpg"/>
           <p:cNvPicPr>
             <a:picLocks noChangeAspect="0"/>
           </p:cNvPicPr>
@@ -3713,7 +4114,7 @@
       </p:pic>
       <p:sp>
         <p:nvSpPr>
-          <p:cNvPr id="174" name="Review and Plan"/>
+          <p:cNvPr id="184" name="Review and Plan"/>
           <p:cNvSpPr txBox="1"/>
           <p:nvPr>
             <p:ph type="title"/>
@@ -3763,7 +4164,7 @@
       </p:grpSpPr>
       <p:pic>
         <p:nvPicPr>
-          <p:cNvPr id="176" name="Screen Shot 2019-03-15 at 8.54.27 AM.png" descr="Screen Shot 2019-03-15 at 8.54.27 AM.png"/>
+          <p:cNvPr id="186" name="Screen Shot 2019-03-15 at 8.54.27 AM.png" descr="Screen Shot 2019-03-15 at 8.54.27 AM.png"/>
           <p:cNvPicPr>
             <a:picLocks noChangeAspect="0"/>
           </p:cNvPicPr>
@@ -3792,7 +4193,7 @@
       </p:pic>
       <p:sp>
         <p:nvSpPr>
-          <p:cNvPr id="177" name="From/To &amp; Interviewing"/>
+          <p:cNvPr id="187" name="From/To &amp; Interviewing"/>
           <p:cNvSpPr txBox="1"/>
           <p:nvPr>
             <p:ph type="title"/>
@@ -3816,7 +4217,7 @@
       </p:sp>
       <p:sp>
         <p:nvSpPr>
-          <p:cNvPr id="178" name="Body"/>
+          <p:cNvPr id="188" name="Body"/>
           <p:cNvSpPr txBox="1"/>
           <p:nvPr>
             <p:ph type="body" sz="quarter" idx="1"/>
@@ -3863,7 +4264,7 @@
       </p:grpSpPr>
       <p:sp>
         <p:nvSpPr>
-          <p:cNvPr id="180" name="From/To"/>
+          <p:cNvPr id="190" name="From/To"/>
           <p:cNvSpPr txBox="1"/>
           <p:nvPr>
             <p:ph type="title"/>
@@ -3887,7 +4288,7 @@
       </p:sp>
       <p:sp>
         <p:nvSpPr>
-          <p:cNvPr id="181" name="Start with:…"/>
+          <p:cNvPr id="191" name="Start with:…"/>
           <p:cNvSpPr txBox="1"/>
           <p:nvPr>
             <p:ph type="body" idx="1"/>
@@ -4016,7 +4417,7 @@
       </p:grpSpPr>
       <p:sp>
         <p:nvSpPr>
-          <p:cNvPr id="183" name="The Statement"/>
+          <p:cNvPr id="193" name="The Statement"/>
           <p:cNvSpPr txBox="1"/>
           <p:nvPr>
             <p:ph type="title"/>
@@ -4040,7 +4441,7 @@
       </p:sp>
       <p:sp>
         <p:nvSpPr>
-          <p:cNvPr id="184" name="“From a _____ to a _______”…"/>
+          <p:cNvPr id="194" name="“From a _____ to a _______”…"/>
           <p:cNvSpPr txBox="1"/>
           <p:nvPr>
             <p:ph type="body" idx="1"/>
@@ -4102,7 +4503,7 @@
       </p:grpSpPr>
       <p:sp>
         <p:nvSpPr>
-          <p:cNvPr id="186" name="Interviewing"/>
+          <p:cNvPr id="196" name="Interviewing"/>
           <p:cNvSpPr txBox="1"/>
           <p:nvPr>
             <p:ph type="title"/>
@@ -4126,7 +4527,7 @@
       </p:sp>
       <p:sp>
         <p:nvSpPr>
-          <p:cNvPr id="187" name="Check your ego at the door…"/>
+          <p:cNvPr id="197" name="Check your ego at the door…"/>
           <p:cNvSpPr txBox="1"/>
           <p:nvPr>
             <p:ph type="body" idx="1"/>
@@ -4188,7 +4589,7 @@
       </p:grpSpPr>
       <p:pic>
         <p:nvPicPr>
-          <p:cNvPr id="189" name="HNWT6CKZBh2KpfQthF9CfSQgidBR73wSktab8S1B1fsHjk3SkRyUaTLWxaw8ZJPFNEYSvaYgLjxhRnQLZaehzdMnU2GquvLRLwNqjJpFhABWc5m1hLFuKWHQv4E.jpeg" descr="HNWT6CKZBh2KpfQthF9CfSQgidBR73wSktab8S1B1fsHjk3SkRyUaTLWxaw8ZJPFNEYSvaYgLjxhRnQLZaehzdMnU2GquvLRLwNqjJpFhABWc5m1hLFuKWHQv4E.jpeg"/>
+          <p:cNvPr id="199" name="HNWT6CKZBh2KpfQthF9CfSQgidBR73wSktab8S1B1fsHjk3SkRyUaTLWxaw8ZJPFNEYSvaYgLjxhRnQLZaehzdMnU2GquvLRLwNqjJpFhABWc5m1hLFuKWHQv4E.jpeg" descr="HNWT6CKZBh2KpfQthF9CfSQgidBR73wSktab8S1B1fsHjk3SkRyUaTLWxaw8ZJPFNEYSvaYgLjxhRnQLZaehzdMnU2GquvLRLwNqjJpFhABWc5m1hLFuKWHQv4E.jpeg"/>
           <p:cNvPicPr>
             <a:picLocks noChangeAspect="0"/>
           </p:cNvPicPr>
@@ -4217,7 +4618,7 @@
       </p:pic>
       <p:sp>
         <p:nvSpPr>
-          <p:cNvPr id="190" name="Matrix Ranking"/>
+          <p:cNvPr id="200" name="Matrix Ranking"/>
           <p:cNvSpPr txBox="1"/>
           <p:nvPr>
             <p:ph type="title"/>
@@ -4241,7 +4642,7 @@
       </p:sp>
       <p:sp>
         <p:nvSpPr>
-          <p:cNvPr id="191" name="Body"/>
+          <p:cNvPr id="201" name="Body"/>
           <p:cNvSpPr txBox="1"/>
           <p:nvPr>
             <p:ph type="body" sz="quarter" idx="1"/>
@@ -4288,7 +4689,7 @@
       </p:grpSpPr>
       <p:sp>
         <p:nvSpPr>
-          <p:cNvPr id="193" name="Matrix Ranking"/>
+          <p:cNvPr id="203" name="Matrix Ranking"/>
           <p:cNvSpPr txBox="1"/>
           <p:nvPr>
             <p:ph type="title"/>
@@ -4312,7 +4713,7 @@
       </p:sp>
       <p:sp>
         <p:nvSpPr>
-          <p:cNvPr id="194" name="Designed to take the guess work out of choosing a position or job opportunity…"/>
+          <p:cNvPr id="204" name="Designed to take the guess work out of choosing a position or job opportunity…"/>
           <p:cNvSpPr txBox="1"/>
           <p:nvPr>
             <p:ph type="body" sz="half" idx="1"/>
@@ -4372,7 +4773,7 @@
       </p:grpSpPr>
       <p:pic>
         <p:nvPicPr>
-          <p:cNvPr id="196" name="Screen Shot 2019-03-13 at 8.05.50 AM.png" descr="Screen Shot 2019-03-13 at 8.05.50 AM.png"/>
+          <p:cNvPr id="206" name="Screen Shot 2019-03-13 at 8.05.50 AM.png" descr="Screen Shot 2019-03-13 at 8.05.50 AM.png"/>
           <p:cNvPicPr>
             <a:picLocks noChangeAspect="1"/>
           </p:cNvPicPr>
@@ -4401,7 +4802,7 @@
       </p:pic>
       <p:pic>
         <p:nvPicPr>
-          <p:cNvPr id="197" name="Screen Shot 2019-03-13 at 8.05.18 AM.png" descr="Screen Shot 2019-03-13 at 8.05.18 AM.png"/>
+          <p:cNvPr id="207" name="Screen Shot 2019-03-13 at 8.05.18 AM.png" descr="Screen Shot 2019-03-13 at 8.05.18 AM.png"/>
           <p:cNvPicPr>
             <a:picLocks noChangeAspect="1"/>
           </p:cNvPicPr>
@@ -4430,7 +4831,7 @@
       </p:pic>
       <p:pic>
         <p:nvPicPr>
-          <p:cNvPr id="198" name="Screen Shot 2019-03-15 at 8.16.29 AM.png" descr="Screen Shot 2019-03-15 at 8.16.29 AM.png"/>
+          <p:cNvPr id="208" name="Screen Shot 2019-03-15 at 8.16.29 AM.png" descr="Screen Shot 2019-03-15 at 8.16.29 AM.png"/>
           <p:cNvPicPr>
             <a:picLocks noChangeAspect="1"/>
           </p:cNvPicPr>
@@ -4459,7 +4860,7 @@
       </p:pic>
       <p:sp>
         <p:nvSpPr>
-          <p:cNvPr id="199" name="Criteria with Sample Questions"/>
+          <p:cNvPr id="209" name="Criteria with Sample Questions"/>
           <p:cNvSpPr txBox="1"/>
           <p:nvPr/>
         </p:nvSpPr>
@@ -4495,7 +4896,7 @@
       </p:sp>
       <p:sp>
         <p:nvSpPr>
-          <p:cNvPr id="200" name="Criteria and Weights"/>
+          <p:cNvPr id="210" name="Criteria and Weights"/>
           <p:cNvSpPr txBox="1"/>
           <p:nvPr/>
         </p:nvSpPr>
@@ -4531,7 +4932,7 @@
       </p:sp>
       <p:sp>
         <p:nvSpPr>
-          <p:cNvPr id="201" name="Overall Rankings"/>
+          <p:cNvPr id="211" name="Overall Rankings"/>
           <p:cNvSpPr txBox="1"/>
           <p:nvPr/>
         </p:nvSpPr>
@@ -4593,7 +4994,7 @@
       </p:grpSpPr>
       <p:pic>
         <p:nvPicPr>
-          <p:cNvPr id="203" name="Screen Shot 2019-03-15 at 8.16.29 AM.png" descr="Screen Shot 2019-03-15 at 8.16.29 AM.png"/>
+          <p:cNvPr id="213" name="Screen Shot 2019-03-15 at 8.16.29 AM.png" descr="Screen Shot 2019-03-15 at 8.16.29 AM.png"/>
           <p:cNvPicPr>
             <a:picLocks noChangeAspect="1"/>
           </p:cNvPicPr>
@@ -4622,7 +5023,7 @@
       </p:pic>
       <p:sp>
         <p:nvSpPr>
-          <p:cNvPr id="204" name="Criteria and Weights"/>
+          <p:cNvPr id="214" name="Criteria and Weights"/>
           <p:cNvSpPr txBox="1"/>
           <p:nvPr>
             <p:ph type="title"/>
@@ -4646,7 +5047,7 @@
       </p:sp>
       <p:sp>
         <p:nvSpPr>
-          <p:cNvPr id="205" name="List all the things which are important to you…"/>
+          <p:cNvPr id="215" name="List all the things which are important to you…"/>
           <p:cNvSpPr txBox="1"/>
           <p:nvPr>
             <p:ph type="body" sz="half" idx="1"/>
@@ -4708,7 +5109,7 @@
       </p:grpSpPr>
       <p:sp>
         <p:nvSpPr>
-          <p:cNvPr id="134" name="&gt; whoami…"/>
+          <p:cNvPr id="144" name="&gt; whoami…"/>
           <p:cNvSpPr txBox="1"/>
           <p:nvPr>
             <p:ph type="title"/>
@@ -4746,7 +5147,7 @@
       </p:sp>
       <p:sp>
         <p:nvSpPr>
-          <p:cNvPr id="135" name="Professionally…"/>
+          <p:cNvPr id="145" name="Professionally…"/>
           <p:cNvSpPr txBox="1"/>
           <p:nvPr>
             <p:ph type="body" sz="half" idx="1"/>
@@ -4818,21 +5219,21 @@
               <a:defRPr sz="2144"/>
             </a:pPr>
             <a:r>
-              <a:t>Product Manager @ O.C. Tanner</a:t>
-            </a:r>
-          </a:p>
-        </p:txBody>
-      </p:sp>
-      <p:sp>
-        <p:nvSpPr>
-          <p:cNvPr id="136" name="Personally…"/>
+              <a:t>Product Manager @ O.C. Tanner while getting MBA from BYU</a:t>
+            </a:r>
+          </a:p>
+        </p:txBody>
+      </p:sp>
+      <p:sp>
+        <p:nvSpPr>
+          <p:cNvPr id="146" name="Personally…"/>
           <p:cNvSpPr txBox="1"/>
           <p:nvPr/>
         </p:nvSpPr>
         <p:spPr>
           <a:xfrm>
             <a:off x="952499" y="5429571"/>
-            <a:ext cx="11099801" cy="3881838"/>
+            <a:ext cx="11099801" cy="3045617"/>
           </a:xfrm>
           <a:prstGeom prst="rect">
             <a:avLst/>
@@ -4852,63 +5253,63 @@
           </a:bodyPr>
           <a:lstStyle/>
           <a:p>
-            <a:pPr algn="l" defTabSz="479044">
+            <a:pPr algn="l" defTabSz="373887">
               <a:spcBef>
-                <a:spcPts val="3400"/>
+                <a:spcPts val="2600"/>
               </a:spcBef>
-              <a:defRPr b="0" sz="2624"/>
+              <a:defRPr b="0" sz="2048"/>
             </a:pPr>
             <a:r>
               <a:t>Personally</a:t>
             </a:r>
           </a:p>
           <a:p>
-            <a:pPr marL="364489" indent="-364489" algn="l" defTabSz="479044">
+            <a:pPr marL="284479" indent="-284479" algn="l" defTabSz="373887">
               <a:spcBef>
-                <a:spcPts val="3400"/>
+                <a:spcPts val="2600"/>
               </a:spcBef>
               <a:buSzPct val="145000"/>
               <a:buChar char="•"/>
-              <a:defRPr b="0" sz="2624"/>
+              <a:defRPr b="0" sz="2048"/>
             </a:pPr>
             <a:r>
               <a:t>Taught leadership principles to people from the following companies:</a:t>
             </a:r>
           </a:p>
           <a:p>
-            <a:pPr lvl="1" marL="728979" indent="-364489" algn="l" defTabSz="479044">
+            <a:pPr lvl="1" marL="568959" indent="-284479" algn="l" defTabSz="373887">
               <a:spcBef>
-                <a:spcPts val="3400"/>
+                <a:spcPts val="2600"/>
               </a:spcBef>
               <a:buSzPct val="145000"/>
               <a:buChar char="•"/>
-              <a:defRPr b="0" sz="2624"/>
+              <a:defRPr b="0" sz="2048"/>
             </a:pPr>
             <a:r>
               <a:t>Bain Capital, Inside Sales, Novell, RealSalt, ZCMI, Vivint, doTerra</a:t>
             </a:r>
           </a:p>
           <a:p>
-            <a:pPr marL="364489" indent="-364489" algn="l" defTabSz="479044">
+            <a:pPr marL="284479" indent="-284479" algn="l" defTabSz="373887">
               <a:spcBef>
-                <a:spcPts val="3400"/>
+                <a:spcPts val="2600"/>
               </a:spcBef>
               <a:buSzPct val="145000"/>
               <a:buChar char="•"/>
-              <a:defRPr b="0" sz="2624"/>
+              <a:defRPr b="0" sz="2048"/>
             </a:pPr>
             <a:r>
               <a:t>Shodan in Aikido</a:t>
             </a:r>
           </a:p>
           <a:p>
-            <a:pPr marL="364489" indent="-364489" algn="l" defTabSz="479044">
+            <a:pPr marL="284479" indent="-284479" algn="l" defTabSz="373887">
               <a:spcBef>
-                <a:spcPts val="3400"/>
+                <a:spcPts val="2600"/>
               </a:spcBef>
               <a:buSzPct val="145000"/>
               <a:buChar char="•"/>
-              <a:defRPr b="0" sz="2624"/>
+              <a:defRPr b="0" sz="2048"/>
             </a:pPr>
             <a:r>
               <a:t>Certified Advanced PADI diver</a:t>
@@ -4944,7 +5345,7 @@
       </p:grpSpPr>
       <p:pic>
         <p:nvPicPr>
-          <p:cNvPr id="207" name="Screen Shot 2019-03-13 at 8.05.18 AM.png" descr="Screen Shot 2019-03-13 at 8.05.18 AM.png"/>
+          <p:cNvPr id="217" name="Screen Shot 2019-03-13 at 8.05.18 AM.png" descr="Screen Shot 2019-03-13 at 8.05.18 AM.png"/>
           <p:cNvPicPr>
             <a:picLocks noChangeAspect="0"/>
           </p:cNvPicPr>
@@ -4973,7 +5374,7 @@
       </p:pic>
       <p:sp>
         <p:nvSpPr>
-          <p:cNvPr id="208" name="Determine Sample Questions and Ranks"/>
+          <p:cNvPr id="218" name="Determine Sample Questions and Ranks"/>
           <p:cNvSpPr txBox="1"/>
           <p:nvPr>
             <p:ph type="title"/>
@@ -5001,7 +5402,7 @@
       </p:sp>
       <p:sp>
         <p:nvSpPr>
-          <p:cNvPr id="209" name="Body"/>
+          <p:cNvPr id="219" name="Body"/>
           <p:cNvSpPr txBox="1"/>
           <p:nvPr>
             <p:ph type="body" sz="half" idx="1"/>
@@ -5052,7 +5453,7 @@
       </p:grpSpPr>
       <p:pic>
         <p:nvPicPr>
-          <p:cNvPr id="211" name="Screen Shot 2019-03-13 at 8.05.50 AM.png" descr="Screen Shot 2019-03-13 at 8.05.50 AM.png"/>
+          <p:cNvPr id="221" name="Screen Shot 2019-03-13 at 8.05.50 AM.png" descr="Screen Shot 2019-03-13 at 8.05.50 AM.png"/>
           <p:cNvPicPr>
             <a:picLocks noChangeAspect="0"/>
           </p:cNvPicPr>
@@ -5081,7 +5482,7 @@
       </p:pic>
       <p:sp>
         <p:nvSpPr>
-          <p:cNvPr id="212" name="List Options and Evaluate"/>
+          <p:cNvPr id="222" name="List Options and Evaluate"/>
           <p:cNvSpPr txBox="1"/>
           <p:nvPr>
             <p:ph type="title"/>
@@ -5104,31 +5505,6 @@
             <a:r>
               <a:t>List Options and Evaluate</a:t>
             </a:r>
-          </a:p>
-        </p:txBody>
-      </p:sp>
-      <p:sp>
-        <p:nvSpPr>
-          <p:cNvPr id="213" name="Body"/>
-          <p:cNvSpPr txBox="1"/>
-          <p:nvPr>
-            <p:ph type="body" sz="half" idx="1"/>
-          </p:nvPr>
-        </p:nvSpPr>
-        <p:spPr>
-          <a:xfrm>
-            <a:off x="952500" y="5911417"/>
-            <a:ext cx="11099800" cy="2965883"/>
-          </a:xfrm>
-          <a:prstGeom prst="rect">
-            <a:avLst/>
-          </a:prstGeom>
-        </p:spPr>
-        <p:txBody>
-          <a:bodyPr/>
-          <a:lstStyle/>
-          <a:p>
-            <a:pPr/>
           </a:p>
         </p:txBody>
       </p:sp>
@@ -5160,7 +5536,7 @@
       </p:grpSpPr>
       <p:sp>
         <p:nvSpPr>
-          <p:cNvPr id="215" name="Summary of Tools"/>
+          <p:cNvPr id="224" name="Summary of Tools"/>
           <p:cNvSpPr txBox="1"/>
           <p:nvPr>
             <p:ph type="title"/>
@@ -5184,13 +5560,17 @@
       </p:sp>
       <p:sp>
         <p:nvSpPr>
-          <p:cNvPr id="216" name="Experience Map…"/>
+          <p:cNvPr id="225" name="Experience Map…"/>
           <p:cNvSpPr txBox="1"/>
           <p:nvPr>
-            <p:ph type="body" idx="1"/>
+            <p:ph type="body" sz="half" idx="1"/>
           </p:nvPr>
         </p:nvSpPr>
         <p:spPr>
+          <a:xfrm>
+            <a:off x="952500" y="2590800"/>
+            <a:ext cx="11099800" cy="2860476"/>
+          </a:xfrm>
           <a:prstGeom prst="rect">
             <a:avLst/>
           </a:prstGeom>
@@ -5246,7 +5626,7 @@
       </p:grpSpPr>
       <p:sp>
         <p:nvSpPr>
-          <p:cNvPr id="218" name="Why Move At All?…"/>
+          <p:cNvPr id="227" name="Why Move At All?…"/>
           <p:cNvSpPr txBox="1"/>
           <p:nvPr>
             <p:ph type="title"/>
@@ -5314,7 +5694,7 @@
       </p:grpSpPr>
       <p:pic>
         <p:nvPicPr>
-          <p:cNvPr id="220" name="Screen_Shot_2019-03-11_at_8_09_40_AM.png" descr="Screen_Shot_2019-03-11_at_8_09_40_AM.png"/>
+          <p:cNvPr id="229" name="Screen_Shot_2019-03-11_at_8_09_40_AM.png" descr="Screen_Shot_2019-03-11_at_8_09_40_AM.png"/>
           <p:cNvPicPr>
             <a:picLocks noChangeAspect="1"/>
           </p:cNvPicPr>
@@ -5343,7 +5723,7 @@
       </p:pic>
       <p:sp>
         <p:nvSpPr>
-          <p:cNvPr id="221" name="Bump (in salary)"/>
+          <p:cNvPr id="230" name="Bump (in salary)"/>
           <p:cNvSpPr txBox="1"/>
           <p:nvPr>
             <p:ph type="title"/>
@@ -5367,7 +5747,7 @@
       </p:sp>
       <p:sp>
         <p:nvSpPr>
-          <p:cNvPr id="222" name="Company Change"/>
+          <p:cNvPr id="231" name="Company Change"/>
           <p:cNvSpPr txBox="1"/>
           <p:nvPr/>
         </p:nvSpPr>
@@ -5403,7 +5783,7 @@
       </p:sp>
       <p:sp>
         <p:nvSpPr>
-          <p:cNvPr id="223" name="Position Change"/>
+          <p:cNvPr id="232" name="Position Change"/>
           <p:cNvSpPr txBox="1"/>
           <p:nvPr/>
         </p:nvSpPr>
@@ -5439,7 +5819,7 @@
       </p:sp>
       <p:sp>
         <p:nvSpPr>
-          <p:cNvPr id="224" name="Working for Self"/>
+          <p:cNvPr id="233" name="Working for Self"/>
           <p:cNvSpPr txBox="1"/>
           <p:nvPr/>
         </p:nvSpPr>
@@ -5475,7 +5855,7 @@
       </p:sp>
       <p:sp>
         <p:nvSpPr>
-          <p:cNvPr id="225" name="Line"/>
+          <p:cNvPr id="234" name="Line"/>
           <p:cNvSpPr/>
           <p:nvPr/>
         </p:nvSpPr>
@@ -5512,7 +5892,7 @@
       </p:sp>
       <p:sp>
         <p:nvSpPr>
-          <p:cNvPr id="226" name="Line"/>
+          <p:cNvPr id="235" name="Line"/>
           <p:cNvSpPr/>
           <p:nvPr/>
         </p:nvSpPr>
@@ -5549,7 +5929,7 @@
       </p:sp>
       <p:sp>
         <p:nvSpPr>
-          <p:cNvPr id="227" name="Line"/>
+          <p:cNvPr id="236" name="Line"/>
           <p:cNvSpPr/>
           <p:nvPr/>
         </p:nvSpPr>
@@ -5586,7 +5966,7 @@
       </p:sp>
       <p:sp>
         <p:nvSpPr>
-          <p:cNvPr id="228" name="Line"/>
+          <p:cNvPr id="237" name="Line"/>
           <p:cNvSpPr/>
           <p:nvPr/>
         </p:nvSpPr>
@@ -5623,7 +6003,7 @@
       </p:sp>
       <p:sp>
         <p:nvSpPr>
-          <p:cNvPr id="229" name="Line"/>
+          <p:cNvPr id="238" name="Line"/>
           <p:cNvSpPr/>
           <p:nvPr/>
         </p:nvSpPr>
@@ -5663,7 +6043,7 @@
       </p:sp>
       <p:sp>
         <p:nvSpPr>
-          <p:cNvPr id="230" name="Line"/>
+          <p:cNvPr id="239" name="Line"/>
           <p:cNvSpPr/>
           <p:nvPr/>
         </p:nvSpPr>
@@ -5700,7 +6080,7 @@
       </p:sp>
       <p:sp>
         <p:nvSpPr>
-          <p:cNvPr id="231" name="Line"/>
+          <p:cNvPr id="240" name="Line"/>
           <p:cNvSpPr/>
           <p:nvPr/>
         </p:nvSpPr>
@@ -5737,7 +6117,7 @@
       </p:sp>
       <p:sp>
         <p:nvSpPr>
-          <p:cNvPr id="232" name="Line"/>
+          <p:cNvPr id="241" name="Line"/>
           <p:cNvSpPr/>
           <p:nvPr/>
         </p:nvSpPr>
@@ -5774,7 +6154,7 @@
       </p:sp>
       <p:sp>
         <p:nvSpPr>
-          <p:cNvPr id="233" name="Line"/>
+          <p:cNvPr id="242" name="Line"/>
           <p:cNvSpPr/>
           <p:nvPr/>
         </p:nvSpPr>
@@ -5811,7 +6191,7 @@
       </p:sp>
       <p:sp>
         <p:nvSpPr>
-          <p:cNvPr id="234" name="Line"/>
+          <p:cNvPr id="243" name="Line"/>
           <p:cNvSpPr/>
           <p:nvPr/>
         </p:nvSpPr>
@@ -5848,7 +6228,7 @@
       </p:sp>
       <p:sp>
         <p:nvSpPr>
-          <p:cNvPr id="235" name="Line"/>
+          <p:cNvPr id="244" name="Line"/>
           <p:cNvSpPr/>
           <p:nvPr/>
         </p:nvSpPr>
@@ -5911,7 +6291,7 @@
       </p:grpSpPr>
       <p:sp>
         <p:nvSpPr>
-          <p:cNvPr id="237" name="Burnout"/>
+          <p:cNvPr id="246" name="Burnout"/>
           <p:cNvSpPr txBox="1"/>
           <p:nvPr>
             <p:ph type="title"/>
@@ -5935,7 +6315,7 @@
       </p:sp>
       <p:pic>
         <p:nvPicPr>
-          <p:cNvPr id="238" name="maxresdefault.jpg" descr="maxresdefault.jpg"/>
+          <p:cNvPr id="247" name="maxresdefault.jpg" descr="maxresdefault.jpg"/>
           <p:cNvPicPr>
             <a:picLocks noChangeAspect="1"/>
           </p:cNvPicPr>
@@ -5990,7 +6370,7 @@
       </p:grpSpPr>
       <p:sp>
         <p:nvSpPr>
-          <p:cNvPr id="240" name="Boredom"/>
+          <p:cNvPr id="249" name="Boredom"/>
           <p:cNvSpPr txBox="1"/>
           <p:nvPr>
             <p:ph type="title"/>
@@ -6014,7 +6394,7 @@
       </p:sp>
       <p:pic>
         <p:nvPicPr>
-          <p:cNvPr id="241" name="Paper.Notes.23.png" descr="Paper.Notes.23.png"/>
+          <p:cNvPr id="250" name="Paper.Notes.23.png" descr="Paper.Notes.23.png"/>
           <p:cNvPicPr>
             <a:picLocks noChangeAspect="1"/>
           </p:cNvPicPr>
@@ -6031,7 +6411,7 @@
         </p:blipFill>
         <p:spPr>
           <a:xfrm>
-            <a:off x="7183866" y="5262102"/>
+            <a:off x="7183866" y="4770395"/>
             <a:ext cx="5247083" cy="4080301"/>
           </a:xfrm>
           <a:prstGeom prst="rect">
@@ -6044,7 +6424,7 @@
       </p:pic>
       <p:pic>
         <p:nvPicPr>
-          <p:cNvPr id="242" name="Paper.Notes.23.png" descr="Paper.Notes.23.png"/>
+          <p:cNvPr id="251" name="Paper.Notes.23.png" descr="Paper.Notes.23.png"/>
           <p:cNvPicPr>
             <a:picLocks noChangeAspect="1"/>
           </p:cNvPicPr>
@@ -6074,14 +6454,14 @@
       </p:pic>
       <p:sp>
         <p:nvSpPr>
-          <p:cNvPr id="243" name="“Disrupt yourself”, by Whitney Johnson"/>
+          <p:cNvPr id="252" name="“Disrupt yourself”, by Whitney Johnson"/>
           <p:cNvSpPr txBox="1"/>
           <p:nvPr/>
         </p:nvSpPr>
         <p:spPr>
           <a:xfrm>
-            <a:off x="196897" y="9066895"/>
-            <a:ext cx="4120059" cy="374601"/>
+            <a:off x="8615887" y="9126860"/>
+            <a:ext cx="4120059" cy="374600"/>
           </a:xfrm>
           <a:prstGeom prst="rect">
             <a:avLst/>
@@ -6140,7 +6520,7 @@
       </p:grpSpPr>
       <p:sp>
         <p:nvSpPr>
-          <p:cNvPr id="245" name="–Peter Diamandis…"/>
+          <p:cNvPr id="254" name="–Peter Diamandis…"/>
           <p:cNvSpPr txBox="1"/>
           <p:nvPr>
             <p:ph type="body" idx="13"/>
@@ -6174,7 +6554,7 @@
       </p:sp>
       <p:sp>
         <p:nvSpPr>
-          <p:cNvPr id="246" name="“If you don’t disrupt yourself, somebody else will”"/>
+          <p:cNvPr id="255" name="“If you don’t disrupt yourself, somebody else will”"/>
           <p:cNvSpPr txBox="1"/>
           <p:nvPr>
             <p:ph type="body" idx="14"/>
@@ -6224,7 +6604,7 @@
       </p:grpSpPr>
       <p:sp>
         <p:nvSpPr>
-          <p:cNvPr id="248" name="So disrupt yourself"/>
+          <p:cNvPr id="257" name="So disrupt yourself"/>
           <p:cNvSpPr txBox="1"/>
           <p:nvPr/>
         </p:nvSpPr>
@@ -6260,7 +6640,7 @@
       </p:sp>
       <p:sp>
         <p:nvSpPr>
-          <p:cNvPr id="249" name="on your terms"/>
+          <p:cNvPr id="258" name="on your terms"/>
           <p:cNvSpPr txBox="1"/>
           <p:nvPr/>
         </p:nvSpPr>
@@ -6296,7 +6676,7 @@
       </p:sp>
       <p:sp>
         <p:nvSpPr>
-          <p:cNvPr id="250" name="and plan it like a chess move"/>
+          <p:cNvPr id="259" name="and plan it like a chess move"/>
           <p:cNvSpPr txBox="1"/>
           <p:nvPr/>
         </p:nvSpPr>
@@ -6369,7 +6749,7 @@
                                       <p:cBhvr>
                                         <p:cTn id="6" fill="hold"/>
                                         <p:tgtEl>
-                                          <p:spTgt spid="248"/>
+                                          <p:spTgt spid="257"/>
                                         </p:tgtEl>
                                         <p:attrNameLst>
                                           <p:attrName>style.visibility</p:attrName>
@@ -6413,7 +6793,7 @@
                                       <p:cBhvr>
                                         <p:cTn id="10" fill="hold"/>
                                         <p:tgtEl>
-                                          <p:spTgt spid="249"/>
+                                          <p:spTgt spid="258"/>
                                         </p:tgtEl>
                                         <p:attrNameLst>
                                           <p:attrName>style.visibility</p:attrName>
@@ -6457,7 +6837,7 @@
                                       <p:cBhvr>
                                         <p:cTn id="14" fill="hold"/>
                                         <p:tgtEl>
-                                          <p:spTgt spid="250"/>
+                                          <p:spTgt spid="259"/>
                                         </p:tgtEl>
                                         <p:attrNameLst>
                                           <p:attrName>style.visibility</p:attrName>
@@ -6498,9 +6878,9 @@
       </p:par>
     </p:tnLst>
     <p:bldLst>
-      <p:bldP build="whole" bldLvl="1" animBg="1" rev="0" advAuto="0" spid="249" grpId="2"/>
-      <p:bldP build="whole" bldLvl="1" animBg="1" rev="0" advAuto="0" spid="250" grpId="3"/>
-      <p:bldP build="whole" bldLvl="1" animBg="1" rev="0" advAuto="0" spid="248" grpId="1"/>
+      <p:bldP build="whole" bldLvl="1" animBg="1" rev="0" advAuto="0" spid="258" grpId="2"/>
+      <p:bldP build="whole" bldLvl="1" animBg="1" rev="0" advAuto="0" spid="259" grpId="3"/>
+      <p:bldP build="whole" bldLvl="1" animBg="1" rev="0" advAuto="0" spid="257" grpId="1"/>
     </p:bldLst>
   </p:timing>
 </p:sld>
@@ -6525,7 +6905,7 @@
       </p:grpSpPr>
       <p:sp>
         <p:nvSpPr>
-          <p:cNvPr id="252" name="Thank You"/>
+          <p:cNvPr id="261" name="Thank You"/>
           <p:cNvSpPr txBox="1"/>
           <p:nvPr/>
         </p:nvSpPr>
@@ -6555,46 +6935,6 @@
             <a:pPr/>
             <a:r>
               <a:t>Thank You</a:t>
-            </a:r>
-          </a:p>
-        </p:txBody>
-      </p:sp>
-      <p:sp>
-        <p:nvSpPr>
-          <p:cNvPr id="253" name="http://bit.ly/next_move"/>
-          <p:cNvSpPr txBox="1"/>
-          <p:nvPr/>
-        </p:nvSpPr>
-        <p:spPr>
-          <a:xfrm>
-            <a:off x="160617" y="9138853"/>
-            <a:ext cx="2417675" cy="374600"/>
-          </a:xfrm>
-          <a:prstGeom prst="rect">
-            <a:avLst/>
-          </a:prstGeom>
-          <a:ln w="12700">
-            <a:miter lim="400000"/>
-          </a:ln>
-          <a:extLst>
-            <a:ext uri="{C572A759-6A51-4108-AA02-DFA0A04FC94B}">
-              <ma14:wrappingTextBoxFlag xmlns:ma14="http://schemas.microsoft.com/office/mac/drawingml/2011/main" val="1"/>
-            </a:ext>
-          </a:extLst>
-        </p:spPr>
-        <p:txBody>
-          <a:bodyPr wrap="none" lIns="50800" tIns="50800" rIns="50800" bIns="50800" anchor="ctr">
-            <a:spAutoFit/>
-          </a:bodyPr>
-          <a:lstStyle>
-            <a:lvl1pPr>
-              <a:defRPr b="0" sz="1800"/>
-            </a:lvl1pPr>
-          </a:lstStyle>
-          <a:p>
-            <a:pPr/>
-            <a:r>
-              <a:t>http://bit.ly/next_move</a:t>
             </a:r>
           </a:p>
         </p:txBody>
@@ -6627,7 +6967,7 @@
       </p:grpSpPr>
       <p:sp>
         <p:nvSpPr>
-          <p:cNvPr id="138" name="Mental Model"/>
+          <p:cNvPr id="148" name="Mental Model"/>
           <p:cNvSpPr txBox="1"/>
           <p:nvPr>
             <p:ph type="title"/>
@@ -6651,7 +6991,7 @@
       </p:sp>
       <p:pic>
         <p:nvPicPr>
-          <p:cNvPr id="139" name="For-True-School-ChangeUnderstand-Your-Mental-Models_NO-TITLE.jpg" descr="For-True-School-ChangeUnderstand-Your-Mental-Models_NO-TITLE.jpg"/>
+          <p:cNvPr id="149" name="For-True-School-ChangeUnderstand-Your-Mental-Models_NO-TITLE.jpg" descr="For-True-School-ChangeUnderstand-Your-Mental-Models_NO-TITLE.jpg"/>
           <p:cNvPicPr>
             <a:picLocks noChangeAspect="0"/>
           </p:cNvPicPr>
@@ -6677,7 +7017,7 @@
       </p:pic>
       <p:pic>
         <p:nvPicPr>
-          <p:cNvPr id="140" name="The-Dark-Knight.jpeg" descr="The-Dark-Knight.jpeg"/>
+          <p:cNvPr id="150" name="The-Dark-Knight.jpeg" descr="The-Dark-Knight.jpeg"/>
           <p:cNvPicPr>
             <a:picLocks noChangeAspect="0"/>
           </p:cNvPicPr>
@@ -6703,7 +7043,7 @@
       </p:pic>
       <p:pic>
         <p:nvPicPr>
-          <p:cNvPr id="141" name="Ladder5.jpg" descr="Ladder5.jpg"/>
+          <p:cNvPr id="151" name="Ladder5.jpg" descr="Ladder5.jpg"/>
           <p:cNvPicPr>
             <a:picLocks noChangeAspect="0"/>
           </p:cNvPicPr>
@@ -6766,7 +7106,7 @@
                                       <p:cBhvr>
                                         <p:cTn id="6" fill="hold"/>
                                         <p:tgtEl>
-                                          <p:spTgt spid="141"/>
+                                          <p:spTgt spid="151"/>
                                         </p:tgtEl>
                                         <p:attrNameLst>
                                           <p:attrName>style.visibility</p:attrName>
@@ -6814,7 +7154,7 @@
                                           </p:stCondLst>
                                         </p:cTn>
                                         <p:tgtEl>
-                                          <p:spTgt spid="141"/>
+                                          <p:spTgt spid="151"/>
                                         </p:tgtEl>
                                         <p:attrNameLst>
                                           <p:attrName>style.visibility</p:attrName>
@@ -6858,7 +7198,7 @@
                                       <p:cBhvr>
                                         <p:cTn id="14" fill="hold"/>
                                         <p:tgtEl>
-                                          <p:spTgt spid="140"/>
+                                          <p:spTgt spid="150"/>
                                         </p:tgtEl>
                                         <p:attrNameLst>
                                           <p:attrName>style.visibility</p:attrName>
@@ -6899,11 +7239,256 @@
       </p:par>
     </p:tnLst>
     <p:bldLst>
-      <p:bldP build="whole" bldLvl="1" animBg="1" rev="0" advAuto="0" spid="141" grpId="1"/>
-      <p:bldP build="whole" bldLvl="1" animBg="1" rev="0" advAuto="0" spid="141" grpId="2"/>
-      <p:bldP build="whole" bldLvl="1" animBg="1" rev="0" advAuto="0" spid="140" grpId="3"/>
+      <p:bldP build="whole" bldLvl="1" animBg="1" rev="0" advAuto="0" spid="151" grpId="1"/>
+      <p:bldP build="whole" bldLvl="1" animBg="1" rev="0" advAuto="0" spid="151" grpId="2"/>
+      <p:bldP build="whole" bldLvl="1" animBg="1" rev="0" advAuto="0" spid="150" grpId="3"/>
     </p:bldLst>
   </p:timing>
+</p:sld>
+</file>
+
+<file path=ppt/slides/slide30.xml><?xml version="1.0" encoding="utf-8"?>
+<p:sld xmlns:a="http://schemas.openxmlformats.org/drawingml/2006/main" xmlns:r="http://schemas.openxmlformats.org/officeDocument/2006/relationships" xmlns:p="http://schemas.openxmlformats.org/presentationml/2006/main" xmlns:m="http://schemas.openxmlformats.org/officeDocument/2006/math" xmlns:a14="http://schemas.microsoft.com/office/drawing/2010/main" showMasterSp="1" showMasterPhAnim="1">
+  <p:cSld>
+    <p:spTree>
+      <p:nvGrpSpPr>
+        <p:cNvPr id="1" name=""/>
+        <p:cNvGrpSpPr/>
+        <p:nvPr/>
+      </p:nvGrpSpPr>
+      <p:grpSpPr>
+        <a:xfrm>
+          <a:off x="0" y="0"/>
+          <a:ext cx="0" cy="0"/>
+          <a:chOff x="0" y="0"/>
+          <a:chExt cx="0" cy="0"/>
+        </a:xfrm>
+      </p:grpSpPr>
+      <p:sp>
+        <p:nvSpPr>
+          <p:cNvPr id="263" name="References"/>
+          <p:cNvSpPr txBox="1"/>
+          <p:nvPr>
+            <p:ph type="title"/>
+          </p:nvPr>
+        </p:nvSpPr>
+        <p:spPr>
+          <a:prstGeom prst="rect">
+            <a:avLst/>
+          </a:prstGeom>
+        </p:spPr>
+        <p:txBody>
+          <a:bodyPr/>
+          <a:lstStyle/>
+          <a:p>
+            <a:pPr/>
+            <a:r>
+              <a:t>References</a:t>
+            </a:r>
+          </a:p>
+        </p:txBody>
+      </p:sp>
+      <p:sp>
+        <p:nvSpPr>
+          <p:cNvPr id="264" name="Make A Career Plan (https://capd.mit.edu/explore-careers/career-first-steps/make-career-plan)…"/>
+          <p:cNvSpPr txBox="1"/>
+          <p:nvPr>
+            <p:ph type="body" idx="1"/>
+          </p:nvPr>
+        </p:nvSpPr>
+        <p:spPr>
+          <a:prstGeom prst="rect">
+            <a:avLst/>
+          </a:prstGeom>
+        </p:spPr>
+        <p:txBody>
+          <a:bodyPr/>
+          <a:lstStyle/>
+          <a:p>
+            <a:pPr marL="244475" indent="-244475" defTabSz="321310">
+              <a:spcBef>
+                <a:spcPts val="2300"/>
+              </a:spcBef>
+              <a:defRPr sz="1760"/>
+            </a:pPr>
+            <a:r>
+              <a:t>Make A Career Plan (</a:t>
+            </a:r>
+            <a:r>
+              <a:rPr u="sng">
+                <a:hlinkClick r:id="rId2" invalidUrl="" action="" tgtFrame="" tooltip="" history="1" highlightClick="0" endSnd="0"/>
+              </a:rPr>
+              <a:t>https://capd.mit.edu/explore-careers/career-first-steps/make-career-plan</a:t>
+            </a:r>
+            <a:r>
+              <a:t>)</a:t>
+            </a:r>
+          </a:p>
+          <a:p>
+            <a:pPr marL="244475" indent="-244475" defTabSz="321310">
+              <a:spcBef>
+                <a:spcPts val="2300"/>
+              </a:spcBef>
+              <a:defRPr sz="1760"/>
+            </a:pPr>
+            <a:r>
+              <a:t>Suggestions for a Good Development Plan (</a:t>
+            </a:r>
+            <a:r>
+              <a:rPr u="sng">
+                <a:hlinkClick r:id="rId3" invalidUrl="" action="" tgtFrame="" tooltip="" history="1" highlightClick="0" endSnd="0"/>
+              </a:rPr>
+              <a:t>https://www.ninds.nih.gov/Funding/Training-Career-Awards/Mentored-Career-Awards/Suggestions-Good-Career-Development-Plan</a:t>
+            </a:r>
+            <a:r>
+              <a:t>)</a:t>
+            </a:r>
+          </a:p>
+          <a:p>
+            <a:pPr marL="244475" indent="-244475" defTabSz="321310">
+              <a:spcBef>
+                <a:spcPts val="2300"/>
+              </a:spcBef>
+              <a:defRPr sz="1760"/>
+            </a:pPr>
+            <a:r>
+              <a:t>3 Steps to Create Your Own Career Development Plan (</a:t>
+            </a:r>
+            <a:r>
+              <a:rPr u="sng">
+                <a:hlinkClick r:id="rId4" invalidUrl="" action="" tgtFrame="" tooltip="" history="1" highlightClick="0" endSnd="0"/>
+              </a:rPr>
+              <a:t>https://www.workitdaily.com/steps-career-development-plan</a:t>
+            </a:r>
+            <a:r>
+              <a:t>)</a:t>
+            </a:r>
+          </a:p>
+          <a:p>
+            <a:pPr marL="244475" indent="-244475" defTabSz="321310">
+              <a:spcBef>
+                <a:spcPts val="2300"/>
+              </a:spcBef>
+              <a:defRPr sz="1760"/>
+            </a:pPr>
+            <a:r>
+              <a:t>A Simple Way To Map Out Your Career Ambitions (</a:t>
+            </a:r>
+            <a:r>
+              <a:rPr u="sng">
+                <a:hlinkClick r:id="rId5" invalidUrl="" action="" tgtFrame="" tooltip="" history="1" highlightClick="0" endSnd="0"/>
+              </a:rPr>
+              <a:t>https://hbr.org/2018/11/a-simple-way-to-map-out-your-career-ambitions</a:t>
+            </a:r>
+            <a:r>
+              <a:t>)</a:t>
+            </a:r>
+          </a:p>
+          <a:p>
+            <a:pPr marL="244475" indent="-244475" defTabSz="321310">
+              <a:spcBef>
+                <a:spcPts val="2300"/>
+              </a:spcBef>
+              <a:defRPr sz="1760"/>
+            </a:pPr>
+            <a:r>
+              <a:t>The 70-20-10 Model for Learning and Development (</a:t>
+            </a:r>
+            <a:r>
+              <a:rPr u="sng">
+                <a:hlinkClick r:id="rId6" invalidUrl="" action="" tgtFrame="" tooltip="" history="1" highlightClick="0" endSnd="0"/>
+              </a:rPr>
+              <a:t>https://trainingindustry.com/wiki/content-development/the-702010-model-for-learning-and-development/</a:t>
+            </a:r>
+            <a:r>
+              <a:t>)</a:t>
+            </a:r>
+          </a:p>
+          <a:p>
+            <a:pPr marL="244475" indent="-244475" defTabSz="321310">
+              <a:spcBef>
+                <a:spcPts val="2300"/>
+              </a:spcBef>
+              <a:defRPr sz="1760"/>
+            </a:pPr>
+            <a:r>
+              <a:t>The Secret to Finding Lasting Career Satisfaction (</a:t>
+            </a:r>
+            <a:r>
+              <a:rPr u="sng">
+                <a:hlinkClick r:id="rId7" invalidUrl="" action="" tgtFrame="" tooltip="" history="1" highlightClick="0" endSnd="0"/>
+              </a:rPr>
+              <a:t>https://www.gsb.stanford.edu/insights/secret-finding-lasting-career-satisfaction</a:t>
+            </a:r>
+            <a:r>
+              <a:t>)</a:t>
+            </a:r>
+          </a:p>
+          <a:p>
+            <a:pPr marL="244475" indent="-244475" defTabSz="321310">
+              <a:spcBef>
+                <a:spcPts val="2300"/>
+              </a:spcBef>
+              <a:defRPr sz="1760"/>
+            </a:pPr>
+            <a:r>
+              <a:t>Why You Should Journey Map Your Life (</a:t>
+            </a:r>
+            <a:r>
+              <a:rPr u="sng">
+                <a:hlinkClick r:id="rId8" invalidUrl="" action="" tgtFrame="" tooltip="" history="1" highlightClick="0" endSnd="0"/>
+              </a:rPr>
+              <a:t>https://theuxblog.com/blog/customer-journey-mapping</a:t>
+            </a:r>
+          </a:p>
+          <a:p>
+            <a:pPr marL="244475" indent="-244475" defTabSz="321310">
+              <a:spcBef>
+                <a:spcPts val="2300"/>
+              </a:spcBef>
+              <a:defRPr sz="1760"/>
+            </a:pPr>
+            <a:r>
+              <a:t>How Will You Measure Your Life (</a:t>
+            </a:r>
+            <a:r>
+              <a:rPr u="sng">
+                <a:hlinkClick r:id="rId9" invalidUrl="" action="" tgtFrame="" tooltip="" history="1" highlightClick="0" endSnd="0"/>
+              </a:rPr>
+              <a:t>https://hbr.org/2010/07/how-will-you-measure-your-life</a:t>
+            </a:r>
+            <a:r>
+              <a:t>)</a:t>
+            </a:r>
+          </a:p>
+          <a:p>
+            <a:pPr marL="244475" indent="-244475" defTabSz="321310">
+              <a:spcBef>
+                <a:spcPts val="2300"/>
+              </a:spcBef>
+              <a:defRPr sz="1760"/>
+            </a:pPr>
+            <a:r>
+              <a:t>Managing Oneself (</a:t>
+            </a:r>
+            <a:r>
+              <a:rPr u="sng">
+                <a:hlinkClick r:id="rId10" invalidUrl="" action="" tgtFrame="" tooltip="" history="1" highlightClick="0" endSnd="0"/>
+              </a:rPr>
+              <a:t>https://hbr.org/2005/01/managing-oneself</a:t>
+            </a:r>
+            <a:r>
+              <a:t>)</a:t>
+            </a:r>
+          </a:p>
+        </p:txBody>
+      </p:sp>
+    </p:spTree>
+  </p:cSld>
+  <p:clrMapOvr>
+    <a:masterClrMapping/>
+  </p:clrMapOvr>
+  <p:transition xmlns:p14="http://schemas.microsoft.com/office/powerpoint/2010/main" spd="med" advClick="1"/>
 </p:sld>
 </file>
 
@@ -6926,7 +7511,7 @@
       </p:grpSpPr>
       <p:pic>
         <p:nvPicPr>
-          <p:cNvPr id="143" name="RF0101_1X__65520__46828.1529938067.jpg" descr="RF0101_1X__65520__46828.1529938067.jpg"/>
+          <p:cNvPr id="153" name="RF0101_1X__65520__46828.1529938067.jpg" descr="RF0101_1X__65520__46828.1529938067.jpg"/>
           <p:cNvPicPr>
             <a:picLocks noChangeAspect="1"/>
           </p:cNvPicPr>
@@ -6955,7 +7540,7 @@
       </p:pic>
       <p:sp>
         <p:nvSpPr>
-          <p:cNvPr id="144" name="Horizontal Axis…"/>
+          <p:cNvPr id="154" name="Horizontal Axis…"/>
           <p:cNvSpPr txBox="1"/>
           <p:nvPr/>
         </p:nvSpPr>
@@ -7090,7 +7675,7 @@
       </p:sp>
       <p:sp>
         <p:nvSpPr>
-          <p:cNvPr id="145" name="Vertical Axis…"/>
+          <p:cNvPr id="155" name="Vertical Axis…"/>
           <p:cNvSpPr txBox="1"/>
           <p:nvPr/>
         </p:nvSpPr>
@@ -7243,7 +7828,7 @@
                                       <p:cBhvr>
                                         <p:cTn id="6" dur="1000" fill="hold"/>
                                         <p:tgtEl>
-                                          <p:spTgt spid="143"/>
+                                          <p:spTgt spid="153"/>
                                         </p:tgtEl>
                                         <p:attrNameLst>
                                           <p:attrName>ppt_x</p:attrName>
@@ -7285,7 +7870,7 @@
                                       <p:cBhvr>
                                         <p:cTn id="10" fill="hold"/>
                                         <p:tgtEl>
-                                          <p:spTgt spid="144"/>
+                                          <p:spTgt spid="154"/>
                                         </p:tgtEl>
                                         <p:attrNameLst>
                                           <p:attrName>style.visibility</p:attrName>
@@ -7329,7 +7914,7 @@
                                       <p:cBhvr>
                                         <p:cTn id="14" fill="hold"/>
                                         <p:tgtEl>
-                                          <p:spTgt spid="145"/>
+                                          <p:spTgt spid="155"/>
                                         </p:tgtEl>
                                         <p:attrNameLst>
                                           <p:attrName>style.visibility</p:attrName>
@@ -7370,8 +7955,8 @@
       </p:par>
     </p:tnLst>
     <p:bldLst>
-      <p:bldP build="whole" bldLvl="1" animBg="1" rev="0" advAuto="0" spid="145" grpId="3"/>
-      <p:bldP build="whole" bldLvl="1" animBg="1" rev="0" advAuto="0" spid="144" grpId="2"/>
+      <p:bldP build="whole" bldLvl="1" animBg="1" rev="0" advAuto="0" spid="154" grpId="2"/>
+      <p:bldP build="whole" bldLvl="1" animBg="1" rev="0" advAuto="0" spid="155" grpId="3"/>
     </p:bldLst>
   </p:timing>
 </p:sld>
@@ -7396,7 +7981,7 @@
       </p:grpSpPr>
       <p:pic>
         <p:nvPicPr>
-          <p:cNvPr id="147" name="growth_ratio.jpg" descr="growth_ratio.jpg"/>
+          <p:cNvPr id="157" name="growth_ratio.jpg" descr="growth_ratio.jpg"/>
           <p:cNvPicPr>
             <a:picLocks noChangeAspect="1"/>
           </p:cNvPicPr>
@@ -7425,7 +8010,7 @@
       </p:pic>
       <p:sp>
         <p:nvSpPr>
-          <p:cNvPr id="148" name="The 70-20-10 Rule"/>
+          <p:cNvPr id="158" name="The 70-20-10 Rule"/>
           <p:cNvSpPr txBox="1"/>
           <p:nvPr>
             <p:ph type="title"/>
@@ -7449,7 +8034,7 @@
       </p:sp>
       <p:sp>
         <p:nvSpPr>
-          <p:cNvPr id="149" name="70% Work Experience…"/>
+          <p:cNvPr id="159" name="70% Work Experience…"/>
           <p:cNvSpPr txBox="1"/>
           <p:nvPr>
             <p:ph type="body" sz="quarter" idx="1"/>
@@ -7489,7 +8074,7 @@
       </p:sp>
       <p:sp>
         <p:nvSpPr>
-          <p:cNvPr id="150" name="Professional Growth Ratio"/>
+          <p:cNvPr id="160" name="Professional Growth Ratio"/>
           <p:cNvSpPr txBox="1"/>
           <p:nvPr/>
         </p:nvSpPr>
@@ -7558,7 +8143,7 @@
       </p:grpSpPr>
       <p:pic>
         <p:nvPicPr>
-          <p:cNvPr id="152" name="maxresdefault.jpg" descr="maxresdefault.jpg"/>
+          <p:cNvPr id="162" name="maxresdefault.jpg" descr="maxresdefault.jpg"/>
           <p:cNvPicPr>
             <a:picLocks noChangeAspect="0"/>
           </p:cNvPicPr>
@@ -7587,7 +8172,7 @@
       </p:pic>
       <p:sp>
         <p:nvSpPr>
-          <p:cNvPr id="153" name="Tools to Help Navigate Your Next Move"/>
+          <p:cNvPr id="163" name="Tools to Help Navigate Your Next Move"/>
           <p:cNvSpPr txBox="1"/>
           <p:nvPr>
             <p:ph type="title"/>
@@ -7615,7 +8200,7 @@
       </p:sp>
       <p:sp>
         <p:nvSpPr>
-          <p:cNvPr id="154" name="Body"/>
+          <p:cNvPr id="164" name="Body"/>
           <p:cNvSpPr txBox="1"/>
           <p:nvPr>
             <p:ph type="body" sz="quarter" idx="1"/>
@@ -7662,7 +8247,7 @@
       </p:grpSpPr>
       <p:pic>
         <p:nvPicPr>
-          <p:cNvPr id="156" name="Map-Your-Career-mind-map.jpg" descr="Map-Your-Career-mind-map.jpg"/>
+          <p:cNvPr id="166" name="Map-Your-Career-mind-map.jpg" descr="Map-Your-Career-mind-map.jpg"/>
           <p:cNvPicPr>
             <a:picLocks noChangeAspect="0"/>
           </p:cNvPicPr>
@@ -7691,7 +8276,7 @@
       </p:pic>
       <p:sp>
         <p:nvSpPr>
-          <p:cNvPr id="157" name="Personal Experience Map"/>
+          <p:cNvPr id="167" name="Personal Experience Map"/>
           <p:cNvSpPr txBox="1"/>
           <p:nvPr>
             <p:ph type="title"/>
@@ -7715,7 +8300,7 @@
       </p:sp>
       <p:sp>
         <p:nvSpPr>
-          <p:cNvPr id="158" name="Body"/>
+          <p:cNvPr id="168" name="Body"/>
           <p:cNvSpPr txBox="1"/>
           <p:nvPr>
             <p:ph type="body" sz="quarter" idx="1"/>
@@ -7762,7 +8347,7 @@
       </p:grpSpPr>
       <p:sp>
         <p:nvSpPr>
-          <p:cNvPr id="160" name="Experiences"/>
+          <p:cNvPr id="170" name="Experiences"/>
           <p:cNvSpPr txBox="1"/>
           <p:nvPr>
             <p:ph type="title"/>
@@ -7786,7 +8371,7 @@
       </p:sp>
       <p:sp>
         <p:nvSpPr>
-          <p:cNvPr id="161" name="Two types of experience…"/>
+          <p:cNvPr id="171" name="Two types of experience…"/>
           <p:cNvSpPr txBox="1"/>
           <p:nvPr>
             <p:ph type="body" sz="half" idx="1"/>
@@ -7852,7 +8437,7 @@
       </p:sp>
       <p:pic>
         <p:nvPicPr>
-          <p:cNvPr id="162" name="images.jpeg" descr="images.jpeg"/>
+          <p:cNvPr id="172" name="images.jpeg" descr="images.jpeg"/>
           <p:cNvPicPr>
             <a:picLocks noChangeAspect="1"/>
           </p:cNvPicPr>
@@ -7881,7 +8466,7 @@
       </p:pic>
       <p:pic>
         <p:nvPicPr>
-          <p:cNvPr id="163" name="1_w_gG-CXQX4TV3B5bN24nqg.png" descr="1_w_gG-CXQX4TV3B5bN24nqg.png"/>
+          <p:cNvPr id="173" name="1_w_gG-CXQX4TV3B5bN24nqg.png" descr="1_w_gG-CXQX4TV3B5bN24nqg.png"/>
           <p:cNvPicPr>
             <a:picLocks noChangeAspect="1"/>
           </p:cNvPicPr>
@@ -7936,7 +8521,7 @@
       </p:grpSpPr>
       <p:sp>
         <p:nvSpPr>
-          <p:cNvPr id="165" name="Interview Experts"/>
+          <p:cNvPr id="175" name="Interview Experts"/>
           <p:cNvSpPr txBox="1"/>
           <p:nvPr>
             <p:ph type="title"/>
@@ -7960,7 +8545,7 @@
       </p:sp>
       <p:sp>
         <p:nvSpPr>
-          <p:cNvPr id="166" name="Interview best and brightest in the field, ask them what helped them get to where they are…"/>
+          <p:cNvPr id="176" name="Interview best and brightest in the field, ask them what helped them get to where they are…"/>
           <p:cNvSpPr txBox="1"/>
           <p:nvPr>
             <p:ph type="body" idx="1"/>

</xml_diff>

<commit_message>
fixed mistake in % change on salary xlsx
</commit_message>
<xml_diff>
--- a/files/next_move.pptx
+++ b/files/next_move.pptx
@@ -5156,7 +5156,7 @@
         <p:spPr>
           <a:xfrm>
             <a:off x="952500" y="1672106"/>
-            <a:ext cx="11099801" cy="3191512"/>
+            <a:ext cx="11099800" cy="3191512"/>
           </a:xfrm>
           <a:prstGeom prst="rect">
             <a:avLst/>
@@ -5232,8 +5232,8 @@
         </p:nvSpPr>
         <p:spPr>
           <a:xfrm>
-            <a:off x="952499" y="5429571"/>
-            <a:ext cx="11099801" cy="3045617"/>
+            <a:off x="952500" y="5429571"/>
+            <a:ext cx="11099800" cy="3045617"/>
           </a:xfrm>
           <a:prstGeom prst="rect">
             <a:avLst/>
@@ -5694,7 +5694,7 @@
       </p:grpSpPr>
       <p:pic>
         <p:nvPicPr>
-          <p:cNvPr id="229" name="Screen_Shot_2019-03-11_at_8_09_40_AM.png" descr="Screen_Shot_2019-03-11_at_8_09_40_AM.png"/>
+          <p:cNvPr id="229" name="Screen_Shot_2019-04-04_at_10_33_37_PM.png" descr="Screen_Shot_2019-04-04_at_10_33_37_PM.png"/>
           <p:cNvPicPr>
             <a:picLocks noChangeAspect="1"/>
           </p:cNvPicPr>
@@ -5710,8 +5710,8 @@
         </p:blipFill>
         <p:spPr>
           <a:xfrm>
-            <a:off x="1855745" y="2227356"/>
-            <a:ext cx="4843852" cy="7018641"/>
+            <a:off x="1949522" y="2296973"/>
+            <a:ext cx="4749897" cy="6876159"/>
           </a:xfrm>
           <a:prstGeom prst="rect">
             <a:avLst/>
@@ -6879,8 +6879,8 @@
     </p:tnLst>
     <p:bldLst>
       <p:bldP build="whole" bldLvl="1" animBg="1" rev="0" advAuto="0" spid="258" grpId="2"/>
+      <p:bldP build="whole" bldLvl="1" animBg="1" rev="0" advAuto="0" spid="257" grpId="1"/>
       <p:bldP build="whole" bldLvl="1" animBg="1" rev="0" advAuto="0" spid="259" grpId="3"/>
-      <p:bldP build="whole" bldLvl="1" animBg="1" rev="0" advAuto="0" spid="257" grpId="1"/>
     </p:bldLst>
   </p:timing>
 </p:sld>
@@ -7239,9 +7239,9 @@
       </p:par>
     </p:tnLst>
     <p:bldLst>
-      <p:bldP build="whole" bldLvl="1" animBg="1" rev="0" advAuto="0" spid="151" grpId="1"/>
       <p:bldP build="whole" bldLvl="1" animBg="1" rev="0" advAuto="0" spid="151" grpId="2"/>
       <p:bldP build="whole" bldLvl="1" animBg="1" rev="0" advAuto="0" spid="150" grpId="3"/>
+      <p:bldP build="whole" bldLvl="1" animBg="1" rev="0" advAuto="0" spid="151" grpId="1"/>
     </p:bldLst>
   </p:timing>
 </p:sld>

</xml_diff>